<commit_message>
Update presentation and add SessionGroupDto
</commit_message>
<xml_diff>
--- a/Resources/Using Service Fabric as a Platform.pptx
+++ b/Resources/Using Service Fabric as a Platform.pptx
@@ -218,7 +218,7 @@
           <a:p>
             <a:fld id="{15E3C7E0-08D4-4C5F-8CF2-4C65DF531706}" type="datetimeFigureOut">
               <a:rPr lang="en-US" smtClean="0"/>
-              <a:t>2/27/2020</a:t>
+              <a:t>2/28/2020</a:t>
             </a:fld>
             <a:endParaRPr lang="en-US"/>
           </a:p>
@@ -780,7 +780,7 @@
                 <a:tabLst/>
                 <a:defRPr/>
               </a:pPr>
-              <a:t>2/27/2020 10:48 PM</a:t>
+              <a:t>2/28/2020 11:00 AM</a:t>
             </a:fld>
             <a:endParaRPr kumimoji="0" lang="en-US" sz="1200" b="0" i="0" u="none" strike="noStrike" kern="1200" cap="none" spc="0" normalizeH="0" baseline="0" noProof="0">
               <a:ln>
@@ -887,7 +887,7 @@
           <p:cNvPr id="3" name="Notes Placeholder 2">
             <a:extLst>
               <a:ext uri="{FF2B5EF4-FFF2-40B4-BE49-F238E27FC236}">
-                <a16:creationId xmlns="" xmlns:a16="http://schemas.microsoft.com/office/drawing/2014/main" id="{1A04DB72-1659-493B-8151-ECEFC0601C24}"/>
+                <a16:creationId xmlns:a16="http://schemas.microsoft.com/office/drawing/2014/main" id="{1A04DB72-1659-493B-8151-ECEFC0601C24}"/>
               </a:ext>
             </a:extLst>
           </p:cNvPr>
@@ -1504,7 +1504,7 @@
             <a:fld id="{B61BEF0D-F0BB-DE4B-95CE-6DB70DBA9567}" type="datetimeFigureOut">
               <a:rPr lang="en-US" smtClean="0"/>
               <a:pPr/>
-              <a:t>2/27/2020</a:t>
+              <a:t>2/28/2020</a:t>
             </a:fld>
             <a:endParaRPr lang="en-US" dirty="0"/>
           </a:p>
@@ -1840,7 +1840,7 @@
             <a:fld id="{B61BEF0D-F0BB-DE4B-95CE-6DB70DBA9567}" type="datetimeFigureOut">
               <a:rPr lang="en-US" smtClean="0"/>
               <a:pPr/>
-              <a:t>2/27/2020</a:t>
+              <a:t>2/28/2020</a:t>
             </a:fld>
             <a:endParaRPr lang="en-US" dirty="0"/>
           </a:p>
@@ -2120,7 +2120,7 @@
             <a:fld id="{B61BEF0D-F0BB-DE4B-95CE-6DB70DBA9567}" type="datetimeFigureOut">
               <a:rPr lang="en-US" smtClean="0"/>
               <a:pPr/>
-              <a:t>2/27/2020</a:t>
+              <a:t>2/28/2020</a:t>
             </a:fld>
             <a:endParaRPr lang="en-US" dirty="0"/>
           </a:p>
@@ -2690,7 +2690,7 @@
             <a:fld id="{B61BEF0D-F0BB-DE4B-95CE-6DB70DBA9567}" type="datetimeFigureOut">
               <a:rPr lang="en-US" smtClean="0"/>
               <a:pPr/>
-              <a:t>2/27/2020</a:t>
+              <a:t>2/28/2020</a:t>
             </a:fld>
             <a:endParaRPr lang="en-US" dirty="0"/>
           </a:p>
@@ -2970,7 +2970,7 @@
             <a:fld id="{B61BEF0D-F0BB-DE4B-95CE-6DB70DBA9567}" type="datetimeFigureOut">
               <a:rPr lang="en-US" smtClean="0"/>
               <a:pPr/>
-              <a:t>2/27/2020</a:t>
+              <a:t>2/28/2020</a:t>
             </a:fld>
             <a:endParaRPr lang="en-US" dirty="0"/>
           </a:p>
@@ -3534,7 +3534,7 @@
             <a:fld id="{B61BEF0D-F0BB-DE4B-95CE-6DB70DBA9567}" type="datetimeFigureOut">
               <a:rPr lang="en-US" smtClean="0"/>
               <a:pPr/>
-              <a:t>2/27/2020</a:t>
+              <a:t>2/28/2020</a:t>
             </a:fld>
             <a:endParaRPr lang="en-US" dirty="0"/>
           </a:p>
@@ -3863,7 +3863,7 @@
             <a:fld id="{B61BEF0D-F0BB-DE4B-95CE-6DB70DBA9567}" type="datetimeFigureOut">
               <a:rPr lang="en-US" smtClean="0"/>
               <a:pPr/>
-              <a:t>2/27/2020</a:t>
+              <a:t>2/28/2020</a:t>
             </a:fld>
             <a:endParaRPr lang="en-US" dirty="0"/>
           </a:p>
@@ -4042,7 +4042,7 @@
             <a:fld id="{B61BEF0D-F0BB-DE4B-95CE-6DB70DBA9567}" type="datetimeFigureOut">
               <a:rPr lang="en-US" smtClean="0"/>
               <a:pPr/>
-              <a:t>2/27/2020</a:t>
+              <a:t>2/28/2020</a:t>
             </a:fld>
             <a:endParaRPr lang="en-US" dirty="0"/>
           </a:p>
@@ -4282,7 +4282,7 @@
             <a:fld id="{B61BEF0D-F0BB-DE4B-95CE-6DB70DBA9567}" type="datetimeFigureOut">
               <a:rPr lang="en-US" smtClean="0"/>
               <a:pPr/>
-              <a:t>2/27/2020</a:t>
+              <a:t>2/28/2020</a:t>
             </a:fld>
             <a:endParaRPr lang="en-US" dirty="0"/>
           </a:p>
@@ -4484,7 +4484,7 @@
             <a:fld id="{B61BEF0D-F0BB-DE4B-95CE-6DB70DBA9567}" type="datetimeFigureOut">
               <a:rPr lang="en-US" smtClean="0"/>
               <a:pPr/>
-              <a:t>2/27/2020</a:t>
+              <a:t>2/28/2020</a:t>
             </a:fld>
             <a:endParaRPr lang="en-US" dirty="0"/>
           </a:p>
@@ -4762,7 +4762,7 @@
             <a:fld id="{B61BEF0D-F0BB-DE4B-95CE-6DB70DBA9567}" type="datetimeFigureOut">
               <a:rPr lang="en-US" smtClean="0"/>
               <a:pPr/>
-              <a:t>2/27/2020</a:t>
+              <a:t>2/28/2020</a:t>
             </a:fld>
             <a:endParaRPr lang="en-US" dirty="0"/>
           </a:p>
@@ -5030,7 +5030,7 @@
             <a:fld id="{B61BEF0D-F0BB-DE4B-95CE-6DB70DBA9567}" type="datetimeFigureOut">
               <a:rPr lang="en-US" smtClean="0"/>
               <a:pPr/>
-              <a:t>2/27/2020</a:t>
+              <a:t>2/28/2020</a:t>
             </a:fld>
             <a:endParaRPr lang="en-US" dirty="0"/>
           </a:p>
@@ -5406,7 +5406,7 @@
             <a:fld id="{B61BEF0D-F0BB-DE4B-95CE-6DB70DBA9567}" type="datetimeFigureOut">
               <a:rPr lang="en-US" smtClean="0"/>
               <a:pPr/>
-              <a:t>2/27/2020</a:t>
+              <a:t>2/28/2020</a:t>
             </a:fld>
             <a:endParaRPr lang="en-US" dirty="0"/>
           </a:p>
@@ -5556,7 +5556,7 @@
             <a:fld id="{B61BEF0D-F0BB-DE4B-95CE-6DB70DBA9567}" type="datetimeFigureOut">
               <a:rPr lang="en-US" smtClean="0"/>
               <a:pPr/>
-              <a:t>2/27/2020</a:t>
+              <a:t>2/28/2020</a:t>
             </a:fld>
             <a:endParaRPr lang="en-US" dirty="0"/>
           </a:p>
@@ -5683,7 +5683,7 @@
             <a:fld id="{B61BEF0D-F0BB-DE4B-95CE-6DB70DBA9567}" type="datetimeFigureOut">
               <a:rPr lang="en-US" smtClean="0"/>
               <a:pPr/>
-              <a:t>2/27/2020</a:t>
+              <a:t>2/28/2020</a:t>
             </a:fld>
             <a:endParaRPr lang="en-US" dirty="0"/>
           </a:p>
@@ -5970,7 +5970,7 @@
             <a:fld id="{B61BEF0D-F0BB-DE4B-95CE-6DB70DBA9567}" type="datetimeFigureOut">
               <a:rPr lang="en-US" smtClean="0"/>
               <a:pPr/>
-              <a:t>2/27/2020</a:t>
+              <a:t>2/28/2020</a:t>
             </a:fld>
             <a:endParaRPr lang="en-US" dirty="0"/>
           </a:p>
@@ -6296,7 +6296,7 @@
             <a:fld id="{B61BEF0D-F0BB-DE4B-95CE-6DB70DBA9567}" type="datetimeFigureOut">
               <a:rPr lang="en-US" smtClean="0"/>
               <a:pPr/>
-              <a:t>2/27/2020</a:t>
+              <a:t>2/28/2020</a:t>
             </a:fld>
             <a:endParaRPr lang="en-US" dirty="0"/>
           </a:p>
@@ -6528,7 +6528,7 @@
             <a:fld id="{B61BEF0D-F0BB-DE4B-95CE-6DB70DBA9567}" type="datetimeFigureOut">
               <a:rPr lang="en-US" smtClean="0"/>
               <a:pPr/>
-              <a:t>2/27/2020</a:t>
+              <a:t>2/28/2020</a:t>
             </a:fld>
             <a:endParaRPr lang="en-US" dirty="0"/>
           </a:p>
@@ -7138,7 +7138,7 @@
           <p:cNvPr id="4098" name="Picture 2" descr="Image result for service fabric logo">
             <a:extLst>
               <a:ext uri="{FF2B5EF4-FFF2-40B4-BE49-F238E27FC236}">
-                <a16:creationId xmlns="" xmlns:a16="http://schemas.microsoft.com/office/drawing/2014/main" id="{CFE570C4-577D-4C96-AEDB-EBD309D31A15}"/>
+                <a16:creationId xmlns:a16="http://schemas.microsoft.com/office/drawing/2014/main" id="{CFE570C4-577D-4C96-AEDB-EBD309D31A15}"/>
               </a:ext>
             </a:extLst>
           </p:cNvPr>
@@ -7190,13 +7190,6 @@
   <p:clrMapOvr>
     <a:masterClrMapping/>
   </p:clrMapOvr>
-  <p:timing>
-    <p:tnLst>
-      <p:par>
-        <p:cTn id="1" dur="indefinite" restart="never" nodeType="tmRoot"/>
-      </p:par>
-    </p:tnLst>
-  </p:timing>
 </p:sld>
 </file>
 
@@ -7359,7 +7352,7 @@
           <p:cNvPr id="4" name="Title 1">
             <a:extLst>
               <a:ext uri="{FF2B5EF4-FFF2-40B4-BE49-F238E27FC236}">
-                <a16:creationId xmlns="" xmlns:a16="http://schemas.microsoft.com/office/drawing/2014/main" id="{CC148AF4-B254-433B-924B-334645B43C18}"/>
+                <a16:creationId xmlns:a16="http://schemas.microsoft.com/office/drawing/2014/main" id="{CC148AF4-B254-433B-924B-334645B43C18}"/>
               </a:ext>
             </a:extLst>
           </p:cNvPr>
@@ -7469,6 +7462,58 @@
           </a:p>
         </p:txBody>
       </p:sp>
+      <p:sp>
+        <p:nvSpPr>
+          <p:cNvPr id="2" name="Rectangle 1">
+            <a:extLst>
+              <a:ext uri="{FF2B5EF4-FFF2-40B4-BE49-F238E27FC236}">
+                <a16:creationId xmlns:a16="http://schemas.microsoft.com/office/drawing/2014/main" id="{99DB4DB6-AD26-449B-82FD-5FBF7518365F}"/>
+              </a:ext>
+            </a:extLst>
+          </p:cNvPr>
+          <p:cNvSpPr/>
+          <p:nvPr/>
+        </p:nvSpPr>
+        <p:spPr>
+          <a:xfrm>
+            <a:off x="1084520" y="4795283"/>
+            <a:ext cx="8431618" cy="489097"/>
+          </a:xfrm>
+          <a:prstGeom prst="rect">
+            <a:avLst/>
+          </a:prstGeom>
+          <a:noFill/>
+          <a:ln w="38100">
+            <a:solidFill>
+              <a:srgbClr val="0070C0"/>
+            </a:solidFill>
+          </a:ln>
+        </p:spPr>
+        <p:style>
+          <a:lnRef idx="2">
+            <a:schemeClr val="accent1">
+              <a:shade val="50000"/>
+            </a:schemeClr>
+          </a:lnRef>
+          <a:fillRef idx="1">
+            <a:schemeClr val="accent1"/>
+          </a:fillRef>
+          <a:effectRef idx="0">
+            <a:schemeClr val="accent1"/>
+          </a:effectRef>
+          <a:fontRef idx="minor">
+            <a:schemeClr val="lt1"/>
+          </a:fontRef>
+        </p:style>
+        <p:txBody>
+          <a:bodyPr rtlCol="0" anchor="ctr"/>
+          <a:lstStyle/>
+          <a:p>
+            <a:pPr algn="ctr"/>
+            <a:endParaRPr lang="en-US"/>
+          </a:p>
+        </p:txBody>
+      </p:sp>
     </p:spTree>
     <p:extLst>
       <p:ext uri="{BB962C8B-B14F-4D97-AF65-F5344CB8AC3E}">
@@ -7482,9 +7527,134 @@
   <p:timing>
     <p:tnLst>
       <p:par>
-        <p:cTn id="1" dur="indefinite" restart="never" nodeType="tmRoot"/>
+        <p:cTn id="1" dur="indefinite" restart="never" nodeType="tmRoot">
+          <p:childTnLst>
+            <p:seq concurrent="1" nextAc="seek">
+              <p:cTn id="2" dur="indefinite" nodeType="mainSeq">
+                <p:childTnLst>
+                  <p:par>
+                    <p:cTn id="3" fill="hold">
+                      <p:stCondLst>
+                        <p:cond delay="indefinite"/>
+                      </p:stCondLst>
+                      <p:childTnLst>
+                        <p:par>
+                          <p:cTn id="4" fill="hold">
+                            <p:stCondLst>
+                              <p:cond delay="0"/>
+                            </p:stCondLst>
+                            <p:childTnLst>
+                              <p:par>
+                                <p:cTn id="5" presetID="53" presetClass="entr" presetSubtype="16" fill="hold" grpId="0" nodeType="clickEffect">
+                                  <p:stCondLst>
+                                    <p:cond delay="0"/>
+                                  </p:stCondLst>
+                                  <p:childTnLst>
+                                    <p:set>
+                                      <p:cBhvr>
+                                        <p:cTn id="6" dur="1" fill="hold">
+                                          <p:stCondLst>
+                                            <p:cond delay="0"/>
+                                          </p:stCondLst>
+                                        </p:cTn>
+                                        <p:tgtEl>
+                                          <p:spTgt spid="2"/>
+                                        </p:tgtEl>
+                                        <p:attrNameLst>
+                                          <p:attrName>style.visibility</p:attrName>
+                                        </p:attrNameLst>
+                                      </p:cBhvr>
+                                      <p:to>
+                                        <p:strVal val="visible"/>
+                                      </p:to>
+                                    </p:set>
+                                    <p:anim calcmode="lin" valueType="num">
+                                      <p:cBhvr>
+                                        <p:cTn id="7" dur="500" fill="hold"/>
+                                        <p:tgtEl>
+                                          <p:spTgt spid="2"/>
+                                        </p:tgtEl>
+                                        <p:attrNameLst>
+                                          <p:attrName>ppt_w</p:attrName>
+                                        </p:attrNameLst>
+                                      </p:cBhvr>
+                                      <p:tavLst>
+                                        <p:tav tm="0">
+                                          <p:val>
+                                            <p:fltVal val="0"/>
+                                          </p:val>
+                                        </p:tav>
+                                        <p:tav tm="100000">
+                                          <p:val>
+                                            <p:strVal val="#ppt_w"/>
+                                          </p:val>
+                                        </p:tav>
+                                      </p:tavLst>
+                                    </p:anim>
+                                    <p:anim calcmode="lin" valueType="num">
+                                      <p:cBhvr>
+                                        <p:cTn id="8" dur="500" fill="hold"/>
+                                        <p:tgtEl>
+                                          <p:spTgt spid="2"/>
+                                        </p:tgtEl>
+                                        <p:attrNameLst>
+                                          <p:attrName>ppt_h</p:attrName>
+                                        </p:attrNameLst>
+                                      </p:cBhvr>
+                                      <p:tavLst>
+                                        <p:tav tm="0">
+                                          <p:val>
+                                            <p:fltVal val="0"/>
+                                          </p:val>
+                                        </p:tav>
+                                        <p:tav tm="100000">
+                                          <p:val>
+                                            <p:strVal val="#ppt_h"/>
+                                          </p:val>
+                                        </p:tav>
+                                      </p:tavLst>
+                                    </p:anim>
+                                    <p:animEffect transition="in" filter="fade">
+                                      <p:cBhvr>
+                                        <p:cTn id="9" dur="500"/>
+                                        <p:tgtEl>
+                                          <p:spTgt spid="2"/>
+                                        </p:tgtEl>
+                                      </p:cBhvr>
+                                    </p:animEffect>
+                                  </p:childTnLst>
+                                </p:cTn>
+                              </p:par>
+                            </p:childTnLst>
+                          </p:cTn>
+                        </p:par>
+                      </p:childTnLst>
+                    </p:cTn>
+                  </p:par>
+                </p:childTnLst>
+              </p:cTn>
+              <p:prevCondLst>
+                <p:cond evt="onPrev" delay="0">
+                  <p:tgtEl>
+                    <p:sldTgt/>
+                  </p:tgtEl>
+                </p:cond>
+              </p:prevCondLst>
+              <p:nextCondLst>
+                <p:cond evt="onNext" delay="0">
+                  <p:tgtEl>
+                    <p:sldTgt/>
+                  </p:tgtEl>
+                </p:cond>
+              </p:nextCondLst>
+            </p:seq>
+          </p:childTnLst>
+        </p:cTn>
       </p:par>
     </p:tnLst>
+    <p:bldLst>
+      <p:bldP spid="2" grpId="0" animBg="1"/>
+    </p:bldLst>
   </p:timing>
 </p:sld>
 </file>
@@ -7519,7 +7689,7 @@
           <p:cNvPr id="5" name="Picture 4" descr="A picture containing plate&#10;&#10;Description automatically generated">
             <a:extLst>
               <a:ext uri="{FF2B5EF4-FFF2-40B4-BE49-F238E27FC236}">
-                <a16:creationId xmlns="" xmlns:a16="http://schemas.microsoft.com/office/drawing/2014/main" id="{736D0E73-E955-48D8-AE54-89D24F785379}"/>
+                <a16:creationId xmlns:a16="http://schemas.microsoft.com/office/drawing/2014/main" id="{736D0E73-E955-48D8-AE54-89D24F785379}"/>
               </a:ext>
             </a:extLst>
           </p:cNvPr>
@@ -7549,7 +7719,7 @@
           <p:cNvPr id="1034" name="Picture 10" descr="Image result for honeywell icon">
             <a:extLst>
               <a:ext uri="{FF2B5EF4-FFF2-40B4-BE49-F238E27FC236}">
-                <a16:creationId xmlns="" xmlns:a16="http://schemas.microsoft.com/office/drawing/2014/main" id="{15A803CB-66DD-4A6C-A03F-A3F44A21987D}"/>
+                <a16:creationId xmlns:a16="http://schemas.microsoft.com/office/drawing/2014/main" id="{15A803CB-66DD-4A6C-A03F-A3F44A21987D}"/>
               </a:ext>
             </a:extLst>
           </p:cNvPr>
@@ -7596,7 +7766,7 @@
           <p:cNvPr id="1036" name="Picture 12" descr="Image result for alaska airlines icon">
             <a:extLst>
               <a:ext uri="{FF2B5EF4-FFF2-40B4-BE49-F238E27FC236}">
-                <a16:creationId xmlns="" xmlns:a16="http://schemas.microsoft.com/office/drawing/2014/main" id="{31E549AF-A267-4F9B-9C98-90ECF7C5123C}"/>
+                <a16:creationId xmlns:a16="http://schemas.microsoft.com/office/drawing/2014/main" id="{31E549AF-A267-4F9B-9C98-90ECF7C5123C}"/>
               </a:ext>
             </a:extLst>
           </p:cNvPr>
@@ -7643,7 +7813,7 @@
           <p:cNvPr id="1038" name="Picture 14" descr="Image result for citrix icon">
             <a:extLst>
               <a:ext uri="{FF2B5EF4-FFF2-40B4-BE49-F238E27FC236}">
-                <a16:creationId xmlns="" xmlns:a16="http://schemas.microsoft.com/office/drawing/2014/main" id="{526F101B-0509-485F-A8E7-A8F96B7F10A6}"/>
+                <a16:creationId xmlns:a16="http://schemas.microsoft.com/office/drawing/2014/main" id="{526F101B-0509-485F-A8E7-A8F96B7F10A6}"/>
               </a:ext>
             </a:extLst>
           </p:cNvPr>
@@ -7690,7 +7860,7 @@
           <p:cNvPr id="1042" name="Picture 18" descr="Image result for kpmg icon">
             <a:extLst>
               <a:ext uri="{FF2B5EF4-FFF2-40B4-BE49-F238E27FC236}">
-                <a16:creationId xmlns="" xmlns:a16="http://schemas.microsoft.com/office/drawing/2014/main" id="{988E7236-70EA-4BAB-866A-8149BA4EA701}"/>
+                <a16:creationId xmlns:a16="http://schemas.microsoft.com/office/drawing/2014/main" id="{988E7236-70EA-4BAB-866A-8149BA4EA701}"/>
               </a:ext>
             </a:extLst>
           </p:cNvPr>
@@ -7737,7 +7907,7 @@
           <p:cNvPr id="19" name="Title 1">
             <a:extLst>
               <a:ext uri="{FF2B5EF4-FFF2-40B4-BE49-F238E27FC236}">
-                <a16:creationId xmlns="" xmlns:a16="http://schemas.microsoft.com/office/drawing/2014/main" id="{C3AABA91-04D2-4B09-BDD7-AE738FA71A44}"/>
+                <a16:creationId xmlns:a16="http://schemas.microsoft.com/office/drawing/2014/main" id="{C3AABA91-04D2-4B09-BDD7-AE738FA71A44}"/>
               </a:ext>
             </a:extLst>
           </p:cNvPr>
@@ -7855,7 +8025,7 @@
           <p:cNvPr id="1032" name="Picture 8" descr="Image result for BMW icon">
             <a:extLst>
               <a:ext uri="{FF2B5EF4-FFF2-40B4-BE49-F238E27FC236}">
-                <a16:creationId xmlns="" xmlns:a16="http://schemas.microsoft.com/office/drawing/2014/main" id="{80A04DCE-5BA8-467E-9AC5-D21D0E39178E}"/>
+                <a16:creationId xmlns:a16="http://schemas.microsoft.com/office/drawing/2014/main" id="{80A04DCE-5BA8-467E-9AC5-D21D0E39178E}"/>
               </a:ext>
             </a:extLst>
           </p:cNvPr>
@@ -7902,7 +8072,7 @@
           <p:cNvPr id="1046" name="Picture 22" descr="Image result for assurant logo">
             <a:extLst>
               <a:ext uri="{FF2B5EF4-FFF2-40B4-BE49-F238E27FC236}">
-                <a16:creationId xmlns="" xmlns:a16="http://schemas.microsoft.com/office/drawing/2014/main" id="{47C14FE2-0E02-4EC4-8E01-A112DCE0F10C}"/>
+                <a16:creationId xmlns:a16="http://schemas.microsoft.com/office/drawing/2014/main" id="{47C14FE2-0E02-4EC4-8E01-A112DCE0F10C}"/>
               </a:ext>
             </a:extLst>
           </p:cNvPr>
@@ -7949,7 +8119,7 @@
           <p:cNvPr id="1048" name="Picture 24" descr="Image result for quorum logo">
             <a:extLst>
               <a:ext uri="{FF2B5EF4-FFF2-40B4-BE49-F238E27FC236}">
-                <a16:creationId xmlns="" xmlns:a16="http://schemas.microsoft.com/office/drawing/2014/main" id="{525FBEA2-F291-4233-9B32-52BA556E76FA}"/>
+                <a16:creationId xmlns:a16="http://schemas.microsoft.com/office/drawing/2014/main" id="{525FBEA2-F291-4233-9B32-52BA556E76FA}"/>
               </a:ext>
             </a:extLst>
           </p:cNvPr>
@@ -7996,7 +8166,7 @@
           <p:cNvPr id="1050" name="Picture 26" descr="Image result for talk talk logo">
             <a:extLst>
               <a:ext uri="{FF2B5EF4-FFF2-40B4-BE49-F238E27FC236}">
-                <a16:creationId xmlns="" xmlns:a16="http://schemas.microsoft.com/office/drawing/2014/main" id="{C4310C50-7D5D-4032-986F-922DFCFB03EE}"/>
+                <a16:creationId xmlns:a16="http://schemas.microsoft.com/office/drawing/2014/main" id="{C4310C50-7D5D-4032-986F-922DFCFB03EE}"/>
               </a:ext>
             </a:extLst>
           </p:cNvPr>
@@ -8043,7 +8213,7 @@
           <p:cNvPr id="1052" name="Picture 28" descr="Image result for mesh system logo">
             <a:extLst>
               <a:ext uri="{FF2B5EF4-FFF2-40B4-BE49-F238E27FC236}">
-                <a16:creationId xmlns="" xmlns:a16="http://schemas.microsoft.com/office/drawing/2014/main" id="{D6131671-C2F7-422F-811D-28976710337D}"/>
+                <a16:creationId xmlns:a16="http://schemas.microsoft.com/office/drawing/2014/main" id="{D6131671-C2F7-422F-811D-28976710337D}"/>
               </a:ext>
             </a:extLst>
           </p:cNvPr>
@@ -8090,7 +8260,7 @@
           <p:cNvPr id="1054" name="Picture 30" descr="Image result for osisoft logo">
             <a:extLst>
               <a:ext uri="{FF2B5EF4-FFF2-40B4-BE49-F238E27FC236}">
-                <a16:creationId xmlns="" xmlns:a16="http://schemas.microsoft.com/office/drawing/2014/main" id="{32C27922-BC67-4B21-9C86-39AD977340EA}"/>
+                <a16:creationId xmlns:a16="http://schemas.microsoft.com/office/drawing/2014/main" id="{32C27922-BC67-4B21-9C86-39AD977340EA}"/>
               </a:ext>
             </a:extLst>
           </p:cNvPr>
@@ -8137,7 +8307,7 @@
           <p:cNvPr id="1056" name="Picture 32" descr="Image result for bentlry advance infrasctructure logo">
             <a:extLst>
               <a:ext uri="{FF2B5EF4-FFF2-40B4-BE49-F238E27FC236}">
-                <a16:creationId xmlns="" xmlns:a16="http://schemas.microsoft.com/office/drawing/2014/main" id="{C9733EB5-87E1-4553-9D7E-25F25BC3FA93}"/>
+                <a16:creationId xmlns:a16="http://schemas.microsoft.com/office/drawing/2014/main" id="{C9733EB5-87E1-4553-9D7E-25F25BC3FA93}"/>
               </a:ext>
             </a:extLst>
           </p:cNvPr>
@@ -8184,7 +8354,7 @@
           <p:cNvPr id="1058" name="Picture 34" descr="Image result for codit integrating your system logo">
             <a:extLst>
               <a:ext uri="{FF2B5EF4-FFF2-40B4-BE49-F238E27FC236}">
-                <a16:creationId xmlns="" xmlns:a16="http://schemas.microsoft.com/office/drawing/2014/main" id="{B27035C5-EFEC-4BD2-876E-86F38D7D64C3}"/>
+                <a16:creationId xmlns:a16="http://schemas.microsoft.com/office/drawing/2014/main" id="{B27035C5-EFEC-4BD2-876E-86F38D7D64C3}"/>
               </a:ext>
             </a:extLst>
           </p:cNvPr>
@@ -8229,7 +8399,7 @@
           <p:cNvPr id="1060" name="Picture 36" descr="Image result for starbucks logo">
             <a:extLst>
               <a:ext uri="{FF2B5EF4-FFF2-40B4-BE49-F238E27FC236}">
-                <a16:creationId xmlns="" xmlns:a16="http://schemas.microsoft.com/office/drawing/2014/main" id="{BD41C8D7-8978-47D3-A29A-23E81094EC14}"/>
+                <a16:creationId xmlns:a16="http://schemas.microsoft.com/office/drawing/2014/main" id="{BD41C8D7-8978-47D3-A29A-23E81094EC14}"/>
               </a:ext>
             </a:extLst>
           </p:cNvPr>
@@ -8276,7 +8446,7 @@
           <p:cNvPr id="1062" name="Picture 38" descr="Image result for care otter">
             <a:extLst>
               <a:ext uri="{FF2B5EF4-FFF2-40B4-BE49-F238E27FC236}">
-                <a16:creationId xmlns="" xmlns:a16="http://schemas.microsoft.com/office/drawing/2014/main" id="{8B7BE025-FFCC-4131-B4F8-E09553932D97}"/>
+                <a16:creationId xmlns:a16="http://schemas.microsoft.com/office/drawing/2014/main" id="{8B7BE025-FFCC-4131-B4F8-E09553932D97}"/>
               </a:ext>
             </a:extLst>
           </p:cNvPr>
@@ -8323,7 +8493,7 @@
           <p:cNvPr id="1064" name="Picture 40" descr="Image result for owners.com logo">
             <a:extLst>
               <a:ext uri="{FF2B5EF4-FFF2-40B4-BE49-F238E27FC236}">
-                <a16:creationId xmlns="" xmlns:a16="http://schemas.microsoft.com/office/drawing/2014/main" id="{5F5F1535-8130-464B-A9CC-69BB0DF74774}"/>
+                <a16:creationId xmlns:a16="http://schemas.microsoft.com/office/drawing/2014/main" id="{5F5F1535-8130-464B-A9CC-69BB0DF74774}"/>
               </a:ext>
             </a:extLst>
           </p:cNvPr>
@@ -8375,13 +8545,6 @@
   <p:clrMapOvr>
     <a:masterClrMapping/>
   </p:clrMapOvr>
-  <p:timing>
-    <p:tnLst>
-      <p:par>
-        <p:cTn id="1" dur="indefinite" restart="never" nodeType="tmRoot"/>
-      </p:par>
-    </p:tnLst>
-  </p:timing>
 </p:sld>
 </file>
 
@@ -8466,7 +8629,7 @@
           <p:cNvPr id="5" name="Title 1">
             <a:extLst>
               <a:ext uri="{FF2B5EF4-FFF2-40B4-BE49-F238E27FC236}">
-                <a16:creationId xmlns="" xmlns:a16="http://schemas.microsoft.com/office/drawing/2014/main" id="{7AA06AA2-BC4F-4440-9C6F-720168E8BBD4}"/>
+                <a16:creationId xmlns:a16="http://schemas.microsoft.com/office/drawing/2014/main" id="{7AA06AA2-BC4F-4440-9C6F-720168E8BBD4}"/>
               </a:ext>
             </a:extLst>
           </p:cNvPr>
@@ -8581,7 +8744,7 @@
           <p:cNvPr id="3074" name="Picture 2" descr="Image result for windows logo">
             <a:extLst>
               <a:ext uri="{FF2B5EF4-FFF2-40B4-BE49-F238E27FC236}">
-                <a16:creationId xmlns="" xmlns:a16="http://schemas.microsoft.com/office/drawing/2014/main" id="{0257400E-8403-40F9-A3E7-F04FC87FF678}"/>
+                <a16:creationId xmlns:a16="http://schemas.microsoft.com/office/drawing/2014/main" id="{0257400E-8403-40F9-A3E7-F04FC87FF678}"/>
               </a:ext>
             </a:extLst>
           </p:cNvPr>
@@ -8628,7 +8791,7 @@
           <p:cNvPr id="9" name="Picture 2" descr="Image result for service fabric logo">
             <a:extLst>
               <a:ext uri="{FF2B5EF4-FFF2-40B4-BE49-F238E27FC236}">
-                <a16:creationId xmlns="" xmlns:a16="http://schemas.microsoft.com/office/drawing/2014/main" id="{8AC379C2-9C08-46AB-A9D0-98BD4DA6B46D}"/>
+                <a16:creationId xmlns:a16="http://schemas.microsoft.com/office/drawing/2014/main" id="{8AC379C2-9C08-46AB-A9D0-98BD4DA6B46D}"/>
               </a:ext>
             </a:extLst>
           </p:cNvPr>
@@ -8675,7 +8838,7 @@
           <p:cNvPr id="3078" name="Picture 6" descr="Image result for linux logo">
             <a:extLst>
               <a:ext uri="{FF2B5EF4-FFF2-40B4-BE49-F238E27FC236}">
-                <a16:creationId xmlns="" xmlns:a16="http://schemas.microsoft.com/office/drawing/2014/main" id="{5641F54E-6AFA-4BA9-B35F-9D6AFFD755DF}"/>
+                <a16:creationId xmlns:a16="http://schemas.microsoft.com/office/drawing/2014/main" id="{5641F54E-6AFA-4BA9-B35F-9D6AFFD755DF}"/>
               </a:ext>
             </a:extLst>
           </p:cNvPr>
@@ -8722,7 +8885,7 @@
           <p:cNvPr id="8" name="Group 7">
             <a:extLst>
               <a:ext uri="{FF2B5EF4-FFF2-40B4-BE49-F238E27FC236}">
-                <a16:creationId xmlns="" xmlns:a16="http://schemas.microsoft.com/office/drawing/2014/main" id="{161B8AA9-E2A2-40A4-BFF1-965CEFA9C630}"/>
+                <a16:creationId xmlns:a16="http://schemas.microsoft.com/office/drawing/2014/main" id="{161B8AA9-E2A2-40A4-BFF1-965CEFA9C630}"/>
               </a:ext>
             </a:extLst>
           </p:cNvPr>
@@ -8742,7 +8905,7 @@
             <p:cNvPr id="3080" name="Picture 8" descr="Image result for cloud icon png">
               <a:extLst>
                 <a:ext uri="{FF2B5EF4-FFF2-40B4-BE49-F238E27FC236}">
-                  <a16:creationId xmlns="" xmlns:a16="http://schemas.microsoft.com/office/drawing/2014/main" id="{52D0EAE6-D1CC-40E8-8C53-C0488C5F73BA}"/>
+                  <a16:creationId xmlns:a16="http://schemas.microsoft.com/office/drawing/2014/main" id="{52D0EAE6-D1CC-40E8-8C53-C0488C5F73BA}"/>
                 </a:ext>
               </a:extLst>
             </p:cNvPr>
@@ -8801,7 +8964,7 @@
             <p:cNvPr id="15" name="Picture 8" descr="Image result for cloud icon png">
               <a:extLst>
                 <a:ext uri="{FF2B5EF4-FFF2-40B4-BE49-F238E27FC236}">
-                  <a16:creationId xmlns="" xmlns:a16="http://schemas.microsoft.com/office/drawing/2014/main" id="{AA59BF31-16A9-4D38-AC0D-05829F1B5CF4}"/>
+                  <a16:creationId xmlns:a16="http://schemas.microsoft.com/office/drawing/2014/main" id="{AA59BF31-16A9-4D38-AC0D-05829F1B5CF4}"/>
                 </a:ext>
               </a:extLst>
             </p:cNvPr>
@@ -8860,7 +9023,7 @@
             <p:cNvPr id="16" name="Picture 8" descr="Image result for cloud icon png">
               <a:extLst>
                 <a:ext uri="{FF2B5EF4-FFF2-40B4-BE49-F238E27FC236}">
-                  <a16:creationId xmlns="" xmlns:a16="http://schemas.microsoft.com/office/drawing/2014/main" id="{3F3D470C-E552-47BE-85F0-B2E6401CE83C}"/>
+                  <a16:creationId xmlns:a16="http://schemas.microsoft.com/office/drawing/2014/main" id="{3F3D470C-E552-47BE-85F0-B2E6401CE83C}"/>
                 </a:ext>
               </a:extLst>
             </p:cNvPr>
@@ -8920,7 +9083,7 @@
           <p:cNvPr id="10" name="Group 9">
             <a:extLst>
               <a:ext uri="{FF2B5EF4-FFF2-40B4-BE49-F238E27FC236}">
-                <a16:creationId xmlns="" xmlns:a16="http://schemas.microsoft.com/office/drawing/2014/main" id="{749B23D8-BCC0-4436-B22F-FB403771F946}"/>
+                <a16:creationId xmlns:a16="http://schemas.microsoft.com/office/drawing/2014/main" id="{749B23D8-BCC0-4436-B22F-FB403771F946}"/>
               </a:ext>
             </a:extLst>
           </p:cNvPr>
@@ -8940,7 +9103,7 @@
             <p:cNvPr id="19" name="Picture 8" descr="Image result for cloud icon png">
               <a:extLst>
                 <a:ext uri="{FF2B5EF4-FFF2-40B4-BE49-F238E27FC236}">
-                  <a16:creationId xmlns="" xmlns:a16="http://schemas.microsoft.com/office/drawing/2014/main" id="{0277A451-221B-49DD-B2CC-2C1BEE4DF6CD}"/>
+                  <a16:creationId xmlns:a16="http://schemas.microsoft.com/office/drawing/2014/main" id="{0277A451-221B-49DD-B2CC-2C1BEE4DF6CD}"/>
                 </a:ext>
               </a:extLst>
             </p:cNvPr>
@@ -8999,7 +9162,7 @@
             <p:cNvPr id="20" name="Picture 8" descr="Image result for cloud icon png">
               <a:extLst>
                 <a:ext uri="{FF2B5EF4-FFF2-40B4-BE49-F238E27FC236}">
-                  <a16:creationId xmlns="" xmlns:a16="http://schemas.microsoft.com/office/drawing/2014/main" id="{186D0AEA-224A-465D-ADD2-ACD182B51CD1}"/>
+                  <a16:creationId xmlns:a16="http://schemas.microsoft.com/office/drawing/2014/main" id="{186D0AEA-224A-465D-ADD2-ACD182B51CD1}"/>
                 </a:ext>
               </a:extLst>
             </p:cNvPr>
@@ -9058,7 +9221,7 @@
             <p:cNvPr id="21" name="Picture 8" descr="Image result for cloud icon png">
               <a:extLst>
                 <a:ext uri="{FF2B5EF4-FFF2-40B4-BE49-F238E27FC236}">
-                  <a16:creationId xmlns="" xmlns:a16="http://schemas.microsoft.com/office/drawing/2014/main" id="{2339CF42-0A33-49EA-B403-5B10147D127D}"/>
+                  <a16:creationId xmlns:a16="http://schemas.microsoft.com/office/drawing/2014/main" id="{2339CF42-0A33-49EA-B403-5B10147D127D}"/>
                 </a:ext>
               </a:extLst>
             </p:cNvPr>
@@ -9118,7 +9281,7 @@
           <p:cNvPr id="23" name="Picture 2" descr="Image result for service fabric logo">
             <a:extLst>
               <a:ext uri="{FF2B5EF4-FFF2-40B4-BE49-F238E27FC236}">
-                <a16:creationId xmlns="" xmlns:a16="http://schemas.microsoft.com/office/drawing/2014/main" id="{27ED28DB-98FB-4638-BD1C-09DF8AA61FCD}"/>
+                <a16:creationId xmlns:a16="http://schemas.microsoft.com/office/drawing/2014/main" id="{27ED28DB-98FB-4638-BD1C-09DF8AA61FCD}"/>
               </a:ext>
             </a:extLst>
           </p:cNvPr>
@@ -9165,7 +9328,7 @@
           <p:cNvPr id="24" name="Picture 2" descr="Image result for service fabric logo">
             <a:extLst>
               <a:ext uri="{FF2B5EF4-FFF2-40B4-BE49-F238E27FC236}">
-                <a16:creationId xmlns="" xmlns:a16="http://schemas.microsoft.com/office/drawing/2014/main" id="{79F1F06D-2908-48EA-A850-4C891B77731B}"/>
+                <a16:creationId xmlns:a16="http://schemas.microsoft.com/office/drawing/2014/main" id="{79F1F06D-2908-48EA-A850-4C891B77731B}"/>
               </a:ext>
             </a:extLst>
           </p:cNvPr>
@@ -9212,7 +9375,7 @@
           <p:cNvPr id="3084" name="Picture 12" descr="Image result for azure logo">
             <a:extLst>
               <a:ext uri="{FF2B5EF4-FFF2-40B4-BE49-F238E27FC236}">
-                <a16:creationId xmlns="" xmlns:a16="http://schemas.microsoft.com/office/drawing/2014/main" id="{F3C33DD0-31C7-4307-BDF4-C1448A15A6AC}"/>
+                <a16:creationId xmlns:a16="http://schemas.microsoft.com/office/drawing/2014/main" id="{F3C33DD0-31C7-4307-BDF4-C1448A15A6AC}"/>
               </a:ext>
             </a:extLst>
           </p:cNvPr>
@@ -9259,7 +9422,7 @@
           <p:cNvPr id="26" name="Content Placeholder 2">
             <a:extLst>
               <a:ext uri="{FF2B5EF4-FFF2-40B4-BE49-F238E27FC236}">
-                <a16:creationId xmlns="" xmlns:a16="http://schemas.microsoft.com/office/drawing/2014/main" id="{9E4FBBC5-1EE1-463C-AFFE-84F0FEBF7FF5}"/>
+                <a16:creationId xmlns:a16="http://schemas.microsoft.com/office/drawing/2014/main" id="{9E4FBBC5-1EE1-463C-AFFE-84F0FEBF7FF5}"/>
               </a:ext>
             </a:extLst>
           </p:cNvPr>
@@ -9510,7 +9673,7 @@
           <p:cNvPr id="27" name="Content Placeholder 2">
             <a:extLst>
               <a:ext uri="{FF2B5EF4-FFF2-40B4-BE49-F238E27FC236}">
-                <a16:creationId xmlns="" xmlns:a16="http://schemas.microsoft.com/office/drawing/2014/main" id="{2133E46C-6AFE-436B-AC22-55695B5BB74A}"/>
+                <a16:creationId xmlns:a16="http://schemas.microsoft.com/office/drawing/2014/main" id="{2133E46C-6AFE-436B-AC22-55695B5BB74A}"/>
               </a:ext>
             </a:extLst>
           </p:cNvPr>
@@ -9761,7 +9924,7 @@
           <p:cNvPr id="3088" name="Picture 16" descr="Image result for server icon">
             <a:extLst>
               <a:ext uri="{FF2B5EF4-FFF2-40B4-BE49-F238E27FC236}">
-                <a16:creationId xmlns="" xmlns:a16="http://schemas.microsoft.com/office/drawing/2014/main" id="{28983DE8-D8DF-4642-99EF-652584851D83}"/>
+                <a16:creationId xmlns:a16="http://schemas.microsoft.com/office/drawing/2014/main" id="{28983DE8-D8DF-4642-99EF-652584851D83}"/>
               </a:ext>
             </a:extLst>
           </p:cNvPr>
@@ -9808,7 +9971,7 @@
           <p:cNvPr id="3090" name="Picture 18" descr="Image result for server icon">
             <a:extLst>
               <a:ext uri="{FF2B5EF4-FFF2-40B4-BE49-F238E27FC236}">
-                <a16:creationId xmlns="" xmlns:a16="http://schemas.microsoft.com/office/drawing/2014/main" id="{F804DE24-EDD4-4C5A-BDC9-8B3E7178628F}"/>
+                <a16:creationId xmlns:a16="http://schemas.microsoft.com/office/drawing/2014/main" id="{F804DE24-EDD4-4C5A-BDC9-8B3E7178628F}"/>
               </a:ext>
             </a:extLst>
           </p:cNvPr>
@@ -9855,7 +10018,7 @@
           <p:cNvPr id="3092" name="Picture 20" descr="Image result for server icon">
             <a:extLst>
               <a:ext uri="{FF2B5EF4-FFF2-40B4-BE49-F238E27FC236}">
-                <a16:creationId xmlns="" xmlns:a16="http://schemas.microsoft.com/office/drawing/2014/main" id="{9C7DD475-09ED-4DD5-BDD1-0C4210C5EF0A}"/>
+                <a16:creationId xmlns:a16="http://schemas.microsoft.com/office/drawing/2014/main" id="{9C7DD475-09ED-4DD5-BDD1-0C4210C5EF0A}"/>
               </a:ext>
             </a:extLst>
           </p:cNvPr>
@@ -9902,7 +10065,7 @@
           <p:cNvPr id="32" name="Content Placeholder 2">
             <a:extLst>
               <a:ext uri="{FF2B5EF4-FFF2-40B4-BE49-F238E27FC236}">
-                <a16:creationId xmlns="" xmlns:a16="http://schemas.microsoft.com/office/drawing/2014/main" id="{7569EADE-A640-4766-9BF7-6FB234A2A940}"/>
+                <a16:creationId xmlns:a16="http://schemas.microsoft.com/office/drawing/2014/main" id="{7569EADE-A640-4766-9BF7-6FB234A2A940}"/>
               </a:ext>
             </a:extLst>
           </p:cNvPr>
@@ -10153,7 +10316,7 @@
           <p:cNvPr id="33" name="Picture 2" descr="Image result for service fabric logo">
             <a:extLst>
               <a:ext uri="{FF2B5EF4-FFF2-40B4-BE49-F238E27FC236}">
-                <a16:creationId xmlns="" xmlns:a16="http://schemas.microsoft.com/office/drawing/2014/main" id="{946E1F85-F753-4C45-BC22-0BA0149BE781}"/>
+                <a16:creationId xmlns:a16="http://schemas.microsoft.com/office/drawing/2014/main" id="{946E1F85-F753-4C45-BC22-0BA0149BE781}"/>
               </a:ext>
             </a:extLst>
           </p:cNvPr>
@@ -10205,13 +10368,6 @@
   <p:clrMapOvr>
     <a:masterClrMapping/>
   </p:clrMapOvr>
-  <p:timing>
-    <p:tnLst>
-      <p:par>
-        <p:cTn id="1" dur="indefinite" restart="never" nodeType="tmRoot"/>
-      </p:par>
-    </p:tnLst>
-  </p:timing>
 </p:sld>
 </file>
 
@@ -10237,7 +10393,7 @@
           <p:cNvPr id="4" name="Rectangle 3">
             <a:extLst>
               <a:ext uri="{FF2B5EF4-FFF2-40B4-BE49-F238E27FC236}">
-                <a16:creationId xmlns="" xmlns:a16="http://schemas.microsoft.com/office/drawing/2014/main" id="{DF6FDFB4-D57F-4FA9-8628-73CF5B573FCD}"/>
+                <a16:creationId xmlns:a16="http://schemas.microsoft.com/office/drawing/2014/main" id="{DF6FDFB4-D57F-4FA9-8628-73CF5B573FCD}"/>
               </a:ext>
             </a:extLst>
           </p:cNvPr>
@@ -10305,7 +10461,7 @@
           <p:cNvPr id="5" name="Rectangle 4">
             <a:extLst>
               <a:ext uri="{FF2B5EF4-FFF2-40B4-BE49-F238E27FC236}">
-                <a16:creationId xmlns="" xmlns:a16="http://schemas.microsoft.com/office/drawing/2014/main" id="{5A17299C-09A8-4389-8601-B713F0DC177B}"/>
+                <a16:creationId xmlns:a16="http://schemas.microsoft.com/office/drawing/2014/main" id="{5A17299C-09A8-4389-8601-B713F0DC177B}"/>
               </a:ext>
             </a:extLst>
           </p:cNvPr>
@@ -10365,7 +10521,7 @@
           <p:cNvPr id="6" name="Rectangle 5">
             <a:extLst>
               <a:ext uri="{FF2B5EF4-FFF2-40B4-BE49-F238E27FC236}">
-                <a16:creationId xmlns="" xmlns:a16="http://schemas.microsoft.com/office/drawing/2014/main" id="{329E05E2-6B55-4B86-9BAB-CFF663F2E6F5}"/>
+                <a16:creationId xmlns:a16="http://schemas.microsoft.com/office/drawing/2014/main" id="{329E05E2-6B55-4B86-9BAB-CFF663F2E6F5}"/>
               </a:ext>
             </a:extLst>
           </p:cNvPr>
@@ -10459,7 +10615,7 @@
           <p:cNvPr id="7" name="Rectangle 6">
             <a:extLst>
               <a:ext uri="{FF2B5EF4-FFF2-40B4-BE49-F238E27FC236}">
-                <a16:creationId xmlns="" xmlns:a16="http://schemas.microsoft.com/office/drawing/2014/main" id="{2B7FEA48-E805-4ED1-A2F1-511312813C08}"/>
+                <a16:creationId xmlns:a16="http://schemas.microsoft.com/office/drawing/2014/main" id="{2B7FEA48-E805-4ED1-A2F1-511312813C08}"/>
               </a:ext>
             </a:extLst>
           </p:cNvPr>
@@ -10519,7 +10675,7 @@
           <p:cNvPr id="8" name="Rectangle 7">
             <a:extLst>
               <a:ext uri="{FF2B5EF4-FFF2-40B4-BE49-F238E27FC236}">
-                <a16:creationId xmlns="" xmlns:a16="http://schemas.microsoft.com/office/drawing/2014/main" id="{A2D5150C-AF04-42D0-B6B5-C695751156C6}"/>
+                <a16:creationId xmlns:a16="http://schemas.microsoft.com/office/drawing/2014/main" id="{A2D5150C-AF04-42D0-B6B5-C695751156C6}"/>
               </a:ext>
             </a:extLst>
           </p:cNvPr>
@@ -10580,7 +10736,7 @@
           <p:cNvPr id="37" name="Group 36">
             <a:extLst>
               <a:ext uri="{FF2B5EF4-FFF2-40B4-BE49-F238E27FC236}">
-                <a16:creationId xmlns="" xmlns:a16="http://schemas.microsoft.com/office/drawing/2014/main" id="{BE0BBD66-F57B-47F1-A256-2E801CF790EE}"/>
+                <a16:creationId xmlns:a16="http://schemas.microsoft.com/office/drawing/2014/main" id="{BE0BBD66-F57B-47F1-A256-2E801CF790EE}"/>
               </a:ext>
             </a:extLst>
           </p:cNvPr>
@@ -10600,7 +10756,7 @@
             <p:cNvPr id="9" name="Rectangle 8">
               <a:extLst>
                 <a:ext uri="{FF2B5EF4-FFF2-40B4-BE49-F238E27FC236}">
-                  <a16:creationId xmlns="" xmlns:a16="http://schemas.microsoft.com/office/drawing/2014/main" id="{5D07B987-AEEC-4972-ABDB-DB884CE22CDD}"/>
+                  <a16:creationId xmlns:a16="http://schemas.microsoft.com/office/drawing/2014/main" id="{5D07B987-AEEC-4972-ABDB-DB884CE22CDD}"/>
                 </a:ext>
               </a:extLst>
             </p:cNvPr>
@@ -10694,7 +10850,7 @@
             <p:cNvPr id="10" name="Rectangle 9">
               <a:extLst>
                 <a:ext uri="{FF2B5EF4-FFF2-40B4-BE49-F238E27FC236}">
-                  <a16:creationId xmlns="" xmlns:a16="http://schemas.microsoft.com/office/drawing/2014/main" id="{A125889D-5773-436E-A6DD-2A62767BB4B3}"/>
+                  <a16:creationId xmlns:a16="http://schemas.microsoft.com/office/drawing/2014/main" id="{A125889D-5773-436E-A6DD-2A62767BB4B3}"/>
                 </a:ext>
               </a:extLst>
             </p:cNvPr>
@@ -10752,7 +10908,7 @@
             <p:cNvPr id="11" name="Rectangle 10">
               <a:extLst>
                 <a:ext uri="{FF2B5EF4-FFF2-40B4-BE49-F238E27FC236}">
-                  <a16:creationId xmlns="" xmlns:a16="http://schemas.microsoft.com/office/drawing/2014/main" id="{074BB7C8-BA1B-498B-912B-F503745B7529}"/>
+                  <a16:creationId xmlns:a16="http://schemas.microsoft.com/office/drawing/2014/main" id="{074BB7C8-BA1B-498B-912B-F503745B7529}"/>
                 </a:ext>
               </a:extLst>
             </p:cNvPr>
@@ -10814,7 +10970,7 @@
           <p:cNvPr id="12" name="Rectangle 11">
             <a:extLst>
               <a:ext uri="{FF2B5EF4-FFF2-40B4-BE49-F238E27FC236}">
-                <a16:creationId xmlns="" xmlns:a16="http://schemas.microsoft.com/office/drawing/2014/main" id="{026B383F-5B9C-4638-BBC1-A2F479508303}"/>
+                <a16:creationId xmlns:a16="http://schemas.microsoft.com/office/drawing/2014/main" id="{026B383F-5B9C-4638-BBC1-A2F479508303}"/>
               </a:ext>
             </a:extLst>
           </p:cNvPr>
@@ -10908,7 +11064,7 @@
           <p:cNvPr id="13" name="Rectangle 12">
             <a:extLst>
               <a:ext uri="{FF2B5EF4-FFF2-40B4-BE49-F238E27FC236}">
-                <a16:creationId xmlns="" xmlns:a16="http://schemas.microsoft.com/office/drawing/2014/main" id="{E29B127D-7E09-4781-BDB5-90A767E00C98}"/>
+                <a16:creationId xmlns:a16="http://schemas.microsoft.com/office/drawing/2014/main" id="{E29B127D-7E09-4781-BDB5-90A767E00C98}"/>
               </a:ext>
             </a:extLst>
           </p:cNvPr>
@@ -10966,7 +11122,7 @@
           <p:cNvPr id="14" name="Rectangle 13">
             <a:extLst>
               <a:ext uri="{FF2B5EF4-FFF2-40B4-BE49-F238E27FC236}">
-                <a16:creationId xmlns="" xmlns:a16="http://schemas.microsoft.com/office/drawing/2014/main" id="{CCE69589-B427-4799-BE70-D48BE7F25398}"/>
+                <a16:creationId xmlns:a16="http://schemas.microsoft.com/office/drawing/2014/main" id="{CCE69589-B427-4799-BE70-D48BE7F25398}"/>
               </a:ext>
             </a:extLst>
           </p:cNvPr>
@@ -11027,7 +11183,7 @@
           <p:cNvPr id="15" name="Rectangle 14">
             <a:extLst>
               <a:ext uri="{FF2B5EF4-FFF2-40B4-BE49-F238E27FC236}">
-                <a16:creationId xmlns="" xmlns:a16="http://schemas.microsoft.com/office/drawing/2014/main" id="{D47F7C10-1A1E-4538-AABB-60AFFB301F6B}"/>
+                <a16:creationId xmlns:a16="http://schemas.microsoft.com/office/drawing/2014/main" id="{D47F7C10-1A1E-4538-AABB-60AFFB301F6B}"/>
               </a:ext>
             </a:extLst>
           </p:cNvPr>
@@ -11121,7 +11277,7 @@
           <p:cNvPr id="16" name="Rectangle 15">
             <a:extLst>
               <a:ext uri="{FF2B5EF4-FFF2-40B4-BE49-F238E27FC236}">
-                <a16:creationId xmlns="" xmlns:a16="http://schemas.microsoft.com/office/drawing/2014/main" id="{C1D353A5-176D-4C83-9627-EC0759EB83BD}"/>
+                <a16:creationId xmlns:a16="http://schemas.microsoft.com/office/drawing/2014/main" id="{C1D353A5-176D-4C83-9627-EC0759EB83BD}"/>
               </a:ext>
             </a:extLst>
           </p:cNvPr>
@@ -11179,7 +11335,7 @@
           <p:cNvPr id="17" name="Rectangle 16">
             <a:extLst>
               <a:ext uri="{FF2B5EF4-FFF2-40B4-BE49-F238E27FC236}">
-                <a16:creationId xmlns="" xmlns:a16="http://schemas.microsoft.com/office/drawing/2014/main" id="{6977CD04-8355-4AED-AB00-BDCF68DEA83C}"/>
+                <a16:creationId xmlns:a16="http://schemas.microsoft.com/office/drawing/2014/main" id="{6977CD04-8355-4AED-AB00-BDCF68DEA83C}"/>
               </a:ext>
             </a:extLst>
           </p:cNvPr>
@@ -11240,7 +11396,7 @@
           <p:cNvPr id="18" name="Rectangle 17">
             <a:extLst>
               <a:ext uri="{FF2B5EF4-FFF2-40B4-BE49-F238E27FC236}">
-                <a16:creationId xmlns="" xmlns:a16="http://schemas.microsoft.com/office/drawing/2014/main" id="{9D37DB18-80BE-4AE5-8B0B-8D343DE301A3}"/>
+                <a16:creationId xmlns:a16="http://schemas.microsoft.com/office/drawing/2014/main" id="{9D37DB18-80BE-4AE5-8B0B-8D343DE301A3}"/>
               </a:ext>
             </a:extLst>
           </p:cNvPr>
@@ -11334,7 +11490,7 @@
           <p:cNvPr id="19" name="Rectangle 18">
             <a:extLst>
               <a:ext uri="{FF2B5EF4-FFF2-40B4-BE49-F238E27FC236}">
-                <a16:creationId xmlns="" xmlns:a16="http://schemas.microsoft.com/office/drawing/2014/main" id="{7923253D-4831-4C20-B2AD-30BBBDC04BA3}"/>
+                <a16:creationId xmlns:a16="http://schemas.microsoft.com/office/drawing/2014/main" id="{7923253D-4831-4C20-B2AD-30BBBDC04BA3}"/>
               </a:ext>
             </a:extLst>
           </p:cNvPr>
@@ -11392,7 +11548,7 @@
           <p:cNvPr id="20" name="Rectangle 19">
             <a:extLst>
               <a:ext uri="{FF2B5EF4-FFF2-40B4-BE49-F238E27FC236}">
-                <a16:creationId xmlns="" xmlns:a16="http://schemas.microsoft.com/office/drawing/2014/main" id="{220D86F9-604B-4200-B866-289803F88669}"/>
+                <a16:creationId xmlns:a16="http://schemas.microsoft.com/office/drawing/2014/main" id="{220D86F9-604B-4200-B866-289803F88669}"/>
               </a:ext>
             </a:extLst>
           </p:cNvPr>
@@ -11453,7 +11609,7 @@
           <p:cNvPr id="22" name="Elbow Connector 49">
             <a:extLst>
               <a:ext uri="{FF2B5EF4-FFF2-40B4-BE49-F238E27FC236}">
-                <a16:creationId xmlns="" xmlns:a16="http://schemas.microsoft.com/office/drawing/2014/main" id="{2C6DED66-DBEC-44D4-A737-8D467493F155}"/>
+                <a16:creationId xmlns:a16="http://schemas.microsoft.com/office/drawing/2014/main" id="{2C6DED66-DBEC-44D4-A737-8D467493F155}"/>
               </a:ext>
             </a:extLst>
           </p:cNvPr>
@@ -11489,7 +11645,7 @@
           <p:cNvPr id="23" name="Elbow Connector 50">
             <a:extLst>
               <a:ext uri="{FF2B5EF4-FFF2-40B4-BE49-F238E27FC236}">
-                <a16:creationId xmlns="" xmlns:a16="http://schemas.microsoft.com/office/drawing/2014/main" id="{8F13DAF0-7D26-4189-8DE2-A2837B051110}"/>
+                <a16:creationId xmlns:a16="http://schemas.microsoft.com/office/drawing/2014/main" id="{8F13DAF0-7D26-4189-8DE2-A2837B051110}"/>
               </a:ext>
             </a:extLst>
           </p:cNvPr>
@@ -11527,7 +11683,7 @@
           <p:cNvPr id="24" name="Elbow Connector 51">
             <a:extLst>
               <a:ext uri="{FF2B5EF4-FFF2-40B4-BE49-F238E27FC236}">
-                <a16:creationId xmlns="" xmlns:a16="http://schemas.microsoft.com/office/drawing/2014/main" id="{6E637B93-EB26-408C-89BE-D642D3B00145}"/>
+                <a16:creationId xmlns:a16="http://schemas.microsoft.com/office/drawing/2014/main" id="{6E637B93-EB26-408C-89BE-D642D3B00145}"/>
               </a:ext>
             </a:extLst>
           </p:cNvPr>
@@ -11565,7 +11721,7 @@
           <p:cNvPr id="25" name="Elbow Connector 52">
             <a:extLst>
               <a:ext uri="{FF2B5EF4-FFF2-40B4-BE49-F238E27FC236}">
-                <a16:creationId xmlns="" xmlns:a16="http://schemas.microsoft.com/office/drawing/2014/main" id="{9294FC26-9783-456D-803E-4CE5E4CD440A}"/>
+                <a16:creationId xmlns:a16="http://schemas.microsoft.com/office/drawing/2014/main" id="{9294FC26-9783-456D-803E-4CE5E4CD440A}"/>
               </a:ext>
             </a:extLst>
           </p:cNvPr>
@@ -11604,7 +11760,7 @@
           <p:cNvPr id="26" name="Elbow Connector 53">
             <a:extLst>
               <a:ext uri="{FF2B5EF4-FFF2-40B4-BE49-F238E27FC236}">
-                <a16:creationId xmlns="" xmlns:a16="http://schemas.microsoft.com/office/drawing/2014/main" id="{FA6044EC-3269-4E97-A41B-5263747E9A4B}"/>
+                <a16:creationId xmlns:a16="http://schemas.microsoft.com/office/drawing/2014/main" id="{FA6044EC-3269-4E97-A41B-5263747E9A4B}"/>
               </a:ext>
             </a:extLst>
           </p:cNvPr>
@@ -11644,7 +11800,7 @@
           <p:cNvPr id="27" name="Straight Arrow Connector 26">
             <a:extLst>
               <a:ext uri="{FF2B5EF4-FFF2-40B4-BE49-F238E27FC236}">
-                <a16:creationId xmlns="" xmlns:a16="http://schemas.microsoft.com/office/drawing/2014/main" id="{C25DD91D-0CED-4650-B8E1-DA021D6B70E2}"/>
+                <a16:creationId xmlns:a16="http://schemas.microsoft.com/office/drawing/2014/main" id="{C25DD91D-0CED-4650-B8E1-DA021D6B70E2}"/>
               </a:ext>
             </a:extLst>
           </p:cNvPr>
@@ -11678,7 +11834,7 @@
           <p:cNvPr id="28" name="Picture 2" descr="C:\Users\Jeffrey\AppData\Local\Microsoft\Windows\Temporary Internet Files\Content.IE5\Z5GQZJYD\MC900432569[1].png">
             <a:extLst>
               <a:ext uri="{FF2B5EF4-FFF2-40B4-BE49-F238E27FC236}">
-                <a16:creationId xmlns="" xmlns:a16="http://schemas.microsoft.com/office/drawing/2014/main" id="{32795CBB-BF68-4D46-AC8D-45D9BC7325A2}"/>
+                <a16:creationId xmlns:a16="http://schemas.microsoft.com/office/drawing/2014/main" id="{32795CBB-BF68-4D46-AC8D-45D9BC7325A2}"/>
               </a:ext>
             </a:extLst>
           </p:cNvPr>
@@ -11725,7 +11881,7 @@
           <p:cNvPr id="29" name="Straight Arrow Connector 28">
             <a:extLst>
               <a:ext uri="{FF2B5EF4-FFF2-40B4-BE49-F238E27FC236}">
-                <a16:creationId xmlns="" xmlns:a16="http://schemas.microsoft.com/office/drawing/2014/main" id="{0014674F-67A1-47ED-BD03-AB0A457876C5}"/>
+                <a16:creationId xmlns:a16="http://schemas.microsoft.com/office/drawing/2014/main" id="{0014674F-67A1-47ED-BD03-AB0A457876C5}"/>
               </a:ext>
             </a:extLst>
           </p:cNvPr>
@@ -11759,7 +11915,7 @@
           <p:cNvPr id="30" name="Rectangle 29">
             <a:extLst>
               <a:ext uri="{FF2B5EF4-FFF2-40B4-BE49-F238E27FC236}">
-                <a16:creationId xmlns="" xmlns:a16="http://schemas.microsoft.com/office/drawing/2014/main" id="{7236786F-BE5A-4B86-8AB8-693F108E4A34}"/>
+                <a16:creationId xmlns:a16="http://schemas.microsoft.com/office/drawing/2014/main" id="{7236786F-BE5A-4B86-8AB8-693F108E4A34}"/>
               </a:ext>
             </a:extLst>
           </p:cNvPr>
@@ -11840,7 +11996,7 @@
           <p:cNvPr id="32" name="Straight Arrow Connector 31">
             <a:extLst>
               <a:ext uri="{FF2B5EF4-FFF2-40B4-BE49-F238E27FC236}">
-                <a16:creationId xmlns="" xmlns:a16="http://schemas.microsoft.com/office/drawing/2014/main" id="{259B683B-5D8D-4AE7-B364-46F54F3EA1E1}"/>
+                <a16:creationId xmlns:a16="http://schemas.microsoft.com/office/drawing/2014/main" id="{259B683B-5D8D-4AE7-B364-46F54F3EA1E1}"/>
               </a:ext>
             </a:extLst>
           </p:cNvPr>
@@ -11874,7 +12030,7 @@
           <p:cNvPr id="34" name="Rectangle 33">
             <a:extLst>
               <a:ext uri="{FF2B5EF4-FFF2-40B4-BE49-F238E27FC236}">
-                <a16:creationId xmlns="" xmlns:a16="http://schemas.microsoft.com/office/drawing/2014/main" id="{52FD1AB1-4B4E-418B-B1AD-22E4B9CFF198}"/>
+                <a16:creationId xmlns:a16="http://schemas.microsoft.com/office/drawing/2014/main" id="{52FD1AB1-4B4E-418B-B1AD-22E4B9CFF198}"/>
               </a:ext>
             </a:extLst>
           </p:cNvPr>
@@ -11955,7 +12111,7 @@
           <p:cNvPr id="35" name="Title 1">
             <a:extLst>
               <a:ext uri="{FF2B5EF4-FFF2-40B4-BE49-F238E27FC236}">
-                <a16:creationId xmlns="" xmlns:a16="http://schemas.microsoft.com/office/drawing/2014/main" id="{73F0F647-AEFC-4F83-9804-37436975407D}"/>
+                <a16:creationId xmlns:a16="http://schemas.microsoft.com/office/drawing/2014/main" id="{73F0F647-AEFC-4F83-9804-37436975407D}"/>
               </a:ext>
             </a:extLst>
           </p:cNvPr>
@@ -13524,91 +13680,74 @@
           <a:lstStyle/>
           <a:p>
             <a:r>
-              <a:rPr lang="en-US" sz="2800" dirty="0" smtClean="0"/>
-              <a:t>Cluster Nodes can </a:t>
+              <a:rPr lang="en-US" sz="2800" dirty="0"/>
+              <a:t>Cluster Nodes can scale up using Scale Sets</a:t>
             </a:r>
+          </a:p>
+          <a:p>
             <a:r>
               <a:rPr lang="en-US" sz="2800" dirty="0"/>
-              <a:t>scale </a:t>
-            </a:r>
-            <a:r>
-              <a:rPr lang="en-US" sz="2800" dirty="0" smtClean="0"/>
-              <a:t>up using </a:t>
-            </a:r>
-            <a:r>
-              <a:rPr lang="en-US" sz="2800" dirty="0"/>
-              <a:t>Scale </a:t>
-            </a:r>
-            <a:r>
-              <a:rPr lang="en-US" sz="2800" dirty="0" smtClean="0"/>
-              <a:t>Sets</a:t>
-            </a:r>
-          </a:p>
-          <a:p>
-            <a:r>
-              <a:rPr lang="en-US" sz="2800" dirty="0" smtClean="0"/>
               <a:t>Cluster can scale out (or in) </a:t>
             </a:r>
           </a:p>
           <a:p>
             <a:pPr lvl="1"/>
             <a:r>
-              <a:rPr lang="en-US" sz="2600" dirty="0" smtClean="0"/>
+              <a:rPr lang="en-US" sz="2600" dirty="0"/>
               <a:t>Explicit APIs</a:t>
             </a:r>
           </a:p>
           <a:p>
             <a:pPr lvl="2"/>
             <a:r>
-              <a:rPr lang="en-US" sz="2400" dirty="0" err="1" smtClean="0">
+              <a:rPr lang="en-US" sz="2400" dirty="0" err="1">
                 <a:latin typeface="Consolas" panose="020B0609020204030204" pitchFamily="49" charset="0"/>
               </a:rPr>
               <a:t>StatelessServiceUpdateDescription</a:t>
             </a:r>
-            <a:endParaRPr lang="en-US" sz="2400" dirty="0" smtClean="0">
+            <a:endParaRPr lang="en-US" sz="2400" dirty="0">
               <a:latin typeface="Consolas" panose="020B0609020204030204" pitchFamily="49" charset="0"/>
             </a:endParaRPr>
           </a:p>
           <a:p>
             <a:pPr lvl="1"/>
             <a:r>
-              <a:rPr lang="en-US" sz="2600" dirty="0" smtClean="0"/>
+              <a:rPr lang="en-US" sz="2600" dirty="0"/>
               <a:t>By Partition</a:t>
             </a:r>
           </a:p>
           <a:p>
             <a:pPr lvl="1"/>
             <a:r>
-              <a:rPr lang="en-US" sz="2600" dirty="0" smtClean="0"/>
+              <a:rPr lang="en-US" sz="2600" dirty="0"/>
               <a:t>Built-In Health APIs, Metrics</a:t>
             </a:r>
           </a:p>
           <a:p>
             <a:pPr lvl="1"/>
             <a:r>
-              <a:rPr lang="en-US" sz="2400" dirty="0" err="1" smtClean="0"/>
+              <a:rPr lang="en-US" sz="2400" dirty="0" err="1"/>
               <a:t>Powershell</a:t>
             </a:r>
             <a:r>
-              <a:rPr lang="en-US" sz="2400" dirty="0" smtClean="0"/>
+              <a:rPr lang="en-US" sz="2400" dirty="0"/>
               <a:t>/</a:t>
             </a:r>
             <a:r>
-              <a:rPr lang="en-US" sz="2400" dirty="0" err="1" smtClean="0"/>
+              <a:rPr lang="en-US" sz="2400" dirty="0" err="1"/>
               <a:t>Az</a:t>
             </a:r>
             <a:r>
-              <a:rPr lang="en-US" sz="2400" dirty="0" smtClean="0"/>
+              <a:rPr lang="en-US" sz="2400" dirty="0"/>
               <a:t> CLI</a:t>
             </a:r>
           </a:p>
           <a:p>
             <a:pPr lvl="1"/>
             <a:r>
-              <a:rPr lang="en-US" sz="2600" dirty="0" smtClean="0"/>
+              <a:rPr lang="en-US" sz="2600" dirty="0"/>
               <a:t>Scale out happens without any downtime!</a:t>
             </a:r>
-            <a:endParaRPr lang="en-US" sz="2600" dirty="0"/>
           </a:p>
         </p:txBody>
       </p:sp>
@@ -13617,7 +13756,7 @@
           <p:cNvPr id="4" name="Title 1">
             <a:extLst>
               <a:ext uri="{FF2B5EF4-FFF2-40B4-BE49-F238E27FC236}">
-                <a16:creationId xmlns="" xmlns:a16="http://schemas.microsoft.com/office/drawing/2014/main" id="{A9D05708-0C66-43A6-A64C-AC344CB0EBBB}"/>
+                <a16:creationId xmlns:a16="http://schemas.microsoft.com/office/drawing/2014/main" id="{A9D05708-0C66-43A6-A64C-AC344CB0EBBB}"/>
               </a:ext>
             </a:extLst>
           </p:cNvPr>
@@ -13737,13 +13876,6 @@
   <p:clrMapOvr>
     <a:masterClrMapping/>
   </p:clrMapOvr>
-  <p:timing>
-    <p:tnLst>
-      <p:par>
-        <p:cTn id="1" dur="indefinite" restart="never" nodeType="tmRoot"/>
-      </p:par>
-    </p:tnLst>
-  </p:timing>
 </p:sld>
 </file>
 
@@ -13841,7 +13973,7 @@
           <p:cNvPr id="4" name="Picture 3">
             <a:extLst>
               <a:ext uri="{FF2B5EF4-FFF2-40B4-BE49-F238E27FC236}">
-                <a16:creationId xmlns="" xmlns:a16="http://schemas.microsoft.com/office/drawing/2014/main" id="{37F90D48-72CA-4E10-9E7F-AB990CD858AC}"/>
+                <a16:creationId xmlns:a16="http://schemas.microsoft.com/office/drawing/2014/main" id="{37F90D48-72CA-4E10-9E7F-AB990CD858AC}"/>
               </a:ext>
             </a:extLst>
           </p:cNvPr>
@@ -13871,7 +14003,7 @@
           <p:cNvPr id="5" name="Picture 4">
             <a:extLst>
               <a:ext uri="{FF2B5EF4-FFF2-40B4-BE49-F238E27FC236}">
-                <a16:creationId xmlns="" xmlns:a16="http://schemas.microsoft.com/office/drawing/2014/main" id="{D39074E0-6C20-45E6-B39D-6A61D370FB10}"/>
+                <a16:creationId xmlns:a16="http://schemas.microsoft.com/office/drawing/2014/main" id="{D39074E0-6C20-45E6-B39D-6A61D370FB10}"/>
               </a:ext>
             </a:extLst>
           </p:cNvPr>
@@ -13901,7 +14033,7 @@
           <p:cNvPr id="6" name="Rectangle 5">
             <a:extLst>
               <a:ext uri="{FF2B5EF4-FFF2-40B4-BE49-F238E27FC236}">
-                <a16:creationId xmlns="" xmlns:a16="http://schemas.microsoft.com/office/drawing/2014/main" id="{5C0942F3-DE68-4ED2-A5C7-036F509F0402}"/>
+                <a16:creationId xmlns:a16="http://schemas.microsoft.com/office/drawing/2014/main" id="{5C0942F3-DE68-4ED2-A5C7-036F509F0402}"/>
               </a:ext>
             </a:extLst>
           </p:cNvPr>
@@ -14200,17 +14332,16 @@
           <a:lstStyle/>
           <a:p>
             <a:r>
-              <a:rPr lang="en-US" sz="2800" dirty="0" smtClean="0"/>
+              <a:rPr lang="en-US" sz="2800" dirty="0"/>
               <a:t>HTTP</a:t>
             </a:r>
           </a:p>
           <a:p>
             <a:pPr lvl="1"/>
             <a:r>
-              <a:rPr lang="en-US" sz="2600" dirty="0" smtClean="0"/>
+              <a:rPr lang="en-US" sz="2600" dirty="0"/>
               <a:t>Reverse Proxy</a:t>
             </a:r>
-            <a:endParaRPr lang="en-US" sz="2600" dirty="0"/>
           </a:p>
           <a:p>
             <a:r>
@@ -14324,7 +14455,7 @@
           <p:cNvPr id="8" name="Picture 7">
             <a:extLst>
               <a:ext uri="{FF2B5EF4-FFF2-40B4-BE49-F238E27FC236}">
-                <a16:creationId xmlns="" xmlns:a16="http://schemas.microsoft.com/office/drawing/2014/main" id="{B008DBE5-4631-43A4-A60E-76C945B18E36}"/>
+                <a16:creationId xmlns:a16="http://schemas.microsoft.com/office/drawing/2014/main" id="{B008DBE5-4631-43A4-A60E-76C945B18E36}"/>
               </a:ext>
             </a:extLst>
           </p:cNvPr>
@@ -14351,10 +14482,10 @@
       </p:pic>
       <p:pic>
         <p:nvPicPr>
-          <p:cNvPr id="6" name="Picture 5">
+          <p:cNvPr id="4" name="Picture 3">
             <a:extLst>
               <a:ext uri="{FF2B5EF4-FFF2-40B4-BE49-F238E27FC236}">
-                <a16:creationId xmlns="" xmlns:a16="http://schemas.microsoft.com/office/drawing/2014/main" id="{18D17AEB-94DC-44EA-8168-A590DF393244}"/>
+                <a16:creationId xmlns:a16="http://schemas.microsoft.com/office/drawing/2014/main" id="{ED6616A7-D212-4C5F-B8C6-FBB6546A9083}"/>
               </a:ext>
             </a:extLst>
           </p:cNvPr>
@@ -14371,8 +14502,8 @@
         </p:blipFill>
         <p:spPr>
           <a:xfrm>
-            <a:off x="3852902" y="1992029"/>
-            <a:ext cx="8215051" cy="4675500"/>
+            <a:off x="3895503" y="2056678"/>
+            <a:ext cx="8172450" cy="4667250"/>
           </a:xfrm>
           <a:prstGeom prst="rect">
             <a:avLst/>
@@ -14389,135 +14520,6 @@
   <p:clrMapOvr>
     <a:masterClrMapping/>
   </p:clrMapOvr>
-  <p:timing>
-    <p:tnLst>
-      <p:par>
-        <p:cTn id="1" dur="indefinite" restart="never" nodeType="tmRoot">
-          <p:childTnLst>
-            <p:seq concurrent="1" nextAc="seek">
-              <p:cTn id="2" dur="indefinite" nodeType="mainSeq">
-                <p:childTnLst>
-                  <p:par>
-                    <p:cTn id="3" fill="hold">
-                      <p:stCondLst>
-                        <p:cond delay="indefinite"/>
-                      </p:stCondLst>
-                      <p:childTnLst>
-                        <p:par>
-                          <p:cTn id="4" fill="hold">
-                            <p:stCondLst>
-                              <p:cond delay="0"/>
-                            </p:stCondLst>
-                            <p:childTnLst>
-                              <p:par>
-                                <p:cTn id="5" presetID="53" presetClass="entr" presetSubtype="16" fill="hold" nodeType="clickEffect">
-                                  <p:stCondLst>
-                                    <p:cond delay="0"/>
-                                  </p:stCondLst>
-                                  <p:childTnLst>
-                                    <p:set>
-                                      <p:cBhvr>
-                                        <p:cTn id="6" dur="1" fill="hold">
-                                          <p:stCondLst>
-                                            <p:cond delay="0"/>
-                                          </p:stCondLst>
-                                        </p:cTn>
-                                        <p:tgtEl>
-                                          <p:spTgt spid="6"/>
-                                        </p:tgtEl>
-                                        <p:attrNameLst>
-                                          <p:attrName>style.visibility</p:attrName>
-                                        </p:attrNameLst>
-                                      </p:cBhvr>
-                                      <p:to>
-                                        <p:strVal val="visible"/>
-                                      </p:to>
-                                    </p:set>
-                                    <p:anim calcmode="lin" valueType="num">
-                                      <p:cBhvr>
-                                        <p:cTn id="7" dur="500" fill="hold"/>
-                                        <p:tgtEl>
-                                          <p:spTgt spid="6"/>
-                                        </p:tgtEl>
-                                        <p:attrNameLst>
-                                          <p:attrName>ppt_w</p:attrName>
-                                        </p:attrNameLst>
-                                      </p:cBhvr>
-                                      <p:tavLst>
-                                        <p:tav tm="0">
-                                          <p:val>
-                                            <p:fltVal val="0"/>
-                                          </p:val>
-                                        </p:tav>
-                                        <p:tav tm="100000">
-                                          <p:val>
-                                            <p:strVal val="#ppt_w"/>
-                                          </p:val>
-                                        </p:tav>
-                                      </p:tavLst>
-                                    </p:anim>
-                                    <p:anim calcmode="lin" valueType="num">
-                                      <p:cBhvr>
-                                        <p:cTn id="8" dur="500" fill="hold"/>
-                                        <p:tgtEl>
-                                          <p:spTgt spid="6"/>
-                                        </p:tgtEl>
-                                        <p:attrNameLst>
-                                          <p:attrName>ppt_h</p:attrName>
-                                        </p:attrNameLst>
-                                      </p:cBhvr>
-                                      <p:tavLst>
-                                        <p:tav tm="0">
-                                          <p:val>
-                                            <p:fltVal val="0"/>
-                                          </p:val>
-                                        </p:tav>
-                                        <p:tav tm="100000">
-                                          <p:val>
-                                            <p:strVal val="#ppt_h"/>
-                                          </p:val>
-                                        </p:tav>
-                                      </p:tavLst>
-                                    </p:anim>
-                                    <p:animEffect transition="in" filter="fade">
-                                      <p:cBhvr>
-                                        <p:cTn id="9" dur="500"/>
-                                        <p:tgtEl>
-                                          <p:spTgt spid="6"/>
-                                        </p:tgtEl>
-                                      </p:cBhvr>
-                                    </p:animEffect>
-                                  </p:childTnLst>
-                                </p:cTn>
-                              </p:par>
-                            </p:childTnLst>
-                          </p:cTn>
-                        </p:par>
-                      </p:childTnLst>
-                    </p:cTn>
-                  </p:par>
-                </p:childTnLst>
-              </p:cTn>
-              <p:prevCondLst>
-                <p:cond evt="onPrev" delay="0">
-                  <p:tgtEl>
-                    <p:sldTgt/>
-                  </p:tgtEl>
-                </p:cond>
-              </p:prevCondLst>
-              <p:nextCondLst>
-                <p:cond evt="onNext" delay="0">
-                  <p:tgtEl>
-                    <p:sldTgt/>
-                  </p:tgtEl>
-                </p:cond>
-              </p:nextCondLst>
-            </p:seq>
-          </p:childTnLst>
-        </p:cTn>
-      </p:par>
-    </p:tnLst>
-  </p:timing>
 </p:sld>
 </file>
 
@@ -14543,7 +14545,7 @@
           <p:cNvPr id="5" name="Title 1">
             <a:extLst>
               <a:ext uri="{FF2B5EF4-FFF2-40B4-BE49-F238E27FC236}">
-                <a16:creationId xmlns="" xmlns:a16="http://schemas.microsoft.com/office/drawing/2014/main" id="{FC17E063-BA3B-49F0-B426-C6EDE2CF67C6}"/>
+                <a16:creationId xmlns:a16="http://schemas.microsoft.com/office/drawing/2014/main" id="{FC17E063-BA3B-49F0-B426-C6EDE2CF67C6}"/>
               </a:ext>
             </a:extLst>
           </p:cNvPr>
@@ -14658,7 +14660,7 @@
           <p:cNvPr id="1026" name="Picture 2" descr="Image result for application insights">
             <a:extLst>
               <a:ext uri="{FF2B5EF4-FFF2-40B4-BE49-F238E27FC236}">
-                <a16:creationId xmlns="" xmlns:a16="http://schemas.microsoft.com/office/drawing/2014/main" id="{B8EB8CA7-25F0-4870-BE32-EEBDE4D4DC6E}"/>
+                <a16:creationId xmlns:a16="http://schemas.microsoft.com/office/drawing/2014/main" id="{B8EB8CA7-25F0-4870-BE32-EEBDE4D4DC6E}"/>
               </a:ext>
             </a:extLst>
           </p:cNvPr>
@@ -14705,7 +14707,7 @@
           <p:cNvPr id="1028" name="Picture 4" descr="Image result for azure monitor logo">
             <a:extLst>
               <a:ext uri="{FF2B5EF4-FFF2-40B4-BE49-F238E27FC236}">
-                <a16:creationId xmlns="" xmlns:a16="http://schemas.microsoft.com/office/drawing/2014/main" id="{94E239B8-CC2C-437B-B944-A7D5B7B1AE98}"/>
+                <a16:creationId xmlns:a16="http://schemas.microsoft.com/office/drawing/2014/main" id="{94E239B8-CC2C-437B-B944-A7D5B7B1AE98}"/>
               </a:ext>
             </a:extLst>
           </p:cNvPr>
@@ -14752,7 +14754,7 @@
           <p:cNvPr id="12" name="Content Placeholder 2">
             <a:extLst>
               <a:ext uri="{FF2B5EF4-FFF2-40B4-BE49-F238E27FC236}">
-                <a16:creationId xmlns="" xmlns:a16="http://schemas.microsoft.com/office/drawing/2014/main" id="{250B2F7B-7E5C-40A0-A84B-3FABEE7E41A6}"/>
+                <a16:creationId xmlns:a16="http://schemas.microsoft.com/office/drawing/2014/main" id="{250B2F7B-7E5C-40A0-A84B-3FABEE7E41A6}"/>
               </a:ext>
             </a:extLst>
           </p:cNvPr>
@@ -15007,7 +15009,7 @@
           <p:cNvPr id="13" name="Content Placeholder 2">
             <a:extLst>
               <a:ext uri="{FF2B5EF4-FFF2-40B4-BE49-F238E27FC236}">
-                <a16:creationId xmlns="" xmlns:a16="http://schemas.microsoft.com/office/drawing/2014/main" id="{BCD4CD32-4FB7-4451-9A84-0004B8B5DB29}"/>
+                <a16:creationId xmlns:a16="http://schemas.microsoft.com/office/drawing/2014/main" id="{BCD4CD32-4FB7-4451-9A84-0004B8B5DB29}"/>
               </a:ext>
             </a:extLst>
           </p:cNvPr>
@@ -15258,7 +15260,7 @@
           <p:cNvPr id="16" name="Picture 15">
             <a:extLst>
               <a:ext uri="{FF2B5EF4-FFF2-40B4-BE49-F238E27FC236}">
-                <a16:creationId xmlns="" xmlns:a16="http://schemas.microsoft.com/office/drawing/2014/main" id="{5972141D-CFAD-494B-BBE4-0E1D11D272CF}"/>
+                <a16:creationId xmlns:a16="http://schemas.microsoft.com/office/drawing/2014/main" id="{5972141D-CFAD-494B-BBE4-0E1D11D272CF}"/>
               </a:ext>
             </a:extLst>
           </p:cNvPr>
@@ -15288,7 +15290,7 @@
           <p:cNvPr id="21" name="Picture 20">
             <a:extLst>
               <a:ext uri="{FF2B5EF4-FFF2-40B4-BE49-F238E27FC236}">
-                <a16:creationId xmlns="" xmlns:a16="http://schemas.microsoft.com/office/drawing/2014/main" id="{254D13DD-56A7-4258-9903-3FD805E4E023}"/>
+                <a16:creationId xmlns:a16="http://schemas.microsoft.com/office/drawing/2014/main" id="{254D13DD-56A7-4258-9903-3FD805E4E023}"/>
               </a:ext>
             </a:extLst>
           </p:cNvPr>
@@ -15318,7 +15320,7 @@
           <p:cNvPr id="3" name="Rectangle 2">
             <a:extLst>
               <a:ext uri="{FF2B5EF4-FFF2-40B4-BE49-F238E27FC236}">
-                <a16:creationId xmlns="" xmlns:a16="http://schemas.microsoft.com/office/drawing/2014/main" id="{868638E3-0E05-412F-B8BF-B650C214117F}"/>
+                <a16:creationId xmlns:a16="http://schemas.microsoft.com/office/drawing/2014/main" id="{868638E3-0E05-412F-B8BF-B650C214117F}"/>
               </a:ext>
             </a:extLst>
           </p:cNvPr>
@@ -15577,7 +15579,7 @@
           <p:cNvPr id="4" name="Picture 3">
             <a:extLst>
               <a:ext uri="{FF2B5EF4-FFF2-40B4-BE49-F238E27FC236}">
-                <a16:creationId xmlns="" xmlns:a16="http://schemas.microsoft.com/office/drawing/2014/main" id="{6CD9C49E-B5E0-4D84-BCAF-A0FBE46DC98D}"/>
+                <a16:creationId xmlns:a16="http://schemas.microsoft.com/office/drawing/2014/main" id="{6CD9C49E-B5E0-4D84-BCAF-A0FBE46DC98D}"/>
               </a:ext>
             </a:extLst>
           </p:cNvPr>
@@ -15607,7 +15609,7 @@
           <p:cNvPr id="6" name="Title 1">
             <a:extLst>
               <a:ext uri="{FF2B5EF4-FFF2-40B4-BE49-F238E27FC236}">
-                <a16:creationId xmlns="" xmlns:a16="http://schemas.microsoft.com/office/drawing/2014/main" id="{405AAB47-FE95-4671-A2F6-33C0DB441C4C}"/>
+                <a16:creationId xmlns:a16="http://schemas.microsoft.com/office/drawing/2014/main" id="{405AAB47-FE95-4671-A2F6-33C0DB441C4C}"/>
               </a:ext>
             </a:extLst>
           </p:cNvPr>
@@ -15945,13 +15947,6 @@
   <p:clrMapOvr>
     <a:masterClrMapping/>
   </p:clrMapOvr>
-  <p:timing>
-    <p:tnLst>
-      <p:par>
-        <p:cTn id="1" dur="indefinite" restart="never" nodeType="tmRoot"/>
-      </p:par>
-    </p:tnLst>
-  </p:timing>
 </p:sld>
 </file>
 
@@ -15974,22 +15969,115 @@
       </p:grpSpPr>
       <p:sp>
         <p:nvSpPr>
-          <p:cNvPr id="2" name="Title 1"/>
-          <p:cNvSpPr>
-            <a:spLocks noGrp="1"/>
+          <p:cNvPr id="3" name="Title 1">
+            <a:extLst>
+              <a:ext uri="{FF2B5EF4-FFF2-40B4-BE49-F238E27FC236}">
+                <a16:creationId xmlns:a16="http://schemas.microsoft.com/office/drawing/2014/main" id="{EE0BD9B9-E2B9-454C-A7B9-916498084D9B}"/>
+              </a:ext>
+            </a:extLst>
+          </p:cNvPr>
+          <p:cNvSpPr txBox="1">
+            <a:spLocks/>
           </p:cNvSpPr>
-          <p:nvPr>
-            <p:ph type="title"/>
-          </p:nvPr>
+          <p:nvPr/>
         </p:nvSpPr>
-        <p:spPr/>
+        <p:spPr>
+          <a:xfrm>
+            <a:off x="685801" y="364014"/>
+            <a:ext cx="10131425" cy="1268545"/>
+          </a:xfrm>
+          <a:prstGeom prst="rect">
+            <a:avLst/>
+          </a:prstGeom>
+          <a:effectLst/>
+        </p:spPr>
         <p:txBody>
-          <a:bodyPr/>
-          <a:lstStyle/>
+          <a:bodyPr vert="horz" lIns="91440" tIns="45720" rIns="91440" bIns="45720" rtlCol="0" anchor="ctr">
+            <a:normAutofit/>
+          </a:bodyPr>
+          <a:lstStyle>
+            <a:lvl1pPr algn="l" defTabSz="457200" rtl="0" eaLnBrk="1" latinLnBrk="0" hangingPunct="1">
+              <a:spcBef>
+                <a:spcPct val="0"/>
+              </a:spcBef>
+              <a:buNone/>
+              <a:defRPr sz="3600" kern="1200" cap="all">
+                <a:ln w="3175" cmpd="sng">
+                  <a:noFill/>
+                </a:ln>
+                <a:solidFill>
+                  <a:schemeClr val="tx1"/>
+                </a:solidFill>
+                <a:effectLst/>
+                <a:latin typeface="+mj-lt"/>
+                <a:ea typeface="+mj-ea"/>
+                <a:cs typeface="+mj-cs"/>
+              </a:defRPr>
+            </a:lvl1pPr>
+            <a:lvl2pPr eaLnBrk="1" hangingPunct="1">
+              <a:defRPr>
+                <a:solidFill>
+                  <a:schemeClr val="tx2"/>
+                </a:solidFill>
+              </a:defRPr>
+            </a:lvl2pPr>
+            <a:lvl3pPr eaLnBrk="1" hangingPunct="1">
+              <a:defRPr>
+                <a:solidFill>
+                  <a:schemeClr val="tx2"/>
+                </a:solidFill>
+              </a:defRPr>
+            </a:lvl3pPr>
+            <a:lvl4pPr eaLnBrk="1" hangingPunct="1">
+              <a:defRPr>
+                <a:solidFill>
+                  <a:schemeClr val="tx2"/>
+                </a:solidFill>
+              </a:defRPr>
+            </a:lvl4pPr>
+            <a:lvl5pPr eaLnBrk="1" hangingPunct="1">
+              <a:defRPr>
+                <a:solidFill>
+                  <a:schemeClr val="tx2"/>
+                </a:solidFill>
+              </a:defRPr>
+            </a:lvl5pPr>
+            <a:lvl6pPr eaLnBrk="1" hangingPunct="1">
+              <a:defRPr>
+                <a:solidFill>
+                  <a:schemeClr val="tx2"/>
+                </a:solidFill>
+              </a:defRPr>
+            </a:lvl6pPr>
+            <a:lvl7pPr eaLnBrk="1" hangingPunct="1">
+              <a:defRPr>
+                <a:solidFill>
+                  <a:schemeClr val="tx2"/>
+                </a:solidFill>
+              </a:defRPr>
+            </a:lvl7pPr>
+            <a:lvl8pPr eaLnBrk="1" hangingPunct="1">
+              <a:defRPr>
+                <a:solidFill>
+                  <a:schemeClr val="tx2"/>
+                </a:solidFill>
+              </a:defRPr>
+            </a:lvl8pPr>
+            <a:lvl9pPr eaLnBrk="1" hangingPunct="1">
+              <a:defRPr>
+                <a:solidFill>
+                  <a:schemeClr val="tx2"/>
+                </a:solidFill>
+              </a:defRPr>
+            </a:lvl9pPr>
+          </a:lstStyle>
           <a:p>
             <a:r>
-              <a:rPr lang="en-US" dirty="0"/>
-              <a:t>demo</a:t>
+              <a:rPr lang="en-US" dirty="0">
+                <a:latin typeface="Segoe UI Light" panose="020B0502040204020203" pitchFamily="34" charset="0"/>
+                <a:cs typeface="Segoe UI Light" panose="020B0502040204020203" pitchFamily="34" charset="0"/>
+              </a:rPr>
+              <a:t>Demo</a:t>
             </a:r>
           </a:p>
         </p:txBody>
@@ -16026,28 +16114,6 @@
       </p:grpSpPr>
       <p:sp>
         <p:nvSpPr>
-          <p:cNvPr id="2" name="Title 1"/>
-          <p:cNvSpPr>
-            <a:spLocks noGrp="1"/>
-          </p:cNvSpPr>
-          <p:nvPr>
-            <p:ph type="title"/>
-          </p:nvPr>
-        </p:nvSpPr>
-        <p:spPr/>
-        <p:txBody>
-          <a:bodyPr/>
-          <a:lstStyle/>
-          <a:p>
-            <a:r>
-              <a:rPr lang="en-US" dirty="0"/>
-              <a:t>In review</a:t>
-            </a:r>
-          </a:p>
-        </p:txBody>
-      </p:sp>
-      <p:sp>
-        <p:nvSpPr>
           <p:cNvPr id="3" name="Content Placeholder 2"/>
           <p:cNvSpPr>
             <a:spLocks noGrp="1"/>
@@ -16056,7 +16122,12 @@
             <p:ph idx="1"/>
           </p:nvPr>
         </p:nvSpPr>
-        <p:spPr/>
+        <p:spPr>
+          <a:xfrm>
+            <a:off x="685800" y="2046374"/>
+            <a:ext cx="10131425" cy="3649133"/>
+          </a:xfrm>
+        </p:spPr>
         <p:txBody>
           <a:bodyPr/>
           <a:lstStyle/>
@@ -16107,6 +16178,121 @@
           </a:p>
           <a:p>
             <a:endParaRPr lang="en-US" dirty="0"/>
+          </a:p>
+        </p:txBody>
+      </p:sp>
+      <p:sp>
+        <p:nvSpPr>
+          <p:cNvPr id="4" name="Title 1">
+            <a:extLst>
+              <a:ext uri="{FF2B5EF4-FFF2-40B4-BE49-F238E27FC236}">
+                <a16:creationId xmlns:a16="http://schemas.microsoft.com/office/drawing/2014/main" id="{7C842BB2-2D0F-49A9-91E4-CC43C00B3712}"/>
+              </a:ext>
+            </a:extLst>
+          </p:cNvPr>
+          <p:cNvSpPr txBox="1">
+            <a:spLocks/>
+          </p:cNvSpPr>
+          <p:nvPr/>
+        </p:nvSpPr>
+        <p:spPr>
+          <a:xfrm>
+            <a:off x="685801" y="364014"/>
+            <a:ext cx="10131425" cy="1268545"/>
+          </a:xfrm>
+          <a:prstGeom prst="rect">
+            <a:avLst/>
+          </a:prstGeom>
+          <a:effectLst/>
+        </p:spPr>
+        <p:txBody>
+          <a:bodyPr vert="horz" lIns="91440" tIns="45720" rIns="91440" bIns="45720" rtlCol="0" anchor="ctr">
+            <a:normAutofit/>
+          </a:bodyPr>
+          <a:lstStyle>
+            <a:lvl1pPr algn="l" defTabSz="457200" rtl="0" eaLnBrk="1" latinLnBrk="0" hangingPunct="1">
+              <a:spcBef>
+                <a:spcPct val="0"/>
+              </a:spcBef>
+              <a:buNone/>
+              <a:defRPr sz="3600" kern="1200" cap="all">
+                <a:ln w="3175" cmpd="sng">
+                  <a:noFill/>
+                </a:ln>
+                <a:solidFill>
+                  <a:schemeClr val="tx1"/>
+                </a:solidFill>
+                <a:effectLst/>
+                <a:latin typeface="+mj-lt"/>
+                <a:ea typeface="+mj-ea"/>
+                <a:cs typeface="+mj-cs"/>
+              </a:defRPr>
+            </a:lvl1pPr>
+            <a:lvl2pPr eaLnBrk="1" hangingPunct="1">
+              <a:defRPr>
+                <a:solidFill>
+                  <a:schemeClr val="tx2"/>
+                </a:solidFill>
+              </a:defRPr>
+            </a:lvl2pPr>
+            <a:lvl3pPr eaLnBrk="1" hangingPunct="1">
+              <a:defRPr>
+                <a:solidFill>
+                  <a:schemeClr val="tx2"/>
+                </a:solidFill>
+              </a:defRPr>
+            </a:lvl3pPr>
+            <a:lvl4pPr eaLnBrk="1" hangingPunct="1">
+              <a:defRPr>
+                <a:solidFill>
+                  <a:schemeClr val="tx2"/>
+                </a:solidFill>
+              </a:defRPr>
+            </a:lvl4pPr>
+            <a:lvl5pPr eaLnBrk="1" hangingPunct="1">
+              <a:defRPr>
+                <a:solidFill>
+                  <a:schemeClr val="tx2"/>
+                </a:solidFill>
+              </a:defRPr>
+            </a:lvl5pPr>
+            <a:lvl6pPr eaLnBrk="1" hangingPunct="1">
+              <a:defRPr>
+                <a:solidFill>
+                  <a:schemeClr val="tx2"/>
+                </a:solidFill>
+              </a:defRPr>
+            </a:lvl6pPr>
+            <a:lvl7pPr eaLnBrk="1" hangingPunct="1">
+              <a:defRPr>
+                <a:solidFill>
+                  <a:schemeClr val="tx2"/>
+                </a:solidFill>
+              </a:defRPr>
+            </a:lvl7pPr>
+            <a:lvl8pPr eaLnBrk="1" hangingPunct="1">
+              <a:defRPr>
+                <a:solidFill>
+                  <a:schemeClr val="tx2"/>
+                </a:solidFill>
+              </a:defRPr>
+            </a:lvl8pPr>
+            <a:lvl9pPr eaLnBrk="1" hangingPunct="1">
+              <a:defRPr>
+                <a:solidFill>
+                  <a:schemeClr val="tx2"/>
+                </a:solidFill>
+              </a:defRPr>
+            </a:lvl9pPr>
+          </a:lstStyle>
+          <a:p>
+            <a:r>
+              <a:rPr lang="en-US" dirty="0">
+                <a:latin typeface="Segoe UI Light" panose="020B0502040204020203" pitchFamily="34" charset="0"/>
+                <a:cs typeface="Segoe UI Light" panose="020B0502040204020203" pitchFamily="34" charset="0"/>
+              </a:rPr>
+              <a:t>In review</a:t>
+            </a:r>
           </a:p>
         </p:txBody>
       </p:sp>
@@ -16142,29 +16328,6 @@
       </p:grpSpPr>
       <p:sp>
         <p:nvSpPr>
-          <p:cNvPr id="2" name="Title 1"/>
-          <p:cNvSpPr>
-            <a:spLocks noGrp="1"/>
-          </p:cNvSpPr>
-          <p:nvPr>
-            <p:ph type="title"/>
-          </p:nvPr>
-        </p:nvSpPr>
-        <p:spPr/>
-        <p:txBody>
-          <a:bodyPr/>
-          <a:lstStyle/>
-          <a:p>
-            <a:r>
-              <a:rPr lang="en-US" dirty="0" smtClean="0"/>
-              <a:t>Resources…Questions?</a:t>
-            </a:r>
-            <a:endParaRPr lang="en-US" dirty="0"/>
-          </a:p>
-        </p:txBody>
-      </p:sp>
-      <p:sp>
-        <p:nvSpPr>
           <p:cNvPr id="3" name="Content Placeholder 2"/>
           <p:cNvSpPr>
             <a:spLocks noGrp="1"/>
@@ -16175,30 +16338,13 @@
         </p:nvSpPr>
         <p:spPr>
           <a:xfrm>
-            <a:off x="685801" y="1679713"/>
-            <a:ext cx="10776097" cy="4939748"/>
+            <a:off x="685801" y="1330147"/>
+            <a:ext cx="10776097" cy="4631173"/>
           </a:xfrm>
         </p:spPr>
         <p:txBody>
           <a:bodyPr/>
           <a:lstStyle/>
-          <a:p>
-            <a:endParaRPr lang="en-US" dirty="0" smtClean="0">
-              <a:solidFill>
-                <a:schemeClr val="accent2">
-                  <a:lumMod val="40000"/>
-                  <a:lumOff val="60000"/>
-                </a:schemeClr>
-              </a:solidFill>
-              <a:hlinkClick r:id="rId2">
-                <a:extLst>
-                  <a:ext uri="{A12FA001-AC4F-418D-AE19-62706E023703}">
-                    <ahyp:hlinkClr xmlns="" xmlns:ahyp="http://schemas.microsoft.com/office/drawing/2018/hyperlinkcolor" val="tx"/>
-                  </a:ext>
-                </a:extLst>
-              </a:hlinkClick>
-            </a:endParaRPr>
-          </a:p>
           <a:p>
             <a:endParaRPr lang="en-US" dirty="0">
               <a:solidFill>
@@ -16210,7 +16356,7 @@
               <a:hlinkClick r:id="rId2">
                 <a:extLst>
                   <a:ext uri="{A12FA001-AC4F-418D-AE19-62706E023703}">
-                    <ahyp:hlinkClr xmlns="" xmlns:ahyp="http://schemas.microsoft.com/office/drawing/2018/hyperlinkcolor" val="tx"/>
+                    <ahyp:hlinkClr xmlns:ahyp="http://schemas.microsoft.com/office/drawing/2018/hyperlinkcolor" val="tx"/>
                   </a:ext>
                 </a:extLst>
               </a:hlinkClick>
@@ -16218,7 +16364,7 @@
           </a:p>
           <a:p>
             <a:r>
-              <a:rPr lang="en-US" dirty="0" smtClean="0">
+              <a:rPr lang="en-US" dirty="0">
                 <a:solidFill>
                   <a:schemeClr val="accent2">
                     <a:lumMod val="40000"/>
@@ -16228,30 +16374,12 @@
                 <a:hlinkClick r:id="rId2">
                   <a:extLst>
                     <a:ext uri="{A12FA001-AC4F-418D-AE19-62706E023703}">
-                      <ahyp:hlinkClr xmlns="" xmlns:ahyp="http://schemas.microsoft.com/office/drawing/2018/hyperlinkcolor" val="tx"/>
+                      <ahyp:hlinkClr xmlns:ahyp="http://schemas.microsoft.com/office/drawing/2018/hyperlinkcolor" val="tx"/>
                     </a:ext>
                   </a:extLst>
                 </a:hlinkClick>
               </a:rPr>
-              <a:t>https</a:t>
-            </a:r>
-            <a:r>
-              <a:rPr lang="en-US" dirty="0">
-                <a:solidFill>
-                  <a:schemeClr val="accent2">
-                    <a:lumMod val="40000"/>
-                    <a:lumOff val="60000"/>
-                  </a:schemeClr>
-                </a:solidFill>
-                <a:hlinkClick r:id="rId2">
-                  <a:extLst>
-                    <a:ext uri="{A12FA001-AC4F-418D-AE19-62706E023703}">
-                      <ahyp:hlinkClr xmlns="" xmlns:ahyp="http://schemas.microsoft.com/office/drawing/2018/hyperlinkcolor" val="tx"/>
-                    </a:ext>
-                  </a:extLst>
-                </a:hlinkClick>
-              </a:rPr>
-              <a:t>://github.com/javierdpt/conferece-tracker</a:t>
+              <a:t>https://github.com/javierdpt/conferece-tracker</a:t>
             </a:r>
             <a:endParaRPr lang="en-US" dirty="0">
               <a:solidFill>
@@ -16263,7 +16391,7 @@
               <a:hlinkClick r:id="rId3">
                 <a:extLst>
                   <a:ext uri="{A12FA001-AC4F-418D-AE19-62706E023703}">
-                    <ahyp:hlinkClr xmlns="" xmlns:ahyp="http://schemas.microsoft.com/office/drawing/2018/hyperlinkcolor" val="tx"/>
+                    <ahyp:hlinkClr xmlns:ahyp="http://schemas.microsoft.com/office/drawing/2018/hyperlinkcolor" val="tx"/>
                   </a:ext>
                 </a:extLst>
               </a:hlinkClick>
@@ -16281,7 +16409,7 @@
                 <a:hlinkClick r:id="rId3">
                   <a:extLst>
                     <a:ext uri="{A12FA001-AC4F-418D-AE19-62706E023703}">
-                      <ahyp:hlinkClr xmlns="" xmlns:ahyp="http://schemas.microsoft.com/office/drawing/2018/hyperlinkcolor" val="tx"/>
+                      <ahyp:hlinkClr xmlns:ahyp="http://schemas.microsoft.com/office/drawing/2018/hyperlinkcolor" val="tx"/>
                     </a:ext>
                   </a:extLst>
                 </a:hlinkClick>
@@ -16309,7 +16437,7 @@
                 <a:hlinkClick r:id="rId4">
                   <a:extLst>
                     <a:ext uri="{A12FA001-AC4F-418D-AE19-62706E023703}">
-                      <ahyp:hlinkClr xmlns="" xmlns:ahyp="http://schemas.microsoft.com/office/drawing/2018/hyperlinkcolor" val="tx"/>
+                      <ahyp:hlinkClr xmlns:ahyp="http://schemas.microsoft.com/office/drawing/2018/hyperlinkcolor" val="tx"/>
                     </a:ext>
                   </a:extLst>
                 </a:hlinkClick>
@@ -16326,7 +16454,7 @@
               <a:hlinkClick r:id="rId5">
                 <a:extLst>
                   <a:ext uri="{A12FA001-AC4F-418D-AE19-62706E023703}">
-                    <ahyp:hlinkClr xmlns="" xmlns:ahyp="http://schemas.microsoft.com/office/drawing/2018/hyperlinkcolor" val="tx"/>
+                    <ahyp:hlinkClr xmlns:ahyp="http://schemas.microsoft.com/office/drawing/2018/hyperlinkcolor" val="tx"/>
                   </a:ext>
                 </a:extLst>
               </a:hlinkClick>
@@ -16344,7 +16472,7 @@
                 <a:hlinkClick r:id="rId5">
                   <a:extLst>
                     <a:ext uri="{A12FA001-AC4F-418D-AE19-62706E023703}">
-                      <ahyp:hlinkClr xmlns="" xmlns:ahyp="http://schemas.microsoft.com/office/drawing/2018/hyperlinkcolor" val="tx"/>
+                      <ahyp:hlinkClr xmlns:ahyp="http://schemas.microsoft.com/office/drawing/2018/hyperlinkcolor" val="tx"/>
                     </a:ext>
                   </a:extLst>
                 </a:hlinkClick>
@@ -16372,7 +16500,7 @@
                 <a:hlinkClick r:id="rId6">
                   <a:extLst>
                     <a:ext uri="{A12FA001-AC4F-418D-AE19-62706E023703}">
-                      <ahyp:hlinkClr xmlns="" xmlns:ahyp="http://schemas.microsoft.com/office/drawing/2018/hyperlinkcolor" val="tx"/>
+                      <ahyp:hlinkClr xmlns:ahyp="http://schemas.microsoft.com/office/drawing/2018/hyperlinkcolor" val="tx"/>
                     </a:ext>
                   </a:extLst>
                 </a:hlinkClick>
@@ -16389,41 +16517,162 @@
             </a:endParaRPr>
           </a:p>
           <a:p>
-            <a:endParaRPr lang="en-US" dirty="0" smtClean="0"/>
+            <a:endParaRPr lang="en-US" dirty="0"/>
+          </a:p>
+          <a:p>
+            <a:endParaRPr lang="en-US" dirty="0"/>
           </a:p>
           <a:p>
             <a:r>
-              <a:rPr lang="en-US" dirty="0" smtClean="0"/>
+              <a:rPr lang="en-US" dirty="0"/>
               <a:t>Javier D. Perez, </a:t>
             </a:r>
             <a:r>
-              <a:rPr lang="en-US" dirty="0" smtClean="0">
+              <a:rPr lang="en-US" dirty="0">
                 <a:hlinkClick r:id="rId7"/>
               </a:rPr>
-              <a:t>javierdpt89@gmail.com</a:t>
+              <a:t>javierdavidperez@outlook.com</a:t>
             </a:r>
-            <a:endParaRPr lang="en-US" dirty="0" smtClean="0"/>
-          </a:p>
-          <a:p>
             <a:r>
-              <a:rPr lang="en-US" dirty="0" smtClean="0"/>
+              <a:rPr lang="en-US" dirty="0"/>
+              <a:t> @jpdt89</a:t>
+            </a:r>
+          </a:p>
+          <a:p>
+            <a:r>
+              <a:rPr lang="en-US" dirty="0"/>
               <a:t>Will Tartak, </a:t>
             </a:r>
             <a:r>
-              <a:rPr lang="en-US" dirty="0" smtClean="0">
+              <a:rPr lang="en-US" dirty="0">
                 <a:hlinkClick r:id="rId8"/>
               </a:rPr>
               <a:t>will@willtartak.com</a:t>
             </a:r>
             <a:r>
-              <a:rPr lang="en-US" dirty="0" smtClean="0"/>
+              <a:rPr lang="en-US" dirty="0"/>
               <a:t>, @</a:t>
             </a:r>
             <a:r>
-              <a:rPr lang="en-US" dirty="0" err="1" smtClean="0"/>
+              <a:rPr lang="en-US" dirty="0" err="1"/>
               <a:t>willtartak</a:t>
             </a:r>
             <a:endParaRPr lang="en-US" dirty="0"/>
+          </a:p>
+        </p:txBody>
+      </p:sp>
+      <p:sp>
+        <p:nvSpPr>
+          <p:cNvPr id="4" name="Title 1">
+            <a:extLst>
+              <a:ext uri="{FF2B5EF4-FFF2-40B4-BE49-F238E27FC236}">
+                <a16:creationId xmlns:a16="http://schemas.microsoft.com/office/drawing/2014/main" id="{8F69C65B-7F68-4EE4-B67D-06A822A65BF7}"/>
+              </a:ext>
+            </a:extLst>
+          </p:cNvPr>
+          <p:cNvSpPr txBox="1">
+            <a:spLocks/>
+          </p:cNvSpPr>
+          <p:nvPr/>
+        </p:nvSpPr>
+        <p:spPr>
+          <a:xfrm>
+            <a:off x="685801" y="364014"/>
+            <a:ext cx="10131425" cy="1268545"/>
+          </a:xfrm>
+          <a:prstGeom prst="rect">
+            <a:avLst/>
+          </a:prstGeom>
+          <a:effectLst/>
+        </p:spPr>
+        <p:txBody>
+          <a:bodyPr vert="horz" lIns="91440" tIns="45720" rIns="91440" bIns="45720" rtlCol="0" anchor="ctr">
+            <a:normAutofit/>
+          </a:bodyPr>
+          <a:lstStyle>
+            <a:lvl1pPr algn="l" defTabSz="457200" rtl="0" eaLnBrk="1" latinLnBrk="0" hangingPunct="1">
+              <a:spcBef>
+                <a:spcPct val="0"/>
+              </a:spcBef>
+              <a:buNone/>
+              <a:defRPr sz="3600" kern="1200" cap="all">
+                <a:ln w="3175" cmpd="sng">
+                  <a:noFill/>
+                </a:ln>
+                <a:solidFill>
+                  <a:schemeClr val="tx1"/>
+                </a:solidFill>
+                <a:effectLst/>
+                <a:latin typeface="+mj-lt"/>
+                <a:ea typeface="+mj-ea"/>
+                <a:cs typeface="+mj-cs"/>
+              </a:defRPr>
+            </a:lvl1pPr>
+            <a:lvl2pPr eaLnBrk="1" hangingPunct="1">
+              <a:defRPr>
+                <a:solidFill>
+                  <a:schemeClr val="tx2"/>
+                </a:solidFill>
+              </a:defRPr>
+            </a:lvl2pPr>
+            <a:lvl3pPr eaLnBrk="1" hangingPunct="1">
+              <a:defRPr>
+                <a:solidFill>
+                  <a:schemeClr val="tx2"/>
+                </a:solidFill>
+              </a:defRPr>
+            </a:lvl3pPr>
+            <a:lvl4pPr eaLnBrk="1" hangingPunct="1">
+              <a:defRPr>
+                <a:solidFill>
+                  <a:schemeClr val="tx2"/>
+                </a:solidFill>
+              </a:defRPr>
+            </a:lvl4pPr>
+            <a:lvl5pPr eaLnBrk="1" hangingPunct="1">
+              <a:defRPr>
+                <a:solidFill>
+                  <a:schemeClr val="tx2"/>
+                </a:solidFill>
+              </a:defRPr>
+            </a:lvl5pPr>
+            <a:lvl6pPr eaLnBrk="1" hangingPunct="1">
+              <a:defRPr>
+                <a:solidFill>
+                  <a:schemeClr val="tx2"/>
+                </a:solidFill>
+              </a:defRPr>
+            </a:lvl6pPr>
+            <a:lvl7pPr eaLnBrk="1" hangingPunct="1">
+              <a:defRPr>
+                <a:solidFill>
+                  <a:schemeClr val="tx2"/>
+                </a:solidFill>
+              </a:defRPr>
+            </a:lvl7pPr>
+            <a:lvl8pPr eaLnBrk="1" hangingPunct="1">
+              <a:defRPr>
+                <a:solidFill>
+                  <a:schemeClr val="tx2"/>
+                </a:solidFill>
+              </a:defRPr>
+            </a:lvl8pPr>
+            <a:lvl9pPr eaLnBrk="1" hangingPunct="1">
+              <a:defRPr>
+                <a:solidFill>
+                  <a:schemeClr val="tx2"/>
+                </a:solidFill>
+              </a:defRPr>
+            </a:lvl9pPr>
+          </a:lstStyle>
+          <a:p>
+            <a:r>
+              <a:rPr lang="en-US" dirty="0">
+                <a:latin typeface="Segoe UI Light" panose="020B0502040204020203" pitchFamily="34" charset="0"/>
+                <a:cs typeface="Segoe UI Light" panose="020B0502040204020203" pitchFamily="34" charset="0"/>
+              </a:rPr>
+              <a:t>Resources…questions?</a:t>
+            </a:r>
           </a:p>
         </p:txBody>
       </p:sp>
@@ -16467,7 +16716,12 @@
             <p:ph idx="1"/>
           </p:nvPr>
         </p:nvSpPr>
-        <p:spPr/>
+        <p:spPr>
+          <a:xfrm>
+            <a:off x="685801" y="2067636"/>
+            <a:ext cx="10131425" cy="3649133"/>
+          </a:xfrm>
+        </p:spPr>
         <p:txBody>
           <a:bodyPr anchor="t">
             <a:normAutofit/>
@@ -16475,7 +16729,7 @@
           <a:lstStyle/>
           <a:p>
             <a:r>
-              <a:rPr lang="en-US" sz="2600" dirty="0" smtClean="0">
+              <a:rPr lang="en-US" sz="2600" dirty="0">
                 <a:latin typeface="Segoe UI" panose="020B0502040204020203" pitchFamily="34" charset="0"/>
                 <a:cs typeface="Segoe UI" panose="020B0502040204020203" pitchFamily="34" charset="0"/>
               </a:rPr>
@@ -16488,62 +16742,30 @@
                 <a:latin typeface="Segoe UI" panose="020B0502040204020203" pitchFamily="34" charset="0"/>
                 <a:cs typeface="Segoe UI" panose="020B0502040204020203" pitchFamily="34" charset="0"/>
               </a:rPr>
-              <a:t>Micro Service </a:t>
+              <a:t>Micro Service Pros &amp; Cons</a:t>
             </a:r>
-            <a:r>
-              <a:rPr lang="en-US" sz="2600" dirty="0" smtClean="0">
-                <a:latin typeface="Segoe UI" panose="020B0502040204020203" pitchFamily="34" charset="0"/>
-                <a:cs typeface="Segoe UI" panose="020B0502040204020203" pitchFamily="34" charset="0"/>
-              </a:rPr>
-              <a:t>Pros &amp; Cons</a:t>
-            </a:r>
-            <a:endParaRPr lang="en-US" sz="2600" dirty="0">
-              <a:latin typeface="Segoe UI" panose="020B0502040204020203" pitchFamily="34" charset="0"/>
-              <a:cs typeface="Segoe UI" panose="020B0502040204020203" pitchFamily="34" charset="0"/>
-            </a:endParaRPr>
-          </a:p>
-          <a:p>
-            <a:r>
-              <a:rPr lang="en-US" sz="2600" dirty="0" smtClean="0">
-                <a:latin typeface="Segoe UI" panose="020B0502040204020203" pitchFamily="34" charset="0"/>
-                <a:cs typeface="Segoe UI" panose="020B0502040204020203" pitchFamily="34" charset="0"/>
-              </a:rPr>
-              <a:t>What </a:t>
-            </a:r>
+          </a:p>
+          <a:p>
             <a:r>
               <a:rPr lang="en-US" sz="2600" dirty="0">
                 <a:latin typeface="Segoe UI" panose="020B0502040204020203" pitchFamily="34" charset="0"/>
                 <a:cs typeface="Segoe UI" panose="020B0502040204020203" pitchFamily="34" charset="0"/>
               </a:rPr>
-              <a:t>Is Service Fabric</a:t>
+              <a:t>What Is Service Fabric?</a:t>
             </a:r>
+          </a:p>
+          <a:p>
             <a:r>
-              <a:rPr lang="en-US" sz="2600" dirty="0" smtClean="0">
+              <a:rPr lang="en-US" sz="2600" dirty="0">
                 <a:latin typeface="Segoe UI" panose="020B0502040204020203" pitchFamily="34" charset="0"/>
                 <a:cs typeface="Segoe UI" panose="020B0502040204020203" pitchFamily="34" charset="0"/>
               </a:rPr>
-              <a:t>?</a:t>
+              <a:t>About Service Fabric</a:t>
             </a:r>
           </a:p>
           <a:p>
             <a:r>
-              <a:rPr lang="en-US" sz="2600" dirty="0" smtClean="0">
-                <a:latin typeface="Segoe UI" panose="020B0502040204020203" pitchFamily="34" charset="0"/>
-                <a:cs typeface="Segoe UI" panose="020B0502040204020203" pitchFamily="34" charset="0"/>
-              </a:rPr>
-              <a:t>About Service </a:t>
-            </a:r>
-            <a:r>
-              <a:rPr lang="en-US" sz="2600" dirty="0" smtClean="0">
-                <a:latin typeface="Segoe UI" panose="020B0502040204020203" pitchFamily="34" charset="0"/>
-                <a:cs typeface="Segoe UI" panose="020B0502040204020203" pitchFamily="34" charset="0"/>
-              </a:rPr>
-              <a:t>Fabric</a:t>
-            </a:r>
-          </a:p>
-          <a:p>
-            <a:r>
-              <a:rPr lang="en-US" sz="2600" dirty="0" smtClean="0">
+              <a:rPr lang="en-US" sz="2600" dirty="0">
                 <a:latin typeface="Segoe UI" panose="020B0502040204020203" pitchFamily="34" charset="0"/>
                 <a:cs typeface="Segoe UI" panose="020B0502040204020203" pitchFamily="34" charset="0"/>
               </a:rPr>
@@ -16552,7 +16774,7 @@
           </a:p>
           <a:p>
             <a:r>
-              <a:rPr lang="en-US" sz="2600" dirty="0" smtClean="0">
+              <a:rPr lang="en-US" sz="2600" dirty="0">
                 <a:latin typeface="Segoe UI" panose="020B0502040204020203" pitchFamily="34" charset="0"/>
                 <a:cs typeface="Segoe UI" panose="020B0502040204020203" pitchFamily="34" charset="0"/>
               </a:rPr>
@@ -16561,16 +16783,12 @@
           </a:p>
           <a:p>
             <a:r>
-              <a:rPr lang="en-US" sz="2600" dirty="0" smtClean="0">
+              <a:rPr lang="en-US" sz="2600" dirty="0">
                 <a:latin typeface="Segoe UI" panose="020B0502040204020203" pitchFamily="34" charset="0"/>
                 <a:cs typeface="Segoe UI" panose="020B0502040204020203" pitchFamily="34" charset="0"/>
               </a:rPr>
               <a:t>Resources</a:t>
             </a:r>
-            <a:endParaRPr lang="en-US" sz="2600" dirty="0">
-              <a:latin typeface="Segoe UI" panose="020B0502040204020203" pitchFamily="34" charset="0"/>
-              <a:cs typeface="Segoe UI" panose="020B0502040204020203" pitchFamily="34" charset="0"/>
-            </a:endParaRPr>
           </a:p>
         </p:txBody>
       </p:sp>
@@ -16579,7 +16797,7 @@
           <p:cNvPr id="4" name="Title 1">
             <a:extLst>
               <a:ext uri="{FF2B5EF4-FFF2-40B4-BE49-F238E27FC236}">
-                <a16:creationId xmlns="" xmlns:a16="http://schemas.microsoft.com/office/drawing/2014/main" id="{BB04CEA4-FD8B-400C-A3C2-8291910FB858}"/>
+                <a16:creationId xmlns:a16="http://schemas.microsoft.com/office/drawing/2014/main" id="{BB04CEA4-FD8B-400C-A3C2-8291910FB858}"/>
               </a:ext>
             </a:extLst>
           </p:cNvPr>
@@ -16699,13 +16917,6 @@
   <p:clrMapOvr>
     <a:masterClrMapping/>
   </p:clrMapOvr>
-  <p:timing>
-    <p:tnLst>
-      <p:par>
-        <p:cTn id="1" dur="indefinite" restart="never" nodeType="tmRoot"/>
-      </p:par>
-    </p:tnLst>
-  </p:timing>
 </p:sld>
 </file>
 
@@ -16731,7 +16942,7 @@
           <p:cNvPr id="4" name="Picture 3">
             <a:extLst>
               <a:ext uri="{FF2B5EF4-FFF2-40B4-BE49-F238E27FC236}">
-                <a16:creationId xmlns="" xmlns:a16="http://schemas.microsoft.com/office/drawing/2014/main" id="{F27E6185-431A-4FDE-B8FB-4805A0B53B19}"/>
+                <a16:creationId xmlns:a16="http://schemas.microsoft.com/office/drawing/2014/main" id="{F27E6185-431A-4FDE-B8FB-4805A0B53B19}"/>
               </a:ext>
             </a:extLst>
           </p:cNvPr>
@@ -16779,7 +16990,7 @@
           <p:cNvPr id="5" name="Picture 4">
             <a:extLst>
               <a:ext uri="{FF2B5EF4-FFF2-40B4-BE49-F238E27FC236}">
-                <a16:creationId xmlns="" xmlns:a16="http://schemas.microsoft.com/office/drawing/2014/main" id="{C48C3CC9-433D-4379-B05D-1FE1FE528236}"/>
+                <a16:creationId xmlns:a16="http://schemas.microsoft.com/office/drawing/2014/main" id="{C48C3CC9-433D-4379-B05D-1FE1FE528236}"/>
               </a:ext>
             </a:extLst>
           </p:cNvPr>
@@ -16824,7 +17035,7 @@
           <p:cNvPr id="6" name="Picture 5">
             <a:extLst>
               <a:ext uri="{FF2B5EF4-FFF2-40B4-BE49-F238E27FC236}">
-                <a16:creationId xmlns="" xmlns:a16="http://schemas.microsoft.com/office/drawing/2014/main" id="{4E4C8D74-D3FF-40E8-9052-A6B80E82FFCC}"/>
+                <a16:creationId xmlns:a16="http://schemas.microsoft.com/office/drawing/2014/main" id="{4E4C8D74-D3FF-40E8-9052-A6B80E82FFCC}"/>
               </a:ext>
             </a:extLst>
           </p:cNvPr>
@@ -16860,7 +17071,7 @@
           <p:cNvPr id="7" name="Rectangle 6">
             <a:extLst>
               <a:ext uri="{FF2B5EF4-FFF2-40B4-BE49-F238E27FC236}">
-                <a16:creationId xmlns="" xmlns:a16="http://schemas.microsoft.com/office/drawing/2014/main" id="{98088670-E25C-46C9-A4B2-AAC545B38D2F}"/>
+                <a16:creationId xmlns:a16="http://schemas.microsoft.com/office/drawing/2014/main" id="{98088670-E25C-46C9-A4B2-AAC545B38D2F}"/>
               </a:ext>
             </a:extLst>
           </p:cNvPr>
@@ -16901,7 +17112,7 @@
           <p:cNvPr id="8" name="Rectangle 7">
             <a:extLst>
               <a:ext uri="{FF2B5EF4-FFF2-40B4-BE49-F238E27FC236}">
-                <a16:creationId xmlns="" xmlns:a16="http://schemas.microsoft.com/office/drawing/2014/main" id="{0906A600-9D3C-41DB-8A7A-7CDB696FDCB0}"/>
+                <a16:creationId xmlns:a16="http://schemas.microsoft.com/office/drawing/2014/main" id="{0906A600-9D3C-41DB-8A7A-7CDB696FDCB0}"/>
               </a:ext>
             </a:extLst>
           </p:cNvPr>
@@ -16939,7 +17150,7 @@
           <p:cNvPr id="9" name="Rectangle 8">
             <a:extLst>
               <a:ext uri="{FF2B5EF4-FFF2-40B4-BE49-F238E27FC236}">
-                <a16:creationId xmlns="" xmlns:a16="http://schemas.microsoft.com/office/drawing/2014/main" id="{EE30A757-417C-44F7-8E81-8AEA66A9645C}"/>
+                <a16:creationId xmlns:a16="http://schemas.microsoft.com/office/drawing/2014/main" id="{EE30A757-417C-44F7-8E81-8AEA66A9645C}"/>
               </a:ext>
             </a:extLst>
           </p:cNvPr>
@@ -16984,7 +17195,7 @@
           <p:cNvPr id="10" name="Rectangle 9">
             <a:extLst>
               <a:ext uri="{FF2B5EF4-FFF2-40B4-BE49-F238E27FC236}">
-                <a16:creationId xmlns="" xmlns:a16="http://schemas.microsoft.com/office/drawing/2014/main" id="{BDE446DA-1E61-48B7-9EB3-09FB6D07708F}"/>
+                <a16:creationId xmlns:a16="http://schemas.microsoft.com/office/drawing/2014/main" id="{BDE446DA-1E61-48B7-9EB3-09FB6D07708F}"/>
               </a:ext>
             </a:extLst>
           </p:cNvPr>
@@ -17039,7 +17250,7 @@
           <p:cNvPr id="11" name="Group 10">
             <a:extLst>
               <a:ext uri="{FF2B5EF4-FFF2-40B4-BE49-F238E27FC236}">
-                <a16:creationId xmlns="" xmlns:a16="http://schemas.microsoft.com/office/drawing/2014/main" id="{0A46A573-F7FE-4C04-ABDE-3249A188EB13}"/>
+                <a16:creationId xmlns:a16="http://schemas.microsoft.com/office/drawing/2014/main" id="{0A46A573-F7FE-4C04-ABDE-3249A188EB13}"/>
               </a:ext>
             </a:extLst>
           </p:cNvPr>
@@ -17059,7 +17270,7 @@
             <p:cNvPr id="12" name="Picture 11">
               <a:extLst>
                 <a:ext uri="{FF2B5EF4-FFF2-40B4-BE49-F238E27FC236}">
-                  <a16:creationId xmlns="" xmlns:a16="http://schemas.microsoft.com/office/drawing/2014/main" id="{FDDC52ED-EC4C-4DB0-96EA-123119994CB8}"/>
+                  <a16:creationId xmlns:a16="http://schemas.microsoft.com/office/drawing/2014/main" id="{FDDC52ED-EC4C-4DB0-96EA-123119994CB8}"/>
                 </a:ext>
               </a:extLst>
             </p:cNvPr>
@@ -17097,7 +17308,7 @@
             <p:cNvPr id="13" name="Rectangle 12">
               <a:extLst>
                 <a:ext uri="{FF2B5EF4-FFF2-40B4-BE49-F238E27FC236}">
-                  <a16:creationId xmlns="" xmlns:a16="http://schemas.microsoft.com/office/drawing/2014/main" id="{E4C49AAB-3176-40DD-91C8-F85A6AA34471}"/>
+                  <a16:creationId xmlns:a16="http://schemas.microsoft.com/office/drawing/2014/main" id="{E4C49AAB-3176-40DD-91C8-F85A6AA34471}"/>
                 </a:ext>
               </a:extLst>
             </p:cNvPr>
@@ -17139,7 +17350,7 @@
           <p:cNvPr id="14" name="Hexagon 13">
             <a:extLst>
               <a:ext uri="{FF2B5EF4-FFF2-40B4-BE49-F238E27FC236}">
-                <a16:creationId xmlns="" xmlns:a16="http://schemas.microsoft.com/office/drawing/2014/main" id="{54690146-1822-4CFD-8E42-ADAACE797C94}"/>
+                <a16:creationId xmlns:a16="http://schemas.microsoft.com/office/drawing/2014/main" id="{54690146-1822-4CFD-8E42-ADAACE797C94}"/>
               </a:ext>
             </a:extLst>
           </p:cNvPr>
@@ -17185,7 +17396,7 @@
           <p:cNvPr id="15" name="Hexagon 14">
             <a:extLst>
               <a:ext uri="{FF2B5EF4-FFF2-40B4-BE49-F238E27FC236}">
-                <a16:creationId xmlns="" xmlns:a16="http://schemas.microsoft.com/office/drawing/2014/main" id="{CFF7DA32-DC03-46BF-926C-C8B13F614B21}"/>
+                <a16:creationId xmlns:a16="http://schemas.microsoft.com/office/drawing/2014/main" id="{CFF7DA32-DC03-46BF-926C-C8B13F614B21}"/>
               </a:ext>
             </a:extLst>
           </p:cNvPr>
@@ -17231,7 +17442,7 @@
           <p:cNvPr id="16" name="Hexagon 15">
             <a:extLst>
               <a:ext uri="{FF2B5EF4-FFF2-40B4-BE49-F238E27FC236}">
-                <a16:creationId xmlns="" xmlns:a16="http://schemas.microsoft.com/office/drawing/2014/main" id="{BC8B9569-B15E-4A71-B629-22CB0AFC9EA2}"/>
+                <a16:creationId xmlns:a16="http://schemas.microsoft.com/office/drawing/2014/main" id="{BC8B9569-B15E-4A71-B629-22CB0AFC9EA2}"/>
               </a:ext>
             </a:extLst>
           </p:cNvPr>
@@ -17275,7 +17486,7 @@
           <p:cNvPr id="17" name="Hexagon 16">
             <a:extLst>
               <a:ext uri="{FF2B5EF4-FFF2-40B4-BE49-F238E27FC236}">
-                <a16:creationId xmlns="" xmlns:a16="http://schemas.microsoft.com/office/drawing/2014/main" id="{4CF2B1B5-2450-4C1A-A667-1C0F1F298592}"/>
+                <a16:creationId xmlns:a16="http://schemas.microsoft.com/office/drawing/2014/main" id="{4CF2B1B5-2450-4C1A-A667-1C0F1F298592}"/>
               </a:ext>
             </a:extLst>
           </p:cNvPr>
@@ -17321,7 +17532,7 @@
           <p:cNvPr id="18" name="Hexagon 17">
             <a:extLst>
               <a:ext uri="{FF2B5EF4-FFF2-40B4-BE49-F238E27FC236}">
-                <a16:creationId xmlns="" xmlns:a16="http://schemas.microsoft.com/office/drawing/2014/main" id="{4949EDF8-5799-4F27-A099-CA63CE534FD5}"/>
+                <a16:creationId xmlns:a16="http://schemas.microsoft.com/office/drawing/2014/main" id="{4949EDF8-5799-4F27-A099-CA63CE534FD5}"/>
               </a:ext>
             </a:extLst>
           </p:cNvPr>
@@ -17367,7 +17578,7 @@
           <p:cNvPr id="19" name="Hexagon 18">
             <a:extLst>
               <a:ext uri="{FF2B5EF4-FFF2-40B4-BE49-F238E27FC236}">
-                <a16:creationId xmlns="" xmlns:a16="http://schemas.microsoft.com/office/drawing/2014/main" id="{507FC8CD-BF77-4175-A525-C95A573A4450}"/>
+                <a16:creationId xmlns:a16="http://schemas.microsoft.com/office/drawing/2014/main" id="{507FC8CD-BF77-4175-A525-C95A573A4450}"/>
               </a:ext>
             </a:extLst>
           </p:cNvPr>
@@ -17416,7 +17627,7 @@
           <p:cNvPr id="20" name="Hexagon 19">
             <a:extLst>
               <a:ext uri="{FF2B5EF4-FFF2-40B4-BE49-F238E27FC236}">
-                <a16:creationId xmlns="" xmlns:a16="http://schemas.microsoft.com/office/drawing/2014/main" id="{DADD8954-95C2-470C-BFBD-997DC2601228}"/>
+                <a16:creationId xmlns:a16="http://schemas.microsoft.com/office/drawing/2014/main" id="{DADD8954-95C2-470C-BFBD-997DC2601228}"/>
               </a:ext>
             </a:extLst>
           </p:cNvPr>
@@ -17462,7 +17673,7 @@
           <p:cNvPr id="21" name="Hexagon 20">
             <a:extLst>
               <a:ext uri="{FF2B5EF4-FFF2-40B4-BE49-F238E27FC236}">
-                <a16:creationId xmlns="" xmlns:a16="http://schemas.microsoft.com/office/drawing/2014/main" id="{82BEF54C-2110-4D9F-8EFC-1360A1761446}"/>
+                <a16:creationId xmlns:a16="http://schemas.microsoft.com/office/drawing/2014/main" id="{82BEF54C-2110-4D9F-8EFC-1360A1761446}"/>
               </a:ext>
             </a:extLst>
           </p:cNvPr>
@@ -17508,7 +17719,7 @@
           <p:cNvPr id="22" name="Hexagon 21">
             <a:extLst>
               <a:ext uri="{FF2B5EF4-FFF2-40B4-BE49-F238E27FC236}">
-                <a16:creationId xmlns="" xmlns:a16="http://schemas.microsoft.com/office/drawing/2014/main" id="{0AEF04DD-BB8C-4F2A-8A60-52B18DCE5FA2}"/>
+                <a16:creationId xmlns:a16="http://schemas.microsoft.com/office/drawing/2014/main" id="{0AEF04DD-BB8C-4F2A-8A60-52B18DCE5FA2}"/>
               </a:ext>
             </a:extLst>
           </p:cNvPr>
@@ -17554,7 +17765,7 @@
           <p:cNvPr id="23" name="Hexagon 22">
             <a:extLst>
               <a:ext uri="{FF2B5EF4-FFF2-40B4-BE49-F238E27FC236}">
-                <a16:creationId xmlns="" xmlns:a16="http://schemas.microsoft.com/office/drawing/2014/main" id="{EEC7C6FE-697A-40D5-AA54-409C3DA18D39}"/>
+                <a16:creationId xmlns:a16="http://schemas.microsoft.com/office/drawing/2014/main" id="{EEC7C6FE-697A-40D5-AA54-409C3DA18D39}"/>
               </a:ext>
             </a:extLst>
           </p:cNvPr>
@@ -17600,7 +17811,7 @@
           <p:cNvPr id="24" name="Hexagon 23">
             <a:extLst>
               <a:ext uri="{FF2B5EF4-FFF2-40B4-BE49-F238E27FC236}">
-                <a16:creationId xmlns="" xmlns:a16="http://schemas.microsoft.com/office/drawing/2014/main" id="{ADC01061-A710-4C3A-8190-EFA042E5B9CF}"/>
+                <a16:creationId xmlns:a16="http://schemas.microsoft.com/office/drawing/2014/main" id="{ADC01061-A710-4C3A-8190-EFA042E5B9CF}"/>
               </a:ext>
             </a:extLst>
           </p:cNvPr>
@@ -17646,7 +17857,7 @@
           <p:cNvPr id="25" name="Hexagon 24">
             <a:extLst>
               <a:ext uri="{FF2B5EF4-FFF2-40B4-BE49-F238E27FC236}">
-                <a16:creationId xmlns="" xmlns:a16="http://schemas.microsoft.com/office/drawing/2014/main" id="{167BD050-9848-4987-BF7B-666F572D949F}"/>
+                <a16:creationId xmlns:a16="http://schemas.microsoft.com/office/drawing/2014/main" id="{167BD050-9848-4987-BF7B-666F572D949F}"/>
               </a:ext>
             </a:extLst>
           </p:cNvPr>
@@ -17690,7 +17901,7 @@
           <p:cNvPr id="26" name="Hexagon 25">
             <a:extLst>
               <a:ext uri="{FF2B5EF4-FFF2-40B4-BE49-F238E27FC236}">
-                <a16:creationId xmlns="" xmlns:a16="http://schemas.microsoft.com/office/drawing/2014/main" id="{32C95C41-376B-448A-93BD-4CA16CA2BFF8}"/>
+                <a16:creationId xmlns:a16="http://schemas.microsoft.com/office/drawing/2014/main" id="{32C95C41-376B-448A-93BD-4CA16CA2BFF8}"/>
               </a:ext>
             </a:extLst>
           </p:cNvPr>
@@ -17736,7 +17947,7 @@
           <p:cNvPr id="27" name="Hexagon 26">
             <a:extLst>
               <a:ext uri="{FF2B5EF4-FFF2-40B4-BE49-F238E27FC236}">
-                <a16:creationId xmlns="" xmlns:a16="http://schemas.microsoft.com/office/drawing/2014/main" id="{AE12DD42-A92E-4D8D-8465-C83BC03A5AD3}"/>
+                <a16:creationId xmlns:a16="http://schemas.microsoft.com/office/drawing/2014/main" id="{AE12DD42-A92E-4D8D-8465-C83BC03A5AD3}"/>
               </a:ext>
             </a:extLst>
           </p:cNvPr>
@@ -17780,7 +17991,7 @@
           <p:cNvPr id="28" name="Rounded Rectangle 90">
             <a:extLst>
               <a:ext uri="{FF2B5EF4-FFF2-40B4-BE49-F238E27FC236}">
-                <a16:creationId xmlns="" xmlns:a16="http://schemas.microsoft.com/office/drawing/2014/main" id="{3B0F971E-4B40-4459-868B-524FFF141151}"/>
+                <a16:creationId xmlns:a16="http://schemas.microsoft.com/office/drawing/2014/main" id="{3B0F971E-4B40-4459-868B-524FFF141151}"/>
               </a:ext>
             </a:extLst>
           </p:cNvPr>
@@ -17826,7 +18037,7 @@
           <p:cNvPr id="29" name="Rectangle 28">
             <a:extLst>
               <a:ext uri="{FF2B5EF4-FFF2-40B4-BE49-F238E27FC236}">
-                <a16:creationId xmlns="" xmlns:a16="http://schemas.microsoft.com/office/drawing/2014/main" id="{E68C668B-597E-4899-AEC5-EEF083943024}"/>
+                <a16:creationId xmlns:a16="http://schemas.microsoft.com/office/drawing/2014/main" id="{E68C668B-597E-4899-AEC5-EEF083943024}"/>
               </a:ext>
             </a:extLst>
           </p:cNvPr>
@@ -17879,7 +18090,7 @@
           <p:cNvPr id="30" name="Picture 29">
             <a:extLst>
               <a:ext uri="{FF2B5EF4-FFF2-40B4-BE49-F238E27FC236}">
-                <a16:creationId xmlns="" xmlns:a16="http://schemas.microsoft.com/office/drawing/2014/main" id="{33B249AE-A279-48DC-88B7-D284BEEBA9F0}"/>
+                <a16:creationId xmlns:a16="http://schemas.microsoft.com/office/drawing/2014/main" id="{33B249AE-A279-48DC-88B7-D284BEEBA9F0}"/>
               </a:ext>
             </a:extLst>
           </p:cNvPr>
@@ -17909,7 +18120,7 @@
           <p:cNvPr id="31" name="Picture 30">
             <a:extLst>
               <a:ext uri="{FF2B5EF4-FFF2-40B4-BE49-F238E27FC236}">
-                <a16:creationId xmlns="" xmlns:a16="http://schemas.microsoft.com/office/drawing/2014/main" id="{59EDB900-2D17-4FC5-A83E-74873F53DE62}"/>
+                <a16:creationId xmlns:a16="http://schemas.microsoft.com/office/drawing/2014/main" id="{59EDB900-2D17-4FC5-A83E-74873F53DE62}"/>
               </a:ext>
             </a:extLst>
           </p:cNvPr>
@@ -17939,7 +18150,7 @@
           <p:cNvPr id="32" name="Picture 31">
             <a:extLst>
               <a:ext uri="{FF2B5EF4-FFF2-40B4-BE49-F238E27FC236}">
-                <a16:creationId xmlns="" xmlns:a16="http://schemas.microsoft.com/office/drawing/2014/main" id="{80FBAEA1-BD98-4540-8E64-EE8C9D2B9975}"/>
+                <a16:creationId xmlns:a16="http://schemas.microsoft.com/office/drawing/2014/main" id="{80FBAEA1-BD98-4540-8E64-EE8C9D2B9975}"/>
               </a:ext>
             </a:extLst>
           </p:cNvPr>
@@ -17969,7 +18180,7 @@
           <p:cNvPr id="33" name="Group 32">
             <a:extLst>
               <a:ext uri="{FF2B5EF4-FFF2-40B4-BE49-F238E27FC236}">
-                <a16:creationId xmlns="" xmlns:a16="http://schemas.microsoft.com/office/drawing/2014/main" id="{9AE65E6D-DE4A-4E34-B5F9-B2670D72AACB}"/>
+                <a16:creationId xmlns:a16="http://schemas.microsoft.com/office/drawing/2014/main" id="{9AE65E6D-DE4A-4E34-B5F9-B2670D72AACB}"/>
               </a:ext>
             </a:extLst>
           </p:cNvPr>
@@ -17989,7 +18200,7 @@
             <p:cNvPr id="34" name="Hexagon 33">
               <a:extLst>
                 <a:ext uri="{FF2B5EF4-FFF2-40B4-BE49-F238E27FC236}">
-                  <a16:creationId xmlns="" xmlns:a16="http://schemas.microsoft.com/office/drawing/2014/main" id="{3176E77B-2317-4FF5-87A0-0036FADCF683}"/>
+                  <a16:creationId xmlns:a16="http://schemas.microsoft.com/office/drawing/2014/main" id="{3176E77B-2317-4FF5-87A0-0036FADCF683}"/>
                 </a:ext>
               </a:extLst>
             </p:cNvPr>
@@ -18035,7 +18246,7 @@
             <p:cNvPr id="35" name="Hexagon 34">
               <a:extLst>
                 <a:ext uri="{FF2B5EF4-FFF2-40B4-BE49-F238E27FC236}">
-                  <a16:creationId xmlns="" xmlns:a16="http://schemas.microsoft.com/office/drawing/2014/main" id="{CA1ACCD5-1F1A-4F18-AA6A-F75CCCD323B1}"/>
+                  <a16:creationId xmlns:a16="http://schemas.microsoft.com/office/drawing/2014/main" id="{CA1ACCD5-1F1A-4F18-AA6A-F75CCCD323B1}"/>
                 </a:ext>
               </a:extLst>
             </p:cNvPr>
@@ -18081,7 +18292,7 @@
             <p:cNvPr id="36" name="Hexagon 35">
               <a:extLst>
                 <a:ext uri="{FF2B5EF4-FFF2-40B4-BE49-F238E27FC236}">
-                  <a16:creationId xmlns="" xmlns:a16="http://schemas.microsoft.com/office/drawing/2014/main" id="{A72765DF-B7D1-44AC-8F71-14F0D35BCCDA}"/>
+                  <a16:creationId xmlns:a16="http://schemas.microsoft.com/office/drawing/2014/main" id="{A72765DF-B7D1-44AC-8F71-14F0D35BCCDA}"/>
                 </a:ext>
               </a:extLst>
             </p:cNvPr>
@@ -18127,7 +18338,7 @@
             <p:cNvPr id="37" name="Rounded Rectangle 89">
               <a:extLst>
                 <a:ext uri="{FF2B5EF4-FFF2-40B4-BE49-F238E27FC236}">
-                  <a16:creationId xmlns="" xmlns:a16="http://schemas.microsoft.com/office/drawing/2014/main" id="{660028CF-5331-42D4-BD25-53E7F77A074C}"/>
+                  <a16:creationId xmlns:a16="http://schemas.microsoft.com/office/drawing/2014/main" id="{660028CF-5331-42D4-BD25-53E7F77A074C}"/>
                 </a:ext>
               </a:extLst>
             </p:cNvPr>
@@ -18173,7 +18384,7 @@
             <p:cNvPr id="38" name="Rectangle 37">
               <a:extLst>
                 <a:ext uri="{FF2B5EF4-FFF2-40B4-BE49-F238E27FC236}">
-                  <a16:creationId xmlns="" xmlns:a16="http://schemas.microsoft.com/office/drawing/2014/main" id="{0FA2ECE8-345F-431B-A022-DA485E74B628}"/>
+                  <a16:creationId xmlns:a16="http://schemas.microsoft.com/office/drawing/2014/main" id="{0FA2ECE8-345F-431B-A022-DA485E74B628}"/>
                 </a:ext>
               </a:extLst>
             </p:cNvPr>
@@ -18211,7 +18422,7 @@
           <p:cNvPr id="39" name="Rectangle 38">
             <a:extLst>
               <a:ext uri="{FF2B5EF4-FFF2-40B4-BE49-F238E27FC236}">
-                <a16:creationId xmlns="" xmlns:a16="http://schemas.microsoft.com/office/drawing/2014/main" id="{B29BED76-219B-4B68-9413-84457D283EC6}"/>
+                <a16:creationId xmlns:a16="http://schemas.microsoft.com/office/drawing/2014/main" id="{B29BED76-219B-4B68-9413-84457D283EC6}"/>
               </a:ext>
             </a:extLst>
           </p:cNvPr>
@@ -18248,7 +18459,7 @@
           <p:cNvPr id="40" name="Hexagon 39">
             <a:extLst>
               <a:ext uri="{FF2B5EF4-FFF2-40B4-BE49-F238E27FC236}">
-                <a16:creationId xmlns="" xmlns:a16="http://schemas.microsoft.com/office/drawing/2014/main" id="{7480131A-EE9B-401E-A8F7-253F3BC699CF}"/>
+                <a16:creationId xmlns:a16="http://schemas.microsoft.com/office/drawing/2014/main" id="{7480131A-EE9B-401E-A8F7-253F3BC699CF}"/>
               </a:ext>
             </a:extLst>
           </p:cNvPr>
@@ -18292,7 +18503,7 @@
           <p:cNvPr id="41" name="Hexagon 40">
             <a:extLst>
               <a:ext uri="{FF2B5EF4-FFF2-40B4-BE49-F238E27FC236}">
-                <a16:creationId xmlns="" xmlns:a16="http://schemas.microsoft.com/office/drawing/2014/main" id="{FEA50453-0054-4C47-A9CF-DC5EFE2995E0}"/>
+                <a16:creationId xmlns:a16="http://schemas.microsoft.com/office/drawing/2014/main" id="{FEA50453-0054-4C47-A9CF-DC5EFE2995E0}"/>
               </a:ext>
             </a:extLst>
           </p:cNvPr>
@@ -18336,7 +18547,7 @@
           <p:cNvPr id="42" name="Hexagon 41">
             <a:extLst>
               <a:ext uri="{FF2B5EF4-FFF2-40B4-BE49-F238E27FC236}">
-                <a16:creationId xmlns="" xmlns:a16="http://schemas.microsoft.com/office/drawing/2014/main" id="{FB57C09F-9A46-49C8-9310-0F0B1E94E5F4}"/>
+                <a16:creationId xmlns:a16="http://schemas.microsoft.com/office/drawing/2014/main" id="{FB57C09F-9A46-49C8-9310-0F0B1E94E5F4}"/>
               </a:ext>
             </a:extLst>
           </p:cNvPr>
@@ -18380,7 +18591,7 @@
           <p:cNvPr id="43" name="Hexagon 42">
             <a:extLst>
               <a:ext uri="{FF2B5EF4-FFF2-40B4-BE49-F238E27FC236}">
-                <a16:creationId xmlns="" xmlns:a16="http://schemas.microsoft.com/office/drawing/2014/main" id="{EF9A9323-EF1B-407A-B501-48AE5C700F0E}"/>
+                <a16:creationId xmlns:a16="http://schemas.microsoft.com/office/drawing/2014/main" id="{EF9A9323-EF1B-407A-B501-48AE5C700F0E}"/>
               </a:ext>
             </a:extLst>
           </p:cNvPr>
@@ -18426,7 +18637,7 @@
           <p:cNvPr id="44" name="Hexagon 43">
             <a:extLst>
               <a:ext uri="{FF2B5EF4-FFF2-40B4-BE49-F238E27FC236}">
-                <a16:creationId xmlns="" xmlns:a16="http://schemas.microsoft.com/office/drawing/2014/main" id="{5748BEDE-96BF-460D-AD56-18B96E1E9A06}"/>
+                <a16:creationId xmlns:a16="http://schemas.microsoft.com/office/drawing/2014/main" id="{5748BEDE-96BF-460D-AD56-18B96E1E9A06}"/>
               </a:ext>
             </a:extLst>
           </p:cNvPr>
@@ -18470,7 +18681,7 @@
           <p:cNvPr id="45" name="Hexagon 44">
             <a:extLst>
               <a:ext uri="{FF2B5EF4-FFF2-40B4-BE49-F238E27FC236}">
-                <a16:creationId xmlns="" xmlns:a16="http://schemas.microsoft.com/office/drawing/2014/main" id="{69D76FBB-5533-49FA-912A-84F245469D16}"/>
+                <a16:creationId xmlns:a16="http://schemas.microsoft.com/office/drawing/2014/main" id="{69D76FBB-5533-49FA-912A-84F245469D16}"/>
               </a:ext>
             </a:extLst>
           </p:cNvPr>
@@ -18514,7 +18725,7 @@
           <p:cNvPr id="46" name="Hexagon 45">
             <a:extLst>
               <a:ext uri="{FF2B5EF4-FFF2-40B4-BE49-F238E27FC236}">
-                <a16:creationId xmlns="" xmlns:a16="http://schemas.microsoft.com/office/drawing/2014/main" id="{93F69A92-08E3-447D-A083-EE7C5E96E23E}"/>
+                <a16:creationId xmlns:a16="http://schemas.microsoft.com/office/drawing/2014/main" id="{93F69A92-08E3-447D-A083-EE7C5E96E23E}"/>
               </a:ext>
             </a:extLst>
           </p:cNvPr>
@@ -18560,7 +18771,7 @@
           <p:cNvPr id="47" name="Straight Connector 46">
             <a:extLst>
               <a:ext uri="{FF2B5EF4-FFF2-40B4-BE49-F238E27FC236}">
-                <a16:creationId xmlns="" xmlns:a16="http://schemas.microsoft.com/office/drawing/2014/main" id="{EA6FE605-F3C2-4862-AF2A-9FE9DC472319}"/>
+                <a16:creationId xmlns:a16="http://schemas.microsoft.com/office/drawing/2014/main" id="{EA6FE605-F3C2-4862-AF2A-9FE9DC472319}"/>
               </a:ext>
             </a:extLst>
           </p:cNvPr>
@@ -18591,7 +18802,7 @@
           <p:cNvPr id="48" name="Group 47">
             <a:extLst>
               <a:ext uri="{FF2B5EF4-FFF2-40B4-BE49-F238E27FC236}">
-                <a16:creationId xmlns="" xmlns:a16="http://schemas.microsoft.com/office/drawing/2014/main" id="{1A95206A-6DA7-4F64-8FF1-DDDDF39680D0}"/>
+                <a16:creationId xmlns:a16="http://schemas.microsoft.com/office/drawing/2014/main" id="{1A95206A-6DA7-4F64-8FF1-DDDDF39680D0}"/>
               </a:ext>
             </a:extLst>
           </p:cNvPr>
@@ -18611,7 +18822,7 @@
             <p:cNvPr id="49" name="Rounded Rectangle 61">
               <a:extLst>
                 <a:ext uri="{FF2B5EF4-FFF2-40B4-BE49-F238E27FC236}">
-                  <a16:creationId xmlns="" xmlns:a16="http://schemas.microsoft.com/office/drawing/2014/main" id="{98150D63-F186-4D8D-8304-A7A5DB8D4468}"/>
+                  <a16:creationId xmlns:a16="http://schemas.microsoft.com/office/drawing/2014/main" id="{98150D63-F186-4D8D-8304-A7A5DB8D4468}"/>
                 </a:ext>
               </a:extLst>
             </p:cNvPr>
@@ -18661,7 +18872,7 @@
             <p:cNvPr id="50" name="Rectangle 49">
               <a:extLst>
                 <a:ext uri="{FF2B5EF4-FFF2-40B4-BE49-F238E27FC236}">
-                  <a16:creationId xmlns="" xmlns:a16="http://schemas.microsoft.com/office/drawing/2014/main" id="{76219A0B-A147-46D1-A876-F98472C132C6}"/>
+                  <a16:creationId xmlns:a16="http://schemas.microsoft.com/office/drawing/2014/main" id="{76219A0B-A147-46D1-A876-F98472C132C6}"/>
                 </a:ext>
               </a:extLst>
             </p:cNvPr>
@@ -18705,7 +18916,7 @@
             <p:cNvPr id="51" name="Rectangle 50">
               <a:extLst>
                 <a:ext uri="{FF2B5EF4-FFF2-40B4-BE49-F238E27FC236}">
-                  <a16:creationId xmlns="" xmlns:a16="http://schemas.microsoft.com/office/drawing/2014/main" id="{88DDFE7F-EBD1-4EE2-956B-9E08BF929813}"/>
+                  <a16:creationId xmlns:a16="http://schemas.microsoft.com/office/drawing/2014/main" id="{88DDFE7F-EBD1-4EE2-956B-9E08BF929813}"/>
                 </a:ext>
               </a:extLst>
             </p:cNvPr>
@@ -18749,7 +18960,7 @@
             <p:cNvPr id="52" name="Rectangle 51">
               <a:extLst>
                 <a:ext uri="{FF2B5EF4-FFF2-40B4-BE49-F238E27FC236}">
-                  <a16:creationId xmlns="" xmlns:a16="http://schemas.microsoft.com/office/drawing/2014/main" id="{30A63A6E-CA12-42D9-A9BE-D77596362254}"/>
+                  <a16:creationId xmlns:a16="http://schemas.microsoft.com/office/drawing/2014/main" id="{30A63A6E-CA12-42D9-A9BE-D77596362254}"/>
                 </a:ext>
               </a:extLst>
             </p:cNvPr>
@@ -18793,7 +19004,7 @@
             <p:cNvPr id="53" name="Rectangle 52">
               <a:extLst>
                 <a:ext uri="{FF2B5EF4-FFF2-40B4-BE49-F238E27FC236}">
-                  <a16:creationId xmlns="" xmlns:a16="http://schemas.microsoft.com/office/drawing/2014/main" id="{C7093B43-CF06-4A52-B08F-CA00067EEB8D}"/>
+                  <a16:creationId xmlns:a16="http://schemas.microsoft.com/office/drawing/2014/main" id="{C7093B43-CF06-4A52-B08F-CA00067EEB8D}"/>
                 </a:ext>
               </a:extLst>
             </p:cNvPr>
@@ -18831,7 +19042,7 @@
           <p:cNvPr id="54" name="Hexagon 53">
             <a:extLst>
               <a:ext uri="{FF2B5EF4-FFF2-40B4-BE49-F238E27FC236}">
-                <a16:creationId xmlns="" xmlns:a16="http://schemas.microsoft.com/office/drawing/2014/main" id="{5AC79B43-3AE4-4357-9F9A-AE643B90C5E9}"/>
+                <a16:creationId xmlns:a16="http://schemas.microsoft.com/office/drawing/2014/main" id="{5AC79B43-3AE4-4357-9F9A-AE643B90C5E9}"/>
               </a:ext>
             </a:extLst>
           </p:cNvPr>
@@ -18877,7 +19088,7 @@
           <p:cNvPr id="55" name="Hexagon 54">
             <a:extLst>
               <a:ext uri="{FF2B5EF4-FFF2-40B4-BE49-F238E27FC236}">
-                <a16:creationId xmlns="" xmlns:a16="http://schemas.microsoft.com/office/drawing/2014/main" id="{428A323F-2924-4E6A-A220-E772A48B666F}"/>
+                <a16:creationId xmlns:a16="http://schemas.microsoft.com/office/drawing/2014/main" id="{428A323F-2924-4E6A-A220-E772A48B666F}"/>
               </a:ext>
             </a:extLst>
           </p:cNvPr>
@@ -18923,7 +19134,7 @@
           <p:cNvPr id="56" name="Hexagon 55">
             <a:extLst>
               <a:ext uri="{FF2B5EF4-FFF2-40B4-BE49-F238E27FC236}">
-                <a16:creationId xmlns="" xmlns:a16="http://schemas.microsoft.com/office/drawing/2014/main" id="{3A0FC1F2-021D-46EE-A4CE-2BE975E19ECA}"/>
+                <a16:creationId xmlns:a16="http://schemas.microsoft.com/office/drawing/2014/main" id="{3A0FC1F2-021D-46EE-A4CE-2BE975E19ECA}"/>
               </a:ext>
             </a:extLst>
           </p:cNvPr>
@@ -18967,7 +19178,7 @@
           <p:cNvPr id="57" name="Hexagon 56">
             <a:extLst>
               <a:ext uri="{FF2B5EF4-FFF2-40B4-BE49-F238E27FC236}">
-                <a16:creationId xmlns="" xmlns:a16="http://schemas.microsoft.com/office/drawing/2014/main" id="{DD275343-2FB0-4265-982B-57E45FFEF7D7}"/>
+                <a16:creationId xmlns:a16="http://schemas.microsoft.com/office/drawing/2014/main" id="{DD275343-2FB0-4265-982B-57E45FFEF7D7}"/>
               </a:ext>
             </a:extLst>
           </p:cNvPr>
@@ -19011,7 +19222,7 @@
           <p:cNvPr id="58" name="Hexagon 57">
             <a:extLst>
               <a:ext uri="{FF2B5EF4-FFF2-40B4-BE49-F238E27FC236}">
-                <a16:creationId xmlns="" xmlns:a16="http://schemas.microsoft.com/office/drawing/2014/main" id="{D0D6C3CD-41FC-4E01-A8AE-95A6D91D36FB}"/>
+                <a16:creationId xmlns:a16="http://schemas.microsoft.com/office/drawing/2014/main" id="{D0D6C3CD-41FC-4E01-A8AE-95A6D91D36FB}"/>
               </a:ext>
             </a:extLst>
           </p:cNvPr>
@@ -19055,7 +19266,7 @@
           <p:cNvPr id="59" name="Hexagon 58">
             <a:extLst>
               <a:ext uri="{FF2B5EF4-FFF2-40B4-BE49-F238E27FC236}">
-                <a16:creationId xmlns="" xmlns:a16="http://schemas.microsoft.com/office/drawing/2014/main" id="{89A72864-078B-4C04-9358-A16EE6C153CD}"/>
+                <a16:creationId xmlns:a16="http://schemas.microsoft.com/office/drawing/2014/main" id="{89A72864-078B-4C04-9358-A16EE6C153CD}"/>
               </a:ext>
             </a:extLst>
           </p:cNvPr>
@@ -19101,7 +19312,7 @@
           <p:cNvPr id="60" name="Hexagon 59">
             <a:extLst>
               <a:ext uri="{FF2B5EF4-FFF2-40B4-BE49-F238E27FC236}">
-                <a16:creationId xmlns="" xmlns:a16="http://schemas.microsoft.com/office/drawing/2014/main" id="{23D6010F-FE7B-4E2E-A213-946DB6D480F6}"/>
+                <a16:creationId xmlns:a16="http://schemas.microsoft.com/office/drawing/2014/main" id="{23D6010F-FE7B-4E2E-A213-946DB6D480F6}"/>
               </a:ext>
             </a:extLst>
           </p:cNvPr>
@@ -20079,7 +20290,7 @@
           <p:cNvPr id="4" name="Title 1">
             <a:extLst>
               <a:ext uri="{FF2B5EF4-FFF2-40B4-BE49-F238E27FC236}">
-                <a16:creationId xmlns="" xmlns:a16="http://schemas.microsoft.com/office/drawing/2014/main" id="{86108329-583D-4435-8B11-ADDE290CC708}"/>
+                <a16:creationId xmlns:a16="http://schemas.microsoft.com/office/drawing/2014/main" id="{86108329-583D-4435-8B11-ADDE290CC708}"/>
               </a:ext>
             </a:extLst>
           </p:cNvPr>
@@ -20199,13 +20410,6 @@
   <p:clrMapOvr>
     <a:masterClrMapping/>
   </p:clrMapOvr>
-  <p:timing>
-    <p:tnLst>
-      <p:par>
-        <p:cTn id="1" dur="indefinite" restart="never" nodeType="tmRoot"/>
-      </p:par>
-    </p:tnLst>
-  </p:timing>
 </p:sld>
 </file>
 
@@ -20320,7 +20524,7 @@
           <p:cNvPr id="4" name="Title 1">
             <a:extLst>
               <a:ext uri="{FF2B5EF4-FFF2-40B4-BE49-F238E27FC236}">
-                <a16:creationId xmlns="" xmlns:a16="http://schemas.microsoft.com/office/drawing/2014/main" id="{9417426C-3B31-44AF-AE97-FB0352D146B5}"/>
+                <a16:creationId xmlns:a16="http://schemas.microsoft.com/office/drawing/2014/main" id="{9417426C-3B31-44AF-AE97-FB0352D146B5}"/>
               </a:ext>
             </a:extLst>
           </p:cNvPr>
@@ -20440,13 +20644,6 @@
   <p:clrMapOvr>
     <a:masterClrMapping/>
   </p:clrMapOvr>
-  <p:timing>
-    <p:tnLst>
-      <p:par>
-        <p:cTn id="1" dur="indefinite" restart="never" nodeType="tmRoot"/>
-      </p:par>
-    </p:tnLst>
-  </p:timing>
 </p:sld>
 </file>
 
@@ -20564,7 +20761,7 @@
           <p:cNvPr id="4" name="Group 3">
             <a:extLst>
               <a:ext uri="{FF2B5EF4-FFF2-40B4-BE49-F238E27FC236}">
-                <a16:creationId xmlns="" xmlns:a16="http://schemas.microsoft.com/office/drawing/2014/main" id="{127E4AEF-42A1-437E-A140-62FD097D7C25}"/>
+                <a16:creationId xmlns:a16="http://schemas.microsoft.com/office/drawing/2014/main" id="{127E4AEF-42A1-437E-A140-62FD097D7C25}"/>
               </a:ext>
             </a:extLst>
           </p:cNvPr>
@@ -20584,7 +20781,7 @@
             <p:cNvPr id="5" name="Rectangle 4">
               <a:extLst>
                 <a:ext uri="{FF2B5EF4-FFF2-40B4-BE49-F238E27FC236}">
-                  <a16:creationId xmlns="" xmlns:a16="http://schemas.microsoft.com/office/drawing/2014/main" id="{0B5E4BB6-9666-4DCA-B027-CED737267C15}"/>
+                  <a16:creationId xmlns:a16="http://schemas.microsoft.com/office/drawing/2014/main" id="{0B5E4BB6-9666-4DCA-B027-CED737267C15}"/>
                 </a:ext>
               </a:extLst>
             </p:cNvPr>
@@ -20723,7 +20920,7 @@
             <p:cNvPr id="6" name="Rectangle 5">
               <a:extLst>
                 <a:ext uri="{FF2B5EF4-FFF2-40B4-BE49-F238E27FC236}">
-                  <a16:creationId xmlns="" xmlns:a16="http://schemas.microsoft.com/office/drawing/2014/main" id="{5A6247B7-B537-4331-8D6E-4D1598ABDE65}"/>
+                  <a16:creationId xmlns:a16="http://schemas.microsoft.com/office/drawing/2014/main" id="{5A6247B7-B537-4331-8D6E-4D1598ABDE65}"/>
                 </a:ext>
               </a:extLst>
             </p:cNvPr>
@@ -20856,7 +21053,7 @@
             <p:cNvPr id="7" name="Oval 6">
               <a:extLst>
                 <a:ext uri="{FF2B5EF4-FFF2-40B4-BE49-F238E27FC236}">
-                  <a16:creationId xmlns="" xmlns:a16="http://schemas.microsoft.com/office/drawing/2014/main" id="{D6F9879C-CC09-4222-93EE-732D53F6470A}"/>
+                  <a16:creationId xmlns:a16="http://schemas.microsoft.com/office/drawing/2014/main" id="{D6F9879C-CC09-4222-93EE-732D53F6470A}"/>
                 </a:ext>
               </a:extLst>
             </p:cNvPr>
@@ -21006,7 +21203,7 @@
             <p:cNvPr id="8" name="Oval 7">
               <a:extLst>
                 <a:ext uri="{FF2B5EF4-FFF2-40B4-BE49-F238E27FC236}">
-                  <a16:creationId xmlns="" xmlns:a16="http://schemas.microsoft.com/office/drawing/2014/main" id="{70DCD82C-D0D2-4069-A3F7-EF832C8EDA03}"/>
+                  <a16:creationId xmlns:a16="http://schemas.microsoft.com/office/drawing/2014/main" id="{70DCD82C-D0D2-4069-A3F7-EF832C8EDA03}"/>
                 </a:ext>
               </a:extLst>
             </p:cNvPr>
@@ -21156,7 +21353,7 @@
             <p:cNvPr id="9" name="Oval 8">
               <a:extLst>
                 <a:ext uri="{FF2B5EF4-FFF2-40B4-BE49-F238E27FC236}">
-                  <a16:creationId xmlns="" xmlns:a16="http://schemas.microsoft.com/office/drawing/2014/main" id="{19AA298A-0B81-4119-B4B1-CDA39746C988}"/>
+                  <a16:creationId xmlns:a16="http://schemas.microsoft.com/office/drawing/2014/main" id="{19AA298A-0B81-4119-B4B1-CDA39746C988}"/>
                 </a:ext>
               </a:extLst>
             </p:cNvPr>
@@ -21306,7 +21503,7 @@
             <p:cNvPr id="10" name="Freeform 9">
               <a:extLst>
                 <a:ext uri="{FF2B5EF4-FFF2-40B4-BE49-F238E27FC236}">
-                  <a16:creationId xmlns="" xmlns:a16="http://schemas.microsoft.com/office/drawing/2014/main" id="{E46C4191-C32E-487A-80C4-166CAF7680DD}"/>
+                  <a16:creationId xmlns:a16="http://schemas.microsoft.com/office/drawing/2014/main" id="{E46C4191-C32E-487A-80C4-166CAF7680DD}"/>
                 </a:ext>
               </a:extLst>
             </p:cNvPr>
@@ -21802,7 +21999,7 @@
             <p:cNvPr id="11" name="Group 10">
               <a:extLst>
                 <a:ext uri="{FF2B5EF4-FFF2-40B4-BE49-F238E27FC236}">
-                  <a16:creationId xmlns="" xmlns:a16="http://schemas.microsoft.com/office/drawing/2014/main" id="{FDD93C81-F0A7-4743-924D-6EF21C146870}"/>
+                  <a16:creationId xmlns:a16="http://schemas.microsoft.com/office/drawing/2014/main" id="{FDD93C81-F0A7-4743-924D-6EF21C146870}"/>
                 </a:ext>
               </a:extLst>
             </p:cNvPr>
@@ -21822,7 +22019,7 @@
               <p:cNvPr id="21" name="Freeform 20">
                 <a:extLst>
                   <a:ext uri="{FF2B5EF4-FFF2-40B4-BE49-F238E27FC236}">
-                    <a16:creationId xmlns="" xmlns:a16="http://schemas.microsoft.com/office/drawing/2014/main" id="{76B9FB04-E0F2-414C-AD34-2E971E2BD08E}"/>
+                    <a16:creationId xmlns:a16="http://schemas.microsoft.com/office/drawing/2014/main" id="{76B9FB04-E0F2-414C-AD34-2E971E2BD08E}"/>
                   </a:ext>
                 </a:extLst>
               </p:cNvPr>
@@ -22086,7 +22283,7 @@
               <p:cNvPr id="22" name="Freeform 21">
                 <a:extLst>
                   <a:ext uri="{FF2B5EF4-FFF2-40B4-BE49-F238E27FC236}">
-                    <a16:creationId xmlns="" xmlns:a16="http://schemas.microsoft.com/office/drawing/2014/main" id="{E78BC1CE-966F-43F9-AAFE-60B0E775D2E7}"/>
+                    <a16:creationId xmlns:a16="http://schemas.microsoft.com/office/drawing/2014/main" id="{E78BC1CE-966F-43F9-AAFE-60B0E775D2E7}"/>
                   </a:ext>
                 </a:extLst>
               </p:cNvPr>
@@ -22353,7 +22550,7 @@
             <p:cNvPr id="12" name="Group 11">
               <a:extLst>
                 <a:ext uri="{FF2B5EF4-FFF2-40B4-BE49-F238E27FC236}">
-                  <a16:creationId xmlns="" xmlns:a16="http://schemas.microsoft.com/office/drawing/2014/main" id="{2AE88940-40F4-4498-B8CE-2D88770EC089}"/>
+                  <a16:creationId xmlns:a16="http://schemas.microsoft.com/office/drawing/2014/main" id="{2AE88940-40F4-4498-B8CE-2D88770EC089}"/>
                 </a:ext>
               </a:extLst>
             </p:cNvPr>
@@ -22373,7 +22570,7 @@
               <p:cNvPr id="19" name="Freeform 18">
                 <a:extLst>
                   <a:ext uri="{FF2B5EF4-FFF2-40B4-BE49-F238E27FC236}">
-                    <a16:creationId xmlns="" xmlns:a16="http://schemas.microsoft.com/office/drawing/2014/main" id="{C80CCE8C-CCF2-4B33-ACDA-D144FE7D9025}"/>
+                    <a16:creationId xmlns:a16="http://schemas.microsoft.com/office/drawing/2014/main" id="{C80CCE8C-CCF2-4B33-ACDA-D144FE7D9025}"/>
                   </a:ext>
                 </a:extLst>
               </p:cNvPr>
@@ -22564,7 +22761,7 @@
               <p:cNvPr id="20" name="Rectangle 19">
                 <a:extLst>
                   <a:ext uri="{FF2B5EF4-FFF2-40B4-BE49-F238E27FC236}">
-                    <a16:creationId xmlns="" xmlns:a16="http://schemas.microsoft.com/office/drawing/2014/main" id="{F2F5D344-B10C-4EAD-9CA3-F1B24F51AE65}"/>
+                    <a16:creationId xmlns:a16="http://schemas.microsoft.com/office/drawing/2014/main" id="{F2F5D344-B10C-4EAD-9CA3-F1B24F51AE65}"/>
                   </a:ext>
                 </a:extLst>
               </p:cNvPr>
@@ -22706,7 +22903,7 @@
             <p:cNvPr id="13" name="Rectangle 12">
               <a:extLst>
                 <a:ext uri="{FF2B5EF4-FFF2-40B4-BE49-F238E27FC236}">
-                  <a16:creationId xmlns="" xmlns:a16="http://schemas.microsoft.com/office/drawing/2014/main" id="{551DEDA0-8C02-41F2-8E30-F6A4CA97E5C2}"/>
+                  <a16:creationId xmlns:a16="http://schemas.microsoft.com/office/drawing/2014/main" id="{551DEDA0-8C02-41F2-8E30-F6A4CA97E5C2}"/>
                 </a:ext>
               </a:extLst>
             </p:cNvPr>
@@ -22845,7 +23042,7 @@
             <p:cNvPr id="14" name="Straight Connector 13">
               <a:extLst>
                 <a:ext uri="{FF2B5EF4-FFF2-40B4-BE49-F238E27FC236}">
-                  <a16:creationId xmlns="" xmlns:a16="http://schemas.microsoft.com/office/drawing/2014/main" id="{C93E10ED-FE5D-4961-850C-A80CE861D6D0}"/>
+                  <a16:creationId xmlns:a16="http://schemas.microsoft.com/office/drawing/2014/main" id="{C93E10ED-FE5D-4961-850C-A80CE861D6D0}"/>
                 </a:ext>
               </a:extLst>
             </p:cNvPr>
@@ -22888,7 +23085,7 @@
             <p:cNvPr id="15" name="Rectangle 14">
               <a:extLst>
                 <a:ext uri="{FF2B5EF4-FFF2-40B4-BE49-F238E27FC236}">
-                  <a16:creationId xmlns="" xmlns:a16="http://schemas.microsoft.com/office/drawing/2014/main" id="{A9F9CDA5-F936-4AF2-AA7F-F3ADAFAA65AD}"/>
+                  <a16:creationId xmlns:a16="http://schemas.microsoft.com/office/drawing/2014/main" id="{A9F9CDA5-F936-4AF2-AA7F-F3ADAFAA65AD}"/>
                 </a:ext>
               </a:extLst>
             </p:cNvPr>
@@ -23027,7 +23224,7 @@
             <p:cNvPr id="16" name="Straight Connector 15">
               <a:extLst>
                 <a:ext uri="{FF2B5EF4-FFF2-40B4-BE49-F238E27FC236}">
-                  <a16:creationId xmlns="" xmlns:a16="http://schemas.microsoft.com/office/drawing/2014/main" id="{E672D971-D183-471C-A274-21A025F832AB}"/>
+                  <a16:creationId xmlns:a16="http://schemas.microsoft.com/office/drawing/2014/main" id="{E672D971-D183-471C-A274-21A025F832AB}"/>
                 </a:ext>
               </a:extLst>
             </p:cNvPr>
@@ -23070,7 +23267,7 @@
             <p:cNvPr id="17" name="Straight Connector 16">
               <a:extLst>
                 <a:ext uri="{FF2B5EF4-FFF2-40B4-BE49-F238E27FC236}">
-                  <a16:creationId xmlns="" xmlns:a16="http://schemas.microsoft.com/office/drawing/2014/main" id="{3C393B6B-07A5-4F19-AB55-EDF49AAAD60E}"/>
+                  <a16:creationId xmlns:a16="http://schemas.microsoft.com/office/drawing/2014/main" id="{3C393B6B-07A5-4F19-AB55-EDF49AAAD60E}"/>
                 </a:ext>
               </a:extLst>
             </p:cNvPr>
@@ -23113,7 +23310,7 @@
             <p:cNvPr id="18" name="Rectangle 17">
               <a:extLst>
                 <a:ext uri="{FF2B5EF4-FFF2-40B4-BE49-F238E27FC236}">
-                  <a16:creationId xmlns="" xmlns:a16="http://schemas.microsoft.com/office/drawing/2014/main" id="{CB9D2040-E833-48F6-8263-B356EC0D75FE}"/>
+                  <a16:creationId xmlns:a16="http://schemas.microsoft.com/office/drawing/2014/main" id="{CB9D2040-E833-48F6-8263-B356EC0D75FE}"/>
                 </a:ext>
               </a:extLst>
             </p:cNvPr>
@@ -23253,7 +23450,7 @@
           <p:cNvPr id="23" name="Group 22">
             <a:extLst>
               <a:ext uri="{FF2B5EF4-FFF2-40B4-BE49-F238E27FC236}">
-                <a16:creationId xmlns="" xmlns:a16="http://schemas.microsoft.com/office/drawing/2014/main" id="{A61AEEA3-533F-47DE-8011-90BF619952AE}"/>
+                <a16:creationId xmlns:a16="http://schemas.microsoft.com/office/drawing/2014/main" id="{A61AEEA3-533F-47DE-8011-90BF619952AE}"/>
               </a:ext>
             </a:extLst>
           </p:cNvPr>
@@ -23273,7 +23470,7 @@
             <p:cNvPr id="24" name="Rectangle 23">
               <a:extLst>
                 <a:ext uri="{FF2B5EF4-FFF2-40B4-BE49-F238E27FC236}">
-                  <a16:creationId xmlns="" xmlns:a16="http://schemas.microsoft.com/office/drawing/2014/main" id="{77E9767F-B398-4FBD-9AFD-8FD082EF0C85}"/>
+                  <a16:creationId xmlns:a16="http://schemas.microsoft.com/office/drawing/2014/main" id="{77E9767F-B398-4FBD-9AFD-8FD082EF0C85}"/>
                 </a:ext>
               </a:extLst>
             </p:cNvPr>
@@ -23412,7 +23609,7 @@
             <p:cNvPr id="25" name="Rectangle 24">
               <a:extLst>
                 <a:ext uri="{FF2B5EF4-FFF2-40B4-BE49-F238E27FC236}">
-                  <a16:creationId xmlns="" xmlns:a16="http://schemas.microsoft.com/office/drawing/2014/main" id="{3F7C666A-1461-42B9-915F-AB4BC00A5893}"/>
+                  <a16:creationId xmlns:a16="http://schemas.microsoft.com/office/drawing/2014/main" id="{3F7C666A-1461-42B9-915F-AB4BC00A5893}"/>
                 </a:ext>
               </a:extLst>
             </p:cNvPr>
@@ -23558,7 +23755,7 @@
             <p:cNvPr id="26" name="Oval 25">
               <a:extLst>
                 <a:ext uri="{FF2B5EF4-FFF2-40B4-BE49-F238E27FC236}">
-                  <a16:creationId xmlns="" xmlns:a16="http://schemas.microsoft.com/office/drawing/2014/main" id="{A4795FDD-B6FE-45E3-B5BA-DEE0CF061DFD}"/>
+                  <a16:creationId xmlns:a16="http://schemas.microsoft.com/office/drawing/2014/main" id="{A4795FDD-B6FE-45E3-B5BA-DEE0CF061DFD}"/>
                 </a:ext>
               </a:extLst>
             </p:cNvPr>
@@ -23708,7 +23905,7 @@
             <p:cNvPr id="27" name="Graphic 29">
               <a:extLst>
                 <a:ext uri="{FF2B5EF4-FFF2-40B4-BE49-F238E27FC236}">
-                  <a16:creationId xmlns="" xmlns:a16="http://schemas.microsoft.com/office/drawing/2014/main" id="{079A2798-9C19-4B14-9C7C-2A18000DAE93}"/>
+                  <a16:creationId xmlns:a16="http://schemas.microsoft.com/office/drawing/2014/main" id="{079A2798-9C19-4B14-9C7C-2A18000DAE93}"/>
                 </a:ext>
               </a:extLst>
             </p:cNvPr>
@@ -23724,7 +23921,7 @@
                   <a14:useLocalDpi xmlns:a14="http://schemas.microsoft.com/office/drawing/2010/main" val="0"/>
                 </a:ext>
                 <a:ext uri="{96DAC541-7B7A-43D3-8B79-37D633B846F1}">
-                  <asvg:svgBlip xmlns="" xmlns:asvg="http://schemas.microsoft.com/office/drawing/2016/SVG/main" r:embed="rId3"/>
+                  <asvg:svgBlip xmlns:asvg="http://schemas.microsoft.com/office/drawing/2016/SVG/main" r:embed="rId3"/>
                 </a:ext>
               </a:extLst>
             </a:blip>
@@ -23747,7 +23944,7 @@
           <p:cNvPr id="28" name="Title 1">
             <a:extLst>
               <a:ext uri="{FF2B5EF4-FFF2-40B4-BE49-F238E27FC236}">
-                <a16:creationId xmlns="" xmlns:a16="http://schemas.microsoft.com/office/drawing/2014/main" id="{14970F1A-5878-4FB0-A2B4-2A69519F0A4A}"/>
+                <a16:creationId xmlns:a16="http://schemas.microsoft.com/office/drawing/2014/main" id="{14970F1A-5878-4FB0-A2B4-2A69519F0A4A}"/>
               </a:ext>
             </a:extLst>
           </p:cNvPr>
@@ -23867,13 +24064,6 @@
   <p:clrMapOvr>
     <a:masterClrMapping/>
   </p:clrMapOvr>
-  <p:timing>
-    <p:tnLst>
-      <p:par>
-        <p:cTn id="1" dur="indefinite" restart="never" nodeType="tmRoot"/>
-      </p:par>
-    </p:tnLst>
-  </p:timing>
 </p:sld>
 </file>
 
@@ -23974,16 +24164,12 @@
           <a:p>
             <a:pPr lvl="1"/>
             <a:r>
-              <a:rPr lang="en-US" sz="2200" dirty="0" smtClean="0">
+              <a:rPr lang="en-US" sz="2200" dirty="0">
                 <a:latin typeface="Segoe UI" panose="020B0502040204020203" pitchFamily="34" charset="0"/>
                 <a:cs typeface="Segoe UI" panose="020B0502040204020203" pitchFamily="34" charset="0"/>
               </a:rPr>
               <a:t>Built-in APIs</a:t>
             </a:r>
-            <a:endParaRPr lang="en-US" sz="2200" dirty="0">
-              <a:latin typeface="Segoe UI" panose="020B0502040204020203" pitchFamily="34" charset="0"/>
-              <a:cs typeface="Segoe UI" panose="020B0502040204020203" pitchFamily="34" charset="0"/>
-            </a:endParaRPr>
           </a:p>
           <a:p>
             <a:r>
@@ -24000,19 +24186,12 @@
                 <a:latin typeface="Segoe UI" panose="020B0502040204020203" pitchFamily="34" charset="0"/>
                 <a:cs typeface="Segoe UI" panose="020B0502040204020203" pitchFamily="34" charset="0"/>
               </a:rPr>
-              <a:t>Deployment &amp; Upgrade </a:t>
+              <a:t>Deployment &amp; Upgrade Management</a:t>
             </a:r>
+          </a:p>
+          <a:p>
             <a:r>
-              <a:rPr lang="en-US" sz="2200" dirty="0" smtClean="0">
-                <a:latin typeface="Segoe UI" panose="020B0502040204020203" pitchFamily="34" charset="0"/>
-                <a:cs typeface="Segoe UI" panose="020B0502040204020203" pitchFamily="34" charset="0"/>
-              </a:rPr>
-              <a:t>Management</a:t>
-            </a:r>
-          </a:p>
-          <a:p>
-            <a:r>
-              <a:rPr lang="en-US" sz="2200" smtClean="0">
+              <a:rPr lang="en-US" sz="2200">
                 <a:latin typeface="Segoe UI" panose="020B0502040204020203" pitchFamily="34" charset="0"/>
                 <a:cs typeface="Segoe UI" panose="020B0502040204020203" pitchFamily="34" charset="0"/>
               </a:rPr>
@@ -24036,7 +24215,7 @@
           <p:cNvPr id="4" name="Title 1">
             <a:extLst>
               <a:ext uri="{FF2B5EF4-FFF2-40B4-BE49-F238E27FC236}">
-                <a16:creationId xmlns="" xmlns:a16="http://schemas.microsoft.com/office/drawing/2014/main" id="{8959F06B-9A61-4A3B-A9D2-BD6C04E9C4CC}"/>
+                <a16:creationId xmlns:a16="http://schemas.microsoft.com/office/drawing/2014/main" id="{8959F06B-9A61-4A3B-A9D2-BD6C04E9C4CC}"/>
               </a:ext>
             </a:extLst>
           </p:cNvPr>
@@ -24156,13 +24335,6 @@
   <p:clrMapOvr>
     <a:masterClrMapping/>
   </p:clrMapOvr>
-  <p:timing>
-    <p:tnLst>
-      <p:par>
-        <p:cTn id="1" dur="indefinite" restart="never" nodeType="tmRoot"/>
-      </p:par>
-    </p:tnLst>
-  </p:timing>
 </p:sld>
 </file>
 
@@ -24188,7 +24360,7 @@
           <p:cNvPr id="133" name="Title 1">
             <a:extLst>
               <a:ext uri="{FF2B5EF4-FFF2-40B4-BE49-F238E27FC236}">
-                <a16:creationId xmlns="" xmlns:a16="http://schemas.microsoft.com/office/drawing/2014/main" id="{4A64CDCF-65CE-49B7-BA5E-7211F3A12F57}"/>
+                <a16:creationId xmlns:a16="http://schemas.microsoft.com/office/drawing/2014/main" id="{4A64CDCF-65CE-49B7-BA5E-7211F3A12F57}"/>
               </a:ext>
             </a:extLst>
           </p:cNvPr>
@@ -24226,7 +24398,7 @@
           <p:cNvPr id="145" name="Table 144">
             <a:extLst>
               <a:ext uri="{FF2B5EF4-FFF2-40B4-BE49-F238E27FC236}">
-                <a16:creationId xmlns="" xmlns:a16="http://schemas.microsoft.com/office/drawing/2014/main" id="{9E050F9E-3B58-4324-8A80-67691B27D494}"/>
+                <a16:creationId xmlns:a16="http://schemas.microsoft.com/office/drawing/2014/main" id="{9E050F9E-3B58-4324-8A80-67691B27D494}"/>
               </a:ext>
             </a:extLst>
           </p:cNvPr>
@@ -24236,13 +24408,13 @@
           <p:nvPr>
             <p:extLst>
               <p:ext uri="{D42A27DB-BD31-4B8C-83A1-F6EECF244321}">
-                <p14:modId xmlns:p14="http://schemas.microsoft.com/office/powerpoint/2010/main" val="977689483"/>
+                <p14:modId xmlns:p14="http://schemas.microsoft.com/office/powerpoint/2010/main" val="1183844508"/>
               </p:ext>
             </p:extLst>
           </p:nvPr>
         </p:nvGraphicFramePr>
         <p:xfrm>
-          <a:off x="272530" y="1491599"/>
+          <a:off x="272530" y="1479584"/>
           <a:ext cx="11604838" cy="5184504"/>
         </p:xfrm>
         <a:graphic>
@@ -24255,35 +24427,35 @@
                 <a:gridCol w="2289199">
                   <a:extLst>
                     <a:ext uri="{9D8B030D-6E8A-4147-A177-3AD203B41FA5}">
-                      <a16:colId xmlns="" xmlns:a16="http://schemas.microsoft.com/office/drawing/2014/main" val="1990358366"/>
+                      <a16:colId xmlns:a16="http://schemas.microsoft.com/office/drawing/2014/main" val="1990358366"/>
                     </a:ext>
                   </a:extLst>
                 </a:gridCol>
                 <a:gridCol w="2289199">
                   <a:extLst>
                     <a:ext uri="{9D8B030D-6E8A-4147-A177-3AD203B41FA5}">
-                      <a16:colId xmlns="" xmlns:a16="http://schemas.microsoft.com/office/drawing/2014/main" val="1769369918"/>
+                      <a16:colId xmlns:a16="http://schemas.microsoft.com/office/drawing/2014/main" val="1769369918"/>
                     </a:ext>
                   </a:extLst>
                 </a:gridCol>
                 <a:gridCol w="2289199">
                   <a:extLst>
                     <a:ext uri="{9D8B030D-6E8A-4147-A177-3AD203B41FA5}">
-                      <a16:colId xmlns="" xmlns:a16="http://schemas.microsoft.com/office/drawing/2014/main" val="720603844"/>
+                      <a16:colId xmlns:a16="http://schemas.microsoft.com/office/drawing/2014/main" val="720603844"/>
                     </a:ext>
                   </a:extLst>
                 </a:gridCol>
                 <a:gridCol w="2289199">
                   <a:extLst>
                     <a:ext uri="{9D8B030D-6E8A-4147-A177-3AD203B41FA5}">
-                      <a16:colId xmlns="" xmlns:a16="http://schemas.microsoft.com/office/drawing/2014/main" val="3480668213"/>
+                      <a16:colId xmlns:a16="http://schemas.microsoft.com/office/drawing/2014/main" val="3480668213"/>
                     </a:ext>
                   </a:extLst>
                 </a:gridCol>
                 <a:gridCol w="2448042">
                   <a:extLst>
                     <a:ext uri="{9D8B030D-6E8A-4147-A177-3AD203B41FA5}">
-                      <a16:colId xmlns="" xmlns:a16="http://schemas.microsoft.com/office/drawing/2014/main" val="4169488182"/>
+                      <a16:colId xmlns:a16="http://schemas.microsoft.com/office/drawing/2014/main" val="4169488182"/>
                     </a:ext>
                   </a:extLst>
                 </a:gridCol>
@@ -24651,7 +24823,7 @@
                 </a:tc>
                 <a:extLst>
                   <a:ext uri="{0D108BD9-81ED-4DB2-BD59-A6C34878D82A}">
-                    <a16:rowId xmlns="" xmlns:a16="http://schemas.microsoft.com/office/drawing/2014/main" val="2471007751"/>
+                    <a16:rowId xmlns:a16="http://schemas.microsoft.com/office/drawing/2014/main" val="2471007751"/>
                   </a:ext>
                 </a:extLst>
               </a:tr>
@@ -25018,7 +25190,7 @@
                 </a:tc>
                 <a:extLst>
                   <a:ext uri="{0D108BD9-81ED-4DB2-BD59-A6C34878D82A}">
-                    <a16:rowId xmlns="" xmlns:a16="http://schemas.microsoft.com/office/drawing/2014/main" val="3701490433"/>
+                    <a16:rowId xmlns:a16="http://schemas.microsoft.com/office/drawing/2014/main" val="3701490433"/>
                   </a:ext>
                 </a:extLst>
               </a:tr>
@@ -25031,7 +25203,7 @@
           <p:cNvPr id="146" name="Graphic 77">
             <a:extLst>
               <a:ext uri="{FF2B5EF4-FFF2-40B4-BE49-F238E27FC236}">
-                <a16:creationId xmlns="" xmlns:a16="http://schemas.microsoft.com/office/drawing/2014/main" id="{A48E79CC-3F52-4D89-ACB1-2D2ED8F1CDB8}"/>
+                <a16:creationId xmlns:a16="http://schemas.microsoft.com/office/drawing/2014/main" id="{A48E79CC-3F52-4D89-ACB1-2D2ED8F1CDB8}"/>
               </a:ext>
             </a:extLst>
           </p:cNvPr>
@@ -25044,7 +25216,7 @@
           <a:blip r:embed="rId3">
             <a:extLst>
               <a:ext uri="{96DAC541-7B7A-43D3-8B79-37D633B846F1}">
-                <asvg:svgBlip xmlns="" xmlns:asvg="http://schemas.microsoft.com/office/drawing/2016/SVG/main" r:embed="rId4"/>
+                <asvg:svgBlip xmlns:asvg="http://schemas.microsoft.com/office/drawing/2016/SVG/main" r:embed="rId4"/>
               </a:ext>
             </a:extLst>
           </a:blip>
@@ -25067,7 +25239,7 @@
           <p:cNvPr id="147" name="Text Placeholder 21">
             <a:extLst>
               <a:ext uri="{FF2B5EF4-FFF2-40B4-BE49-F238E27FC236}">
-                <a16:creationId xmlns="" xmlns:a16="http://schemas.microsoft.com/office/drawing/2014/main" id="{3AC6F839-80B4-4A06-A6C3-0AAD0CD70D95}"/>
+                <a16:creationId xmlns:a16="http://schemas.microsoft.com/office/drawing/2014/main" id="{3AC6F839-80B4-4A06-A6C3-0AAD0CD70D95}"/>
               </a:ext>
             </a:extLst>
           </p:cNvPr>
@@ -25300,7 +25472,7 @@
           <p:cNvPr id="148" name="Text Placeholder 21">
             <a:extLst>
               <a:ext uri="{FF2B5EF4-FFF2-40B4-BE49-F238E27FC236}">
-                <a16:creationId xmlns="" xmlns:a16="http://schemas.microsoft.com/office/drawing/2014/main" id="{66AA874C-0141-468F-9773-18971829EB7B}"/>
+                <a16:creationId xmlns:a16="http://schemas.microsoft.com/office/drawing/2014/main" id="{66AA874C-0141-468F-9773-18971829EB7B}"/>
               </a:ext>
             </a:extLst>
           </p:cNvPr>
@@ -25533,7 +25705,7 @@
           <p:cNvPr id="150" name="Text Placeholder 21">
             <a:extLst>
               <a:ext uri="{FF2B5EF4-FFF2-40B4-BE49-F238E27FC236}">
-                <a16:creationId xmlns="" xmlns:a16="http://schemas.microsoft.com/office/drawing/2014/main" id="{2EB2FF6E-CA30-4720-A02C-F593DF17A171}"/>
+                <a16:creationId xmlns:a16="http://schemas.microsoft.com/office/drawing/2014/main" id="{2EB2FF6E-CA30-4720-A02C-F593DF17A171}"/>
               </a:ext>
             </a:extLst>
           </p:cNvPr>
@@ -25730,7 +25902,7 @@
           <p:cNvPr id="2" name="Group 1">
             <a:extLst>
               <a:ext uri="{FF2B5EF4-FFF2-40B4-BE49-F238E27FC236}">
-                <a16:creationId xmlns="" xmlns:a16="http://schemas.microsoft.com/office/drawing/2014/main" id="{EEB47008-B4AE-440E-B53E-DFD04CF7564D}"/>
+                <a16:creationId xmlns:a16="http://schemas.microsoft.com/office/drawing/2014/main" id="{EEB47008-B4AE-440E-B53E-DFD04CF7564D}"/>
               </a:ext>
             </a:extLst>
           </p:cNvPr>
@@ -25750,7 +25922,7 @@
             <p:cNvPr id="177" name="Freeform 88">
               <a:extLst>
                 <a:ext uri="{FF2B5EF4-FFF2-40B4-BE49-F238E27FC236}">
-                  <a16:creationId xmlns="" xmlns:a16="http://schemas.microsoft.com/office/drawing/2014/main" id="{1FD23FBB-F42F-4B08-AD67-FF982C470F20}"/>
+                  <a16:creationId xmlns:a16="http://schemas.microsoft.com/office/drawing/2014/main" id="{1FD23FBB-F42F-4B08-AD67-FF982C470F20}"/>
                 </a:ext>
               </a:extLst>
             </p:cNvPr>
@@ -26169,7 +26341,7 @@
             <p:cNvPr id="178" name="Freeform 89">
               <a:extLst>
                 <a:ext uri="{FF2B5EF4-FFF2-40B4-BE49-F238E27FC236}">
-                  <a16:creationId xmlns="" xmlns:a16="http://schemas.microsoft.com/office/drawing/2014/main" id="{B2FCF9AD-E528-4ECA-A248-2D912EC73261}"/>
+                  <a16:creationId xmlns:a16="http://schemas.microsoft.com/office/drawing/2014/main" id="{B2FCF9AD-E528-4ECA-A248-2D912EC73261}"/>
                 </a:ext>
               </a:extLst>
             </p:cNvPr>
@@ -26420,7 +26592,7 @@
           <p:cNvPr id="179" name="Text Placeholder 21">
             <a:extLst>
               <a:ext uri="{FF2B5EF4-FFF2-40B4-BE49-F238E27FC236}">
-                <a16:creationId xmlns="" xmlns:a16="http://schemas.microsoft.com/office/drawing/2014/main" id="{1333B46C-0A61-4F1C-93F5-7F1F6D4A578B}"/>
+                <a16:creationId xmlns:a16="http://schemas.microsoft.com/office/drawing/2014/main" id="{1333B46C-0A61-4F1C-93F5-7F1F6D4A578B}"/>
               </a:ext>
             </a:extLst>
           </p:cNvPr>
@@ -26653,7 +26825,7 @@
           <p:cNvPr id="180" name="Text Placeholder 21">
             <a:extLst>
               <a:ext uri="{FF2B5EF4-FFF2-40B4-BE49-F238E27FC236}">
-                <a16:creationId xmlns="" xmlns:a16="http://schemas.microsoft.com/office/drawing/2014/main" id="{ABDB78E8-4437-454A-8DCB-0A1E390205B0}"/>
+                <a16:creationId xmlns:a16="http://schemas.microsoft.com/office/drawing/2014/main" id="{ABDB78E8-4437-454A-8DCB-0A1E390205B0}"/>
               </a:ext>
             </a:extLst>
           </p:cNvPr>
@@ -26850,7 +27022,7 @@
           <p:cNvPr id="195" name="Text Placeholder 21">
             <a:extLst>
               <a:ext uri="{FF2B5EF4-FFF2-40B4-BE49-F238E27FC236}">
-                <a16:creationId xmlns="" xmlns:a16="http://schemas.microsoft.com/office/drawing/2014/main" id="{9FEE01BD-02D8-42F5-8974-1E9028588A97}"/>
+                <a16:creationId xmlns:a16="http://schemas.microsoft.com/office/drawing/2014/main" id="{9FEE01BD-02D8-42F5-8974-1E9028588A97}"/>
               </a:ext>
             </a:extLst>
           </p:cNvPr>
@@ -27083,7 +27255,7 @@
           <p:cNvPr id="198" name="Text Placeholder 21">
             <a:extLst>
               <a:ext uri="{FF2B5EF4-FFF2-40B4-BE49-F238E27FC236}">
-                <a16:creationId xmlns="" xmlns:a16="http://schemas.microsoft.com/office/drawing/2014/main" id="{BDE6D3ED-80A3-4A76-B127-F36BD0F1E1A7}"/>
+                <a16:creationId xmlns:a16="http://schemas.microsoft.com/office/drawing/2014/main" id="{BDE6D3ED-80A3-4A76-B127-F36BD0F1E1A7}"/>
               </a:ext>
             </a:extLst>
           </p:cNvPr>
@@ -27316,7 +27488,7 @@
           <p:cNvPr id="199" name="Text Placeholder 21">
             <a:extLst>
               <a:ext uri="{FF2B5EF4-FFF2-40B4-BE49-F238E27FC236}">
-                <a16:creationId xmlns="" xmlns:a16="http://schemas.microsoft.com/office/drawing/2014/main" id="{295BB39C-784B-4CED-A097-EF14B5B955AD}"/>
+                <a16:creationId xmlns:a16="http://schemas.microsoft.com/office/drawing/2014/main" id="{295BB39C-784B-4CED-A097-EF14B5B955AD}"/>
               </a:ext>
             </a:extLst>
           </p:cNvPr>
@@ -27327,7 +27499,7 @@
         </p:nvSpPr>
         <p:spPr>
           <a:xfrm>
-            <a:off x="2828290" y="2383699"/>
+            <a:off x="2839540" y="2467110"/>
             <a:ext cx="1188720" cy="523220"/>
           </a:xfrm>
           <a:prstGeom prst="rect">
@@ -27549,7 +27721,7 @@
           <p:cNvPr id="204" name="Text Placeholder 21">
             <a:extLst>
               <a:ext uri="{FF2B5EF4-FFF2-40B4-BE49-F238E27FC236}">
-                <a16:creationId xmlns="" xmlns:a16="http://schemas.microsoft.com/office/drawing/2014/main" id="{BC7825F0-AED5-409E-81C8-E7FE2FB2462E}"/>
+                <a16:creationId xmlns:a16="http://schemas.microsoft.com/office/drawing/2014/main" id="{BC7825F0-AED5-409E-81C8-E7FE2FB2462E}"/>
               </a:ext>
             </a:extLst>
           </p:cNvPr>
@@ -27560,7 +27732,7 @@
         </p:nvSpPr>
         <p:spPr>
           <a:xfrm>
-            <a:off x="2883665" y="3020566"/>
+            <a:off x="2883664" y="3180541"/>
             <a:ext cx="1077971" cy="523220"/>
           </a:xfrm>
           <a:prstGeom prst="rect">
@@ -27782,7 +27954,7 @@
           <p:cNvPr id="214" name="Text Placeholder 21">
             <a:extLst>
               <a:ext uri="{FF2B5EF4-FFF2-40B4-BE49-F238E27FC236}">
-                <a16:creationId xmlns="" xmlns:a16="http://schemas.microsoft.com/office/drawing/2014/main" id="{A0E2FA68-3DBF-4199-929C-732CD169347E}"/>
+                <a16:creationId xmlns:a16="http://schemas.microsoft.com/office/drawing/2014/main" id="{A0E2FA68-3DBF-4199-929C-732CD169347E}"/>
               </a:ext>
             </a:extLst>
           </p:cNvPr>
@@ -28046,7 +28218,7 @@
           <p:cNvPr id="216" name="Picture 215">
             <a:extLst>
               <a:ext uri="{FF2B5EF4-FFF2-40B4-BE49-F238E27FC236}">
-                <a16:creationId xmlns="" xmlns:a16="http://schemas.microsoft.com/office/drawing/2014/main" id="{A2E22D75-1281-4C26-AB70-F51B2E377682}"/>
+                <a16:creationId xmlns:a16="http://schemas.microsoft.com/office/drawing/2014/main" id="{A2E22D75-1281-4C26-AB70-F51B2E377682}"/>
               </a:ext>
             </a:extLst>
           </p:cNvPr>
@@ -28076,7 +28248,7 @@
           <p:cNvPr id="217" name="Text Placeholder 21">
             <a:extLst>
               <a:ext uri="{FF2B5EF4-FFF2-40B4-BE49-F238E27FC236}">
-                <a16:creationId xmlns="" xmlns:a16="http://schemas.microsoft.com/office/drawing/2014/main" id="{731106A2-164A-40EA-AC0D-236AB0076679}"/>
+                <a16:creationId xmlns:a16="http://schemas.microsoft.com/office/drawing/2014/main" id="{731106A2-164A-40EA-AC0D-236AB0076679}"/>
               </a:ext>
             </a:extLst>
           </p:cNvPr>
@@ -28342,7 +28514,7 @@
           <p:cNvPr id="238" name="Text Placeholder 21">
             <a:extLst>
               <a:ext uri="{FF2B5EF4-FFF2-40B4-BE49-F238E27FC236}">
-                <a16:creationId xmlns="" xmlns:a16="http://schemas.microsoft.com/office/drawing/2014/main" id="{B9A344BE-4E51-4A5E-8ED2-F4DA08D56E10}"/>
+                <a16:creationId xmlns:a16="http://schemas.microsoft.com/office/drawing/2014/main" id="{B9A344BE-4E51-4A5E-8ED2-F4DA08D56E10}"/>
               </a:ext>
             </a:extLst>
           </p:cNvPr>
@@ -28353,7 +28525,7 @@
         </p:nvSpPr>
         <p:spPr>
           <a:xfrm>
-            <a:off x="5169729" y="3007066"/>
+            <a:off x="5169729" y="3155924"/>
             <a:ext cx="1077971" cy="307777"/>
           </a:xfrm>
           <a:prstGeom prst="rect">
@@ -28551,7 +28723,7 @@
               <a:defRPr/>
             </a:pPr>
             <a:r>
-              <a:rPr kumimoji="0" lang="en-US" sz="1400" b="1" i="0" u="none" strike="noStrike" kern="1200" cap="none" spc="0" normalizeH="0" baseline="0" noProof="0">
+              <a:rPr kumimoji="0" lang="en-US" sz="1400" b="1" i="0" u="none" strike="noStrike" kern="1200" cap="none" spc="0" normalizeH="0" baseline="0" noProof="0" dirty="0">
                 <a:ln>
                   <a:noFill/>
                 </a:ln>
@@ -28575,7 +28747,7 @@
           <p:cNvPr id="240" name="Text Placeholder 21">
             <a:extLst>
               <a:ext uri="{FF2B5EF4-FFF2-40B4-BE49-F238E27FC236}">
-                <a16:creationId xmlns="" xmlns:a16="http://schemas.microsoft.com/office/drawing/2014/main" id="{5D5663E4-AA13-4F2E-876C-DE439731EB68}"/>
+                <a16:creationId xmlns:a16="http://schemas.microsoft.com/office/drawing/2014/main" id="{5D5663E4-AA13-4F2E-876C-DE439731EB68}"/>
               </a:ext>
             </a:extLst>
           </p:cNvPr>
@@ -28808,7 +28980,7 @@
           <p:cNvPr id="241" name="Text Placeholder 21">
             <a:extLst>
               <a:ext uri="{FF2B5EF4-FFF2-40B4-BE49-F238E27FC236}">
-                <a16:creationId xmlns="" xmlns:a16="http://schemas.microsoft.com/office/drawing/2014/main" id="{E649B733-FF00-487C-B604-BD3698372946}"/>
+                <a16:creationId xmlns:a16="http://schemas.microsoft.com/office/drawing/2014/main" id="{E649B733-FF00-487C-B604-BD3698372946}"/>
               </a:ext>
             </a:extLst>
           </p:cNvPr>
@@ -28819,7 +28991,7 @@
         </p:nvSpPr>
         <p:spPr>
           <a:xfrm>
-            <a:off x="5131182" y="3461084"/>
+            <a:off x="5120474" y="3673443"/>
             <a:ext cx="1109253" cy="307777"/>
           </a:xfrm>
           <a:prstGeom prst="rect">
@@ -29017,7 +29189,7 @@
               <a:defRPr/>
             </a:pPr>
             <a:r>
-              <a:rPr kumimoji="0" lang="en-US" sz="1400" b="1" i="0" u="none" strike="noStrike" kern="1200" cap="none" spc="0" normalizeH="0" baseline="0" noProof="0">
+              <a:rPr kumimoji="0" lang="en-US" sz="1400" b="1" i="0" u="none" strike="noStrike" kern="1200" cap="none" spc="0" normalizeH="0" baseline="0" noProof="0" dirty="0">
                 <a:ln>
                   <a:noFill/>
                 </a:ln>
@@ -29041,7 +29213,7 @@
           <p:cNvPr id="243" name="Text Placeholder 21">
             <a:extLst>
               <a:ext uri="{FF2B5EF4-FFF2-40B4-BE49-F238E27FC236}">
-                <a16:creationId xmlns="" xmlns:a16="http://schemas.microsoft.com/office/drawing/2014/main" id="{224DA034-1982-4759-8224-98F475D559DB}"/>
+                <a16:creationId xmlns:a16="http://schemas.microsoft.com/office/drawing/2014/main" id="{224DA034-1982-4759-8224-98F475D559DB}"/>
               </a:ext>
             </a:extLst>
           </p:cNvPr>
@@ -29052,7 +29224,7 @@
         </p:nvSpPr>
         <p:spPr>
           <a:xfrm>
-            <a:off x="5069537" y="4438664"/>
+            <a:off x="5096347" y="4595537"/>
             <a:ext cx="1285083" cy="523220"/>
           </a:xfrm>
           <a:prstGeom prst="rect">
@@ -29250,7 +29422,7 @@
               <a:defRPr/>
             </a:pPr>
             <a:r>
-              <a:rPr kumimoji="0" lang="en-US" sz="1400" b="1" i="0" u="none" strike="noStrike" kern="1200" cap="none" spc="0" normalizeH="0" baseline="0" noProof="0">
+              <a:rPr kumimoji="0" lang="en-US" sz="1400" b="1" i="0" u="none" strike="noStrike" kern="1200" cap="none" spc="0" normalizeH="0" baseline="0" noProof="0" dirty="0">
                 <a:ln>
                   <a:noFill/>
                 </a:ln>
@@ -29274,7 +29446,7 @@
           <p:cNvPr id="250" name="Text Placeholder 21">
             <a:extLst>
               <a:ext uri="{FF2B5EF4-FFF2-40B4-BE49-F238E27FC236}">
-                <a16:creationId xmlns="" xmlns:a16="http://schemas.microsoft.com/office/drawing/2014/main" id="{BEDA30AA-B581-448C-8CF5-B8A2D0B90FA5}"/>
+                <a16:creationId xmlns:a16="http://schemas.microsoft.com/office/drawing/2014/main" id="{BEDA30AA-B581-448C-8CF5-B8A2D0B90FA5}"/>
               </a:ext>
             </a:extLst>
           </p:cNvPr>
@@ -29507,7 +29679,7 @@
           <p:cNvPr id="252" name="Text Placeholder 21">
             <a:extLst>
               <a:ext uri="{FF2B5EF4-FFF2-40B4-BE49-F238E27FC236}">
-                <a16:creationId xmlns="" xmlns:a16="http://schemas.microsoft.com/office/drawing/2014/main" id="{FAFE339C-ADD0-48D6-9385-8AD1F894DE8C}"/>
+                <a16:creationId xmlns:a16="http://schemas.microsoft.com/office/drawing/2014/main" id="{FAFE339C-ADD0-48D6-9385-8AD1F894DE8C}"/>
               </a:ext>
             </a:extLst>
           </p:cNvPr>
@@ -29740,7 +29912,7 @@
           <p:cNvPr id="258" name="Text Placeholder 21">
             <a:extLst>
               <a:ext uri="{FF2B5EF4-FFF2-40B4-BE49-F238E27FC236}">
-                <a16:creationId xmlns="" xmlns:a16="http://schemas.microsoft.com/office/drawing/2014/main" id="{48F170C1-EE93-48D1-9345-DD6E3D46FE57}"/>
+                <a16:creationId xmlns:a16="http://schemas.microsoft.com/office/drawing/2014/main" id="{48F170C1-EE93-48D1-9345-DD6E3D46FE57}"/>
               </a:ext>
             </a:extLst>
           </p:cNvPr>
@@ -29973,7 +30145,7 @@
           <p:cNvPr id="259" name="Graphic 130">
             <a:extLst>
               <a:ext uri="{FF2B5EF4-FFF2-40B4-BE49-F238E27FC236}">
-                <a16:creationId xmlns="" xmlns:a16="http://schemas.microsoft.com/office/drawing/2014/main" id="{D4A9872D-6F5D-4F86-8CD4-57EC3DE91746}"/>
+                <a16:creationId xmlns:a16="http://schemas.microsoft.com/office/drawing/2014/main" id="{D4A9872D-6F5D-4F86-8CD4-57EC3DE91746}"/>
               </a:ext>
             </a:extLst>
           </p:cNvPr>
@@ -29989,7 +30161,7 @@
                 <a14:useLocalDpi xmlns:a14="http://schemas.microsoft.com/office/drawing/2010/main" val="0"/>
               </a:ext>
               <a:ext uri="{96DAC541-7B7A-43D3-8B79-37D633B846F1}">
-                <asvg:svgBlip xmlns="" xmlns:asvg="http://schemas.microsoft.com/office/drawing/2016/SVG/main" r:embed="rId7"/>
+                <asvg:svgBlip xmlns:asvg="http://schemas.microsoft.com/office/drawing/2016/SVG/main" r:embed="rId7"/>
               </a:ext>
             </a:extLst>
           </a:blip>
@@ -30011,7 +30183,7 @@
           <p:cNvPr id="261" name="Text Placeholder 21">
             <a:extLst>
               <a:ext uri="{FF2B5EF4-FFF2-40B4-BE49-F238E27FC236}">
-                <a16:creationId xmlns="" xmlns:a16="http://schemas.microsoft.com/office/drawing/2014/main" id="{2A73993E-CCB0-43D6-9F40-E6FC30E4ADB2}"/>
+                <a16:creationId xmlns:a16="http://schemas.microsoft.com/office/drawing/2014/main" id="{2A73993E-CCB0-43D6-9F40-E6FC30E4ADB2}"/>
               </a:ext>
             </a:extLst>
           </p:cNvPr>
@@ -30244,7 +30416,7 @@
           <p:cNvPr id="262" name="Text Placeholder 21">
             <a:extLst>
               <a:ext uri="{FF2B5EF4-FFF2-40B4-BE49-F238E27FC236}">
-                <a16:creationId xmlns="" xmlns:a16="http://schemas.microsoft.com/office/drawing/2014/main" id="{A1D344C8-16FD-4EB7-8989-80CEDACBC1C1}"/>
+                <a16:creationId xmlns:a16="http://schemas.microsoft.com/office/drawing/2014/main" id="{A1D344C8-16FD-4EB7-8989-80CEDACBC1C1}"/>
               </a:ext>
             </a:extLst>
           </p:cNvPr>
@@ -30477,7 +30649,7 @@
           <p:cNvPr id="264" name="Text Placeholder 21">
             <a:extLst>
               <a:ext uri="{FF2B5EF4-FFF2-40B4-BE49-F238E27FC236}">
-                <a16:creationId xmlns="" xmlns:a16="http://schemas.microsoft.com/office/drawing/2014/main" id="{4414C06B-BCCE-40CB-BA83-172815D8AEB7}"/>
+                <a16:creationId xmlns:a16="http://schemas.microsoft.com/office/drawing/2014/main" id="{4414C06B-BCCE-40CB-BA83-172815D8AEB7}"/>
               </a:ext>
             </a:extLst>
           </p:cNvPr>
@@ -30817,7 +30989,7 @@
           <p:cNvPr id="89" name="Text Placeholder 2">
             <a:extLst>
               <a:ext uri="{FF2B5EF4-FFF2-40B4-BE49-F238E27FC236}">
-                <a16:creationId xmlns="" xmlns:a16="http://schemas.microsoft.com/office/drawing/2014/main" id="{6F5F790F-4232-449B-B75C-6E24EAFC007B}"/>
+                <a16:creationId xmlns:a16="http://schemas.microsoft.com/office/drawing/2014/main" id="{6F5F790F-4232-449B-B75C-6E24EAFC007B}"/>
               </a:ext>
             </a:extLst>
           </p:cNvPr>
@@ -31064,7 +31236,7 @@
           <p:cNvPr id="104" name="Text Placeholder 21">
             <a:extLst>
               <a:ext uri="{FF2B5EF4-FFF2-40B4-BE49-F238E27FC236}">
-                <a16:creationId xmlns="" xmlns:a16="http://schemas.microsoft.com/office/drawing/2014/main" id="{C39FE1DD-0229-4895-94C2-984E07F8163E}"/>
+                <a16:creationId xmlns:a16="http://schemas.microsoft.com/office/drawing/2014/main" id="{C39FE1DD-0229-4895-94C2-984E07F8163E}"/>
               </a:ext>
             </a:extLst>
           </p:cNvPr>
@@ -31304,41 +31476,7 @@
                 <a:ea typeface="+mn-ea"/>
                 <a:cs typeface="Segoe UI Light" panose="020B0502040204020203" pitchFamily="34" charset="0"/>
               </a:rPr>
-              <a:t> </a:t>
-            </a:r>
-            <a:r>
-              <a:rPr kumimoji="0" lang="en-US" sz="1400" b="1" i="0" u="none" strike="noStrike" kern="1200" cap="none" spc="0" normalizeH="0" baseline="0" noProof="0" dirty="0" smtClean="0">
-                <a:ln>
-                  <a:noFill/>
-                </a:ln>
-                <a:solidFill>
-                  <a:schemeClr val="bg1"/>
-                </a:solidFill>
-                <a:effectLst/>
-                <a:uLnTx/>
-                <a:uFillTx/>
-                <a:latin typeface="Segoe UI"/>
-                <a:ea typeface="+mn-ea"/>
-                <a:cs typeface="Segoe UI Light" panose="020B0502040204020203" pitchFamily="34" charset="0"/>
-              </a:rPr>
-              <a:t>Multiplayer </a:t>
-            </a:r>
-            <a:r>
-              <a:rPr kumimoji="0" lang="en-US" sz="1400" b="1" i="0" u="none" strike="noStrike" kern="1200" cap="none" spc="0" normalizeH="0" baseline="0" noProof="0" dirty="0">
-                <a:ln>
-                  <a:noFill/>
-                </a:ln>
-                <a:solidFill>
-                  <a:schemeClr val="bg1"/>
-                </a:solidFill>
-                <a:effectLst/>
-                <a:uLnTx/>
-                <a:uFillTx/>
-                <a:latin typeface="Segoe UI"/>
-                <a:ea typeface="+mn-ea"/>
-                <a:cs typeface="Segoe UI Light" panose="020B0502040204020203" pitchFamily="34" charset="0"/>
-              </a:rPr>
-              <a:t>Services</a:t>
+              <a:t> Multiplayer Services</a:t>
             </a:r>
           </a:p>
         </p:txBody>
@@ -31348,7 +31486,7 @@
           <p:cNvPr id="108" name="Text Placeholder 21">
             <a:extLst>
               <a:ext uri="{FF2B5EF4-FFF2-40B4-BE49-F238E27FC236}">
-                <a16:creationId xmlns="" xmlns:a16="http://schemas.microsoft.com/office/drawing/2014/main" id="{EF04CDCA-5019-422D-9D69-A17C7EB4688F}"/>
+                <a16:creationId xmlns:a16="http://schemas.microsoft.com/office/drawing/2014/main" id="{EF04CDCA-5019-422D-9D69-A17C7EB4688F}"/>
               </a:ext>
             </a:extLst>
           </p:cNvPr>
@@ -31581,7 +31719,7 @@
           <p:cNvPr id="106" name="Text Placeholder 21">
             <a:extLst>
               <a:ext uri="{FF2B5EF4-FFF2-40B4-BE49-F238E27FC236}">
-                <a16:creationId xmlns="" xmlns:a16="http://schemas.microsoft.com/office/drawing/2014/main" id="{F35EB05A-835E-47E2-BFC0-3C7CDBC00503}"/>
+                <a16:creationId xmlns:a16="http://schemas.microsoft.com/office/drawing/2014/main" id="{F35EB05A-835E-47E2-BFC0-3C7CDBC00503}"/>
               </a:ext>
             </a:extLst>
           </p:cNvPr>
@@ -31818,7 +31956,7 @@
           <p:cNvPr id="107" name="Text Placeholder 21">
             <a:extLst>
               <a:ext uri="{FF2B5EF4-FFF2-40B4-BE49-F238E27FC236}">
-                <a16:creationId xmlns="" xmlns:a16="http://schemas.microsoft.com/office/drawing/2014/main" id="{DB7294F3-D0FA-4BCA-991F-250B44FF88EA}"/>
+                <a16:creationId xmlns:a16="http://schemas.microsoft.com/office/drawing/2014/main" id="{DB7294F3-D0FA-4BCA-991F-250B44FF88EA}"/>
               </a:ext>
             </a:extLst>
           </p:cNvPr>
@@ -32055,7 +32193,7 @@
           <p:cNvPr id="114" name="Text Placeholder 21">
             <a:extLst>
               <a:ext uri="{FF2B5EF4-FFF2-40B4-BE49-F238E27FC236}">
-                <a16:creationId xmlns="" xmlns:a16="http://schemas.microsoft.com/office/drawing/2014/main" id="{BB1D1F88-C170-4FF9-92AF-446AD7A8B7B7}"/>
+                <a16:creationId xmlns:a16="http://schemas.microsoft.com/office/drawing/2014/main" id="{BB1D1F88-C170-4FF9-92AF-446AD7A8B7B7}"/>
               </a:ext>
             </a:extLst>
           </p:cNvPr>
@@ -32066,7 +32204,7 @@
         </p:nvSpPr>
         <p:spPr>
           <a:xfrm>
-            <a:off x="5019201" y="3985051"/>
+            <a:off x="5081103" y="4197096"/>
             <a:ext cx="1285083" cy="307777"/>
           </a:xfrm>
           <a:prstGeom prst="rect">
@@ -32264,7 +32402,7 @@
               <a:defRPr/>
             </a:pPr>
             <a:r>
-              <a:rPr kumimoji="0" lang="en-US" sz="1400" b="1" i="0" u="none" strike="noStrike" kern="1200" cap="none" spc="0" normalizeH="0" baseline="0" noProof="0">
+              <a:rPr kumimoji="0" lang="en-US" sz="1400" b="1" i="0" u="none" strike="noStrike" kern="1200" cap="none" spc="0" normalizeH="0" baseline="0" noProof="0" dirty="0">
                 <a:ln>
                   <a:noFill/>
                 </a:ln>
@@ -32288,7 +32426,7 @@
           <p:cNvPr id="4" name="Graphic 3">
             <a:extLst>
               <a:ext uri="{FF2B5EF4-FFF2-40B4-BE49-F238E27FC236}">
-                <a16:creationId xmlns="" xmlns:a16="http://schemas.microsoft.com/office/drawing/2014/main" id="{79F78CD6-B772-47C0-B98E-7CBA3BE352DF}"/>
+                <a16:creationId xmlns:a16="http://schemas.microsoft.com/office/drawing/2014/main" id="{79F78CD6-B772-47C0-B98E-7CBA3BE352DF}"/>
               </a:ext>
             </a:extLst>
           </p:cNvPr>
@@ -32301,7 +32439,7 @@
           <a:blip r:embed="rId9">
             <a:extLst>
               <a:ext uri="{96DAC541-7B7A-43D3-8B79-37D633B846F1}">
-                <asvg:svgBlip xmlns="" xmlns:asvg="http://schemas.microsoft.com/office/drawing/2016/SVG/main" r:embed="rId10"/>
+                <asvg:svgBlip xmlns:asvg="http://schemas.microsoft.com/office/drawing/2016/SVG/main" r:embed="rId10"/>
               </a:ext>
             </a:extLst>
           </a:blip>
@@ -32324,7 +32462,7 @@
           <p:cNvPr id="121" name="Cosmos DB" descr="Cosmos DB">
             <a:extLst>
               <a:ext uri="{FF2B5EF4-FFF2-40B4-BE49-F238E27FC236}">
-                <a16:creationId xmlns="" xmlns:a16="http://schemas.microsoft.com/office/drawing/2014/main" id="{C0D41283-C759-4429-A0BA-9E41AE52EB88}"/>
+                <a16:creationId xmlns:a16="http://schemas.microsoft.com/office/drawing/2014/main" id="{C0D41283-C759-4429-A0BA-9E41AE52EB88}"/>
               </a:ext>
             </a:extLst>
           </p:cNvPr>
@@ -32354,7 +32492,7 @@
           <p:cNvPr id="122" name="Container Registry" descr="Container Registry">
             <a:extLst>
               <a:ext uri="{FF2B5EF4-FFF2-40B4-BE49-F238E27FC236}">
-                <a16:creationId xmlns="" xmlns:a16="http://schemas.microsoft.com/office/drawing/2014/main" id="{39D91575-9C62-4D73-9B86-4E0D27713F52}"/>
+                <a16:creationId xmlns:a16="http://schemas.microsoft.com/office/drawing/2014/main" id="{39D91575-9C62-4D73-9B86-4E0D27713F52}"/>
               </a:ext>
             </a:extLst>
           </p:cNvPr>
@@ -32384,7 +32522,7 @@
           <p:cNvPr id="123" name="Azure Database for MySQL" descr="Azure Database for MySQL">
             <a:extLst>
               <a:ext uri="{FF2B5EF4-FFF2-40B4-BE49-F238E27FC236}">
-                <a16:creationId xmlns="" xmlns:a16="http://schemas.microsoft.com/office/drawing/2014/main" id="{3A317D81-1D2D-4F6C-A9C5-4E2CB178F43B}"/>
+                <a16:creationId xmlns:a16="http://schemas.microsoft.com/office/drawing/2014/main" id="{3A317D81-1D2D-4F6C-A9C5-4E2CB178F43B}"/>
               </a:ext>
             </a:extLst>
           </p:cNvPr>
@@ -32414,7 +32552,7 @@
           <p:cNvPr id="124" name="Azure Database for Post-gress SQL" descr="Azure Database for Post-gress SQL">
             <a:extLst>
               <a:ext uri="{FF2B5EF4-FFF2-40B4-BE49-F238E27FC236}">
-                <a16:creationId xmlns="" xmlns:a16="http://schemas.microsoft.com/office/drawing/2014/main" id="{CD744DFA-5B3B-464B-9513-9E18934FDB9D}"/>
+                <a16:creationId xmlns:a16="http://schemas.microsoft.com/office/drawing/2014/main" id="{CD744DFA-5B3B-464B-9513-9E18934FDB9D}"/>
               </a:ext>
             </a:extLst>
           </p:cNvPr>
@@ -32444,7 +32582,7 @@
           <p:cNvPr id="125" name="Data Warehouse" descr="Data Warehouse">
             <a:extLst>
               <a:ext uri="{FF2B5EF4-FFF2-40B4-BE49-F238E27FC236}">
-                <a16:creationId xmlns="" xmlns:a16="http://schemas.microsoft.com/office/drawing/2014/main" id="{3FBEE19C-7979-49DC-AC0F-639F233C3599}"/>
+                <a16:creationId xmlns:a16="http://schemas.microsoft.com/office/drawing/2014/main" id="{3FBEE19C-7979-49DC-AC0F-639F233C3599}"/>
               </a:ext>
             </a:extLst>
           </p:cNvPr>
@@ -32474,7 +32612,7 @@
           <p:cNvPr id="126" name="Azure DevOps 3" descr="Azure DevOps">
             <a:extLst>
               <a:ext uri="{FF2B5EF4-FFF2-40B4-BE49-F238E27FC236}">
-                <a16:creationId xmlns="" xmlns:a16="http://schemas.microsoft.com/office/drawing/2014/main" id="{2EDD3D61-7643-475F-A006-C25C9474371D}"/>
+                <a16:creationId xmlns:a16="http://schemas.microsoft.com/office/drawing/2014/main" id="{2EDD3D61-7643-475F-A006-C25C9474371D}"/>
               </a:ext>
             </a:extLst>
           </p:cNvPr>
@@ -32504,7 +32642,7 @@
           <p:cNvPr id="128" name="Maria DB" descr="Maria DB">
             <a:extLst>
               <a:ext uri="{FF2B5EF4-FFF2-40B4-BE49-F238E27FC236}">
-                <a16:creationId xmlns="" xmlns:a16="http://schemas.microsoft.com/office/drawing/2014/main" id="{30630002-BA0D-4078-945F-31354CB05A87}"/>
+                <a16:creationId xmlns:a16="http://schemas.microsoft.com/office/drawing/2014/main" id="{30630002-BA0D-4078-945F-31354CB05A87}"/>
               </a:ext>
             </a:extLst>
           </p:cNvPr>
@@ -32520,7 +32658,7 @@
                 <a14:useLocalDpi xmlns:a14="http://schemas.microsoft.com/office/drawing/2010/main" val="0"/>
               </a:ext>
               <a:ext uri="{96DAC541-7B7A-43D3-8B79-37D633B846F1}">
-                <asvg:svgBlip xmlns="" xmlns:asvg="http://schemas.microsoft.com/office/drawing/2016/SVG/main" r:embed="rId18"/>
+                <asvg:svgBlip xmlns:asvg="http://schemas.microsoft.com/office/drawing/2016/SVG/main" r:embed="rId18"/>
               </a:ext>
             </a:extLst>
           </a:blip>
@@ -32543,7 +32681,7 @@
           <p:cNvPr id="129" name="Office 365" descr="Office 365">
             <a:extLst>
               <a:ext uri="{FF2B5EF4-FFF2-40B4-BE49-F238E27FC236}">
-                <a16:creationId xmlns="" xmlns:a16="http://schemas.microsoft.com/office/drawing/2014/main" id="{4B88FCF7-4B52-4F75-BF36-C2E5E106B2AB}"/>
+                <a16:creationId xmlns:a16="http://schemas.microsoft.com/office/drawing/2014/main" id="{4B88FCF7-4B52-4F75-BF36-C2E5E106B2AB}"/>
               </a:ext>
             </a:extLst>
           </p:cNvPr>
@@ -32559,7 +32697,7 @@
                 <a14:useLocalDpi xmlns:a14="http://schemas.microsoft.com/office/drawing/2010/main" val="0"/>
               </a:ext>
               <a:ext uri="{96DAC541-7B7A-43D3-8B79-37D633B846F1}">
-                <asvg:svgBlip xmlns="" xmlns:asvg="http://schemas.microsoft.com/office/drawing/2016/SVG/main" r:embed="rId20"/>
+                <asvg:svgBlip xmlns:asvg="http://schemas.microsoft.com/office/drawing/2016/SVG/main" r:embed="rId20"/>
               </a:ext>
             </a:extLst>
           </a:blip>
@@ -32582,7 +32720,7 @@
           <p:cNvPr id="130" name="Stream Analytics" descr="Stream Analytics">
             <a:extLst>
               <a:ext uri="{FF2B5EF4-FFF2-40B4-BE49-F238E27FC236}">
-                <a16:creationId xmlns="" xmlns:a16="http://schemas.microsoft.com/office/drawing/2014/main" id="{C5E2814E-C86E-4726-8B74-D7D8E03D716E}"/>
+                <a16:creationId xmlns:a16="http://schemas.microsoft.com/office/drawing/2014/main" id="{C5E2814E-C86E-4726-8B74-D7D8E03D716E}"/>
               </a:ext>
             </a:extLst>
           </p:cNvPr>
@@ -32598,7 +32736,7 @@
                 <a14:useLocalDpi xmlns:a14="http://schemas.microsoft.com/office/drawing/2010/main" val="0"/>
               </a:ext>
               <a:ext uri="{96DAC541-7B7A-43D3-8B79-37D633B846F1}">
-                <asvg:svgBlip xmlns="" xmlns:asvg="http://schemas.microsoft.com/office/drawing/2016/SVG/main" r:embed="rId22"/>
+                <asvg:svgBlip xmlns:asvg="http://schemas.microsoft.com/office/drawing/2016/SVG/main" r:embed="rId22"/>
               </a:ext>
             </a:extLst>
           </a:blip>
@@ -32621,7 +32759,7 @@
           <p:cNvPr id="131" name="SQL Database" descr="SQL Database">
             <a:extLst>
               <a:ext uri="{FF2B5EF4-FFF2-40B4-BE49-F238E27FC236}">
-                <a16:creationId xmlns="" xmlns:a16="http://schemas.microsoft.com/office/drawing/2014/main" id="{F072A6F1-BE57-4878-96B2-F9293B55D406}"/>
+                <a16:creationId xmlns:a16="http://schemas.microsoft.com/office/drawing/2014/main" id="{F072A6F1-BE57-4878-96B2-F9293B55D406}"/>
               </a:ext>
             </a:extLst>
           </p:cNvPr>
@@ -32637,7 +32775,7 @@
                 <a14:useLocalDpi xmlns:a14="http://schemas.microsoft.com/office/drawing/2010/main" val="0"/>
               </a:ext>
               <a:ext uri="{96DAC541-7B7A-43D3-8B79-37D633B846F1}">
-                <asvg:svgBlip xmlns="" xmlns:asvg="http://schemas.microsoft.com/office/drawing/2016/SVG/main" r:embed="rId24"/>
+                <asvg:svgBlip xmlns:asvg="http://schemas.microsoft.com/office/drawing/2016/SVG/main" r:embed="rId24"/>
               </a:ext>
             </a:extLst>
           </a:blip>
@@ -32660,7 +32798,7 @@
           <p:cNvPr id="132" name="Azure Stack 2" descr="Azure Stack">
             <a:extLst>
               <a:ext uri="{FF2B5EF4-FFF2-40B4-BE49-F238E27FC236}">
-                <a16:creationId xmlns="" xmlns:a16="http://schemas.microsoft.com/office/drawing/2014/main" id="{FED7E39E-B91F-4781-995B-A4098CB758AF}"/>
+                <a16:creationId xmlns:a16="http://schemas.microsoft.com/office/drawing/2014/main" id="{FED7E39E-B91F-4781-995B-A4098CB758AF}"/>
               </a:ext>
             </a:extLst>
           </p:cNvPr>
@@ -32676,7 +32814,7 @@
                 <a14:useLocalDpi xmlns:a14="http://schemas.microsoft.com/office/drawing/2010/main" val="0"/>
               </a:ext>
               <a:ext uri="{96DAC541-7B7A-43D3-8B79-37D633B846F1}">
-                <asvg:svgBlip xmlns="" xmlns:asvg="http://schemas.microsoft.com/office/drawing/2016/SVG/main" r:embed="rId26"/>
+                <asvg:svgBlip xmlns:asvg="http://schemas.microsoft.com/office/drawing/2016/SVG/main" r:embed="rId26"/>
               </a:ext>
             </a:extLst>
           </a:blip>
@@ -32699,7 +32837,7 @@
           <p:cNvPr id="135" name="Monitor" descr="Monitor">
             <a:extLst>
               <a:ext uri="{FF2B5EF4-FFF2-40B4-BE49-F238E27FC236}">
-                <a16:creationId xmlns="" xmlns:a16="http://schemas.microsoft.com/office/drawing/2014/main" id="{F7586317-C4DE-4188-A1D9-08D4E13113F8}"/>
+                <a16:creationId xmlns:a16="http://schemas.microsoft.com/office/drawing/2014/main" id="{F7586317-C4DE-4188-A1D9-08D4E13113F8}"/>
               </a:ext>
             </a:extLst>
           </p:cNvPr>
@@ -32715,7 +32853,7 @@
                 <a14:useLocalDpi xmlns:a14="http://schemas.microsoft.com/office/drawing/2010/main" val="0"/>
               </a:ext>
               <a:ext uri="{96DAC541-7B7A-43D3-8B79-37D633B846F1}">
-                <asvg:svgBlip xmlns="" xmlns:asvg="http://schemas.microsoft.com/office/drawing/2016/SVG/main" r:embed="rId28"/>
+                <asvg:svgBlip xmlns:asvg="http://schemas.microsoft.com/office/drawing/2016/SVG/main" r:embed="rId28"/>
               </a:ext>
             </a:extLst>
           </a:blip>
@@ -32738,7 +32876,7 @@
           <p:cNvPr id="136" name="Dynamics 365" descr="Dynamics 365">
             <a:extLst>
               <a:ext uri="{FF2B5EF4-FFF2-40B4-BE49-F238E27FC236}">
-                <a16:creationId xmlns="" xmlns:a16="http://schemas.microsoft.com/office/drawing/2014/main" id="{D21897DB-BFA7-48B7-9511-C5EEEA4EAA41}"/>
+                <a16:creationId xmlns:a16="http://schemas.microsoft.com/office/drawing/2014/main" id="{D21897DB-BFA7-48B7-9511-C5EEEA4EAA41}"/>
               </a:ext>
             </a:extLst>
           </p:cNvPr>
@@ -32768,7 +32906,7 @@
           <p:cNvPr id="137" name="Event Hubs" descr="Event Hubs">
             <a:extLst>
               <a:ext uri="{FF2B5EF4-FFF2-40B4-BE49-F238E27FC236}">
-                <a16:creationId xmlns="" xmlns:a16="http://schemas.microsoft.com/office/drawing/2014/main" id="{5F2BD8C5-EA48-4DEE-9D7F-073435896F66}"/>
+                <a16:creationId xmlns:a16="http://schemas.microsoft.com/office/drawing/2014/main" id="{5F2BD8C5-EA48-4DEE-9D7F-073435896F66}"/>
               </a:ext>
             </a:extLst>
           </p:cNvPr>
@@ -32798,7 +32936,7 @@
           <p:cNvPr id="138" name="Event Grid" descr="Event Grid">
             <a:extLst>
               <a:ext uri="{FF2B5EF4-FFF2-40B4-BE49-F238E27FC236}">
-                <a16:creationId xmlns="" xmlns:a16="http://schemas.microsoft.com/office/drawing/2014/main" id="{24097FBB-549C-4D8B-8AE7-C1DDFDB3D727}"/>
+                <a16:creationId xmlns:a16="http://schemas.microsoft.com/office/drawing/2014/main" id="{24097FBB-549C-4D8B-8AE7-C1DDFDB3D727}"/>
               </a:ext>
             </a:extLst>
           </p:cNvPr>
@@ -32828,7 +32966,7 @@
           <p:cNvPr id="139" name="IoT Hub" descr="IoT Hub">
             <a:extLst>
               <a:ext uri="{FF2B5EF4-FFF2-40B4-BE49-F238E27FC236}">
-                <a16:creationId xmlns="" xmlns:a16="http://schemas.microsoft.com/office/drawing/2014/main" id="{00D315BB-80A8-4EC5-9A3E-B89EC5AC3F35}"/>
+                <a16:creationId xmlns:a16="http://schemas.microsoft.com/office/drawing/2014/main" id="{00D315BB-80A8-4EC5-9A3E-B89EC5AC3F35}"/>
               </a:ext>
             </a:extLst>
           </p:cNvPr>
@@ -32858,7 +32996,7 @@
           <p:cNvPr id="140" name="Service Bus (New)" descr="Service Bus (New)">
             <a:extLst>
               <a:ext uri="{FF2B5EF4-FFF2-40B4-BE49-F238E27FC236}">
-                <a16:creationId xmlns="" xmlns:a16="http://schemas.microsoft.com/office/drawing/2014/main" id="{A03BA885-12D0-4CFF-80BF-62378FD38AAD}"/>
+                <a16:creationId xmlns:a16="http://schemas.microsoft.com/office/drawing/2014/main" id="{A03BA885-12D0-4CFF-80BF-62378FD38AAD}"/>
               </a:ext>
             </a:extLst>
           </p:cNvPr>
@@ -32874,7 +33012,7 @@
                 <a14:useLocalDpi xmlns:a14="http://schemas.microsoft.com/office/drawing/2010/main" val="0"/>
               </a:ext>
               <a:ext uri="{96DAC541-7B7A-43D3-8B79-37D633B846F1}">
-                <asvg:svgBlip xmlns="" xmlns:asvg="http://schemas.microsoft.com/office/drawing/2016/SVG/main" r:embed="rId34"/>
+                <asvg:svgBlip xmlns:asvg="http://schemas.microsoft.com/office/drawing/2016/SVG/main" r:embed="rId34"/>
               </a:ext>
             </a:extLst>
           </a:blip>
@@ -32897,7 +33035,7 @@
           <p:cNvPr id="235" name="Picture 234">
             <a:extLst>
               <a:ext uri="{FF2B5EF4-FFF2-40B4-BE49-F238E27FC236}">
-                <a16:creationId xmlns="" xmlns:a16="http://schemas.microsoft.com/office/drawing/2014/main" id="{0767B810-6C21-43EF-9BB4-5E3F40A42AC7}"/>
+                <a16:creationId xmlns:a16="http://schemas.microsoft.com/office/drawing/2014/main" id="{0767B810-6C21-43EF-9BB4-5E3F40A42AC7}"/>
               </a:ext>
             </a:extLst>
           </p:cNvPr>
@@ -32938,7 +33076,7 @@
           <p:cNvPr id="236" name="Picture 235">
             <a:extLst>
               <a:ext uri="{FF2B5EF4-FFF2-40B4-BE49-F238E27FC236}">
-                <a16:creationId xmlns="" xmlns:a16="http://schemas.microsoft.com/office/drawing/2014/main" id="{2ABE0501-4B48-4315-911A-FCC4111194E1}"/>
+                <a16:creationId xmlns:a16="http://schemas.microsoft.com/office/drawing/2014/main" id="{2ABE0501-4B48-4315-911A-FCC4111194E1}"/>
               </a:ext>
             </a:extLst>
           </p:cNvPr>
@@ -32979,7 +33117,7 @@
           <p:cNvPr id="251" name="Graphic 250">
             <a:extLst>
               <a:ext uri="{FF2B5EF4-FFF2-40B4-BE49-F238E27FC236}">
-                <a16:creationId xmlns="" xmlns:a16="http://schemas.microsoft.com/office/drawing/2014/main" id="{B6A6914B-34AD-4701-B3E6-9B2E7C45BD5E}"/>
+                <a16:creationId xmlns:a16="http://schemas.microsoft.com/office/drawing/2014/main" id="{B6A6914B-34AD-4701-B3E6-9B2E7C45BD5E}"/>
               </a:ext>
             </a:extLst>
           </p:cNvPr>
@@ -32992,7 +33130,7 @@
           <a:blip r:embed="rId37">
             <a:extLst>
               <a:ext uri="{96DAC541-7B7A-43D3-8B79-37D633B846F1}">
-                <asvg:svgBlip xmlns="" xmlns:asvg="http://schemas.microsoft.com/office/drawing/2016/SVG/main" r:embed="rId38"/>
+                <asvg:svgBlip xmlns:asvg="http://schemas.microsoft.com/office/drawing/2016/SVG/main" r:embed="rId38"/>
               </a:ext>
             </a:extLst>
           </a:blip>
@@ -33015,7 +33153,7 @@
           <p:cNvPr id="254" name="Graphic 253">
             <a:extLst>
               <a:ext uri="{FF2B5EF4-FFF2-40B4-BE49-F238E27FC236}">
-                <a16:creationId xmlns="" xmlns:a16="http://schemas.microsoft.com/office/drawing/2014/main" id="{06F431A0-F89D-49F2-90D3-EE8FD8906EB7}"/>
+                <a16:creationId xmlns:a16="http://schemas.microsoft.com/office/drawing/2014/main" id="{06F431A0-F89D-49F2-90D3-EE8FD8906EB7}"/>
               </a:ext>
             </a:extLst>
           </p:cNvPr>
@@ -33028,7 +33166,7 @@
           <a:blip r:embed="rId39">
             <a:extLst>
               <a:ext uri="{96DAC541-7B7A-43D3-8B79-37D633B846F1}">
-                <asvg:svgBlip xmlns="" xmlns:asvg="http://schemas.microsoft.com/office/drawing/2016/SVG/main" r:embed="rId40"/>
+                <asvg:svgBlip xmlns:asvg="http://schemas.microsoft.com/office/drawing/2016/SVG/main" r:embed="rId40"/>
               </a:ext>
             </a:extLst>
           </a:blip>
@@ -33051,7 +33189,7 @@
           <p:cNvPr id="134" name="Microsoft Teams" descr="Microsoft Teams">
             <a:extLst>
               <a:ext uri="{FF2B5EF4-FFF2-40B4-BE49-F238E27FC236}">
-                <a16:creationId xmlns="" xmlns:a16="http://schemas.microsoft.com/office/drawing/2014/main" id="{0C0D3893-C86B-46F4-A96E-0990EC977272}"/>
+                <a16:creationId xmlns:a16="http://schemas.microsoft.com/office/drawing/2014/main" id="{0C0D3893-C86B-46F4-A96E-0990EC977272}"/>
               </a:ext>
             </a:extLst>
           </p:cNvPr>
@@ -33067,7 +33205,7 @@
                 <a14:useLocalDpi xmlns:a14="http://schemas.microsoft.com/office/drawing/2010/main" val="0"/>
               </a:ext>
               <a:ext uri="{96DAC541-7B7A-43D3-8B79-37D633B846F1}">
-                <asvg:svgBlip xmlns="" xmlns:asvg="http://schemas.microsoft.com/office/drawing/2016/SVG/main" r:embed="rId42"/>
+                <asvg:svgBlip xmlns:asvg="http://schemas.microsoft.com/office/drawing/2016/SVG/main" r:embed="rId42"/>
               </a:ext>
             </a:extLst>
           </a:blip>
@@ -33099,17 +33237,10 @@
     <mc:Choice Requires="p14">
       <p:transition p14:dur="10"/>
     </mc:Choice>
-    <mc:Fallback xmlns="" xmlns:a16="http://schemas.microsoft.com/office/drawing/2014/main" xmlns:asvg="http://schemas.microsoft.com/office/drawing/2016/SVG/main" xmlns:a14="http://schemas.microsoft.com/office/drawing/2010/main">
+    <mc:Fallback xmlns:a14="http://schemas.microsoft.com/office/drawing/2010/main" xmlns:asvg="http://schemas.microsoft.com/office/drawing/2016/SVG/main" xmlns:a16="http://schemas.microsoft.com/office/drawing/2014/main" xmlns="">
       <p:transition/>
     </mc:Fallback>
   </mc:AlternateContent>
-  <p:timing>
-    <p:tnLst>
-      <p:par>
-        <p:cTn id="1" dur="indefinite" restart="never" nodeType="tmRoot"/>
-      </p:par>
-    </p:tnLst>
-  </p:timing>
 </p:sld>
 </file>
 

</xml_diff>

<commit_message>
Update ppt with app insights example
</commit_message>
<xml_diff>
--- a/Resources/Using Service Fabric as a Platform.pptx
+++ b/Resources/Using Service Fabric as a Platform.pptx
@@ -5,7 +5,7 @@
     <p:sldMasterId id="2147483853" r:id="rId1"/>
   </p:sldMasterIdLst>
   <p:notesMasterIdLst>
-    <p:notesMasterId r:id="rId24"/>
+    <p:notesMasterId r:id="rId25"/>
   </p:notesMasterIdLst>
   <p:sldIdLst>
     <p:sldId id="256" r:id="rId2"/>
@@ -26,10 +26,11 @@
     <p:sldId id="263" r:id="rId17"/>
     <p:sldId id="279" r:id="rId18"/>
     <p:sldId id="272" r:id="rId19"/>
-    <p:sldId id="278" r:id="rId20"/>
-    <p:sldId id="270" r:id="rId21"/>
-    <p:sldId id="266" r:id="rId22"/>
-    <p:sldId id="267" r:id="rId23"/>
+    <p:sldId id="280" r:id="rId20"/>
+    <p:sldId id="278" r:id="rId21"/>
+    <p:sldId id="270" r:id="rId22"/>
+    <p:sldId id="266" r:id="rId23"/>
+    <p:sldId id="267" r:id="rId24"/>
   </p:sldIdLst>
   <p:sldSz cx="12192000" cy="6858000"/>
   <p:notesSz cx="6858000" cy="9144000"/>
@@ -780,7 +781,7 @@
                 <a:tabLst/>
                 <a:defRPr/>
               </a:pPr>
-              <a:t>2/28/2020 11:00 AM</a:t>
+              <a:t>2/28/2020 10:44 PM</a:t>
             </a:fld>
             <a:endParaRPr kumimoji="0" lang="en-US" sz="1200" b="0" i="0" u="none" strike="noStrike" kern="1200" cap="none" spc="0" normalizeH="0" baseline="0" noProof="0">
               <a:ln>
@@ -15574,6 +15575,581 @@
           <a:chExt cx="0" cy="0"/>
         </a:xfrm>
       </p:grpSpPr>
+      <p:sp>
+        <p:nvSpPr>
+          <p:cNvPr id="5" name="Title 1">
+            <a:extLst>
+              <a:ext uri="{FF2B5EF4-FFF2-40B4-BE49-F238E27FC236}">
+                <a16:creationId xmlns:a16="http://schemas.microsoft.com/office/drawing/2014/main" id="{FC17E063-BA3B-49F0-B426-C6EDE2CF67C6}"/>
+              </a:ext>
+            </a:extLst>
+          </p:cNvPr>
+          <p:cNvSpPr txBox="1">
+            <a:spLocks/>
+          </p:cNvSpPr>
+          <p:nvPr/>
+        </p:nvSpPr>
+        <p:spPr>
+          <a:xfrm>
+            <a:off x="685801" y="296281"/>
+            <a:ext cx="10131425" cy="1268545"/>
+          </a:xfrm>
+          <a:prstGeom prst="rect">
+            <a:avLst/>
+          </a:prstGeom>
+          <a:effectLst/>
+        </p:spPr>
+        <p:txBody>
+          <a:bodyPr vert="horz" lIns="91440" tIns="45720" rIns="91440" bIns="45720" rtlCol="0" anchor="ctr">
+            <a:normAutofit/>
+          </a:bodyPr>
+          <a:lstStyle>
+            <a:lvl1pPr algn="l" defTabSz="457200" rtl="0" eaLnBrk="1" latinLnBrk="0" hangingPunct="1">
+              <a:spcBef>
+                <a:spcPct val="0"/>
+              </a:spcBef>
+              <a:buNone/>
+              <a:defRPr sz="3600" kern="1200" cap="all">
+                <a:ln w="3175" cmpd="sng">
+                  <a:noFill/>
+                </a:ln>
+                <a:solidFill>
+                  <a:schemeClr val="tx1"/>
+                </a:solidFill>
+                <a:effectLst/>
+                <a:latin typeface="+mj-lt"/>
+                <a:ea typeface="+mj-ea"/>
+                <a:cs typeface="+mj-cs"/>
+              </a:defRPr>
+            </a:lvl1pPr>
+            <a:lvl2pPr eaLnBrk="1" hangingPunct="1">
+              <a:defRPr>
+                <a:solidFill>
+                  <a:schemeClr val="tx2"/>
+                </a:solidFill>
+              </a:defRPr>
+            </a:lvl2pPr>
+            <a:lvl3pPr eaLnBrk="1" hangingPunct="1">
+              <a:defRPr>
+                <a:solidFill>
+                  <a:schemeClr val="tx2"/>
+                </a:solidFill>
+              </a:defRPr>
+            </a:lvl3pPr>
+            <a:lvl4pPr eaLnBrk="1" hangingPunct="1">
+              <a:defRPr>
+                <a:solidFill>
+                  <a:schemeClr val="tx2"/>
+                </a:solidFill>
+              </a:defRPr>
+            </a:lvl4pPr>
+            <a:lvl5pPr eaLnBrk="1" hangingPunct="1">
+              <a:defRPr>
+                <a:solidFill>
+                  <a:schemeClr val="tx2"/>
+                </a:solidFill>
+              </a:defRPr>
+            </a:lvl5pPr>
+            <a:lvl6pPr eaLnBrk="1" hangingPunct="1">
+              <a:defRPr>
+                <a:solidFill>
+                  <a:schemeClr val="tx2"/>
+                </a:solidFill>
+              </a:defRPr>
+            </a:lvl6pPr>
+            <a:lvl7pPr eaLnBrk="1" hangingPunct="1">
+              <a:defRPr>
+                <a:solidFill>
+                  <a:schemeClr val="tx2"/>
+                </a:solidFill>
+              </a:defRPr>
+            </a:lvl7pPr>
+            <a:lvl8pPr eaLnBrk="1" hangingPunct="1">
+              <a:defRPr>
+                <a:solidFill>
+                  <a:schemeClr val="tx2"/>
+                </a:solidFill>
+              </a:defRPr>
+            </a:lvl8pPr>
+            <a:lvl9pPr eaLnBrk="1" hangingPunct="1">
+              <a:defRPr>
+                <a:solidFill>
+                  <a:schemeClr val="tx2"/>
+                </a:solidFill>
+              </a:defRPr>
+            </a:lvl9pPr>
+          </a:lstStyle>
+          <a:p>
+            <a:r>
+              <a:rPr lang="en-US" dirty="0">
+                <a:latin typeface="Segoe UI Light" panose="020B0502040204020203" pitchFamily="34" charset="0"/>
+                <a:cs typeface="Segoe UI Light" panose="020B0502040204020203" pitchFamily="34" charset="0"/>
+              </a:rPr>
+              <a:t>Monitoring</a:t>
+            </a:r>
+          </a:p>
+        </p:txBody>
+      </p:sp>
+      <p:pic>
+        <p:nvPicPr>
+          <p:cNvPr id="1026" name="Picture 2" descr="Image result for application insights">
+            <a:extLst>
+              <a:ext uri="{FF2B5EF4-FFF2-40B4-BE49-F238E27FC236}">
+                <a16:creationId xmlns:a16="http://schemas.microsoft.com/office/drawing/2014/main" id="{B8EB8CA7-25F0-4870-BE32-EEBDE4D4DC6E}"/>
+              </a:ext>
+            </a:extLst>
+          </p:cNvPr>
+          <p:cNvPicPr>
+            <a:picLocks noChangeAspect="1" noChangeArrowheads="1"/>
+          </p:cNvPicPr>
+          <p:nvPr/>
+        </p:nvPicPr>
+        <p:blipFill>
+          <a:blip r:embed="rId2">
+            <a:extLst>
+              <a:ext uri="{28A0092B-C50C-407E-A947-70E740481C1C}">
+                <a14:useLocalDpi xmlns:a14="http://schemas.microsoft.com/office/drawing/2010/main" val="0"/>
+              </a:ext>
+            </a:extLst>
+          </a:blip>
+          <a:srcRect/>
+          <a:stretch>
+            <a:fillRect/>
+          </a:stretch>
+        </p:blipFill>
+        <p:spPr bwMode="auto">
+          <a:xfrm>
+            <a:off x="10864298" y="115660"/>
+            <a:ext cx="1757939" cy="922918"/>
+          </a:xfrm>
+          <a:prstGeom prst="rect">
+            <a:avLst/>
+          </a:prstGeom>
+          <a:noFill/>
+          <a:extLst>
+            <a:ext uri="{909E8E84-426E-40DD-AFC4-6F175D3DCCD1}">
+              <a14:hiddenFill xmlns:a14="http://schemas.microsoft.com/office/drawing/2010/main">
+                <a:solidFill>
+                  <a:srgbClr val="FFFFFF"/>
+                </a:solidFill>
+              </a14:hiddenFill>
+            </a:ext>
+          </a:extLst>
+        </p:spPr>
+      </p:pic>
+      <p:pic>
+        <p:nvPicPr>
+          <p:cNvPr id="2" name="Picture 1">
+            <a:extLst>
+              <a:ext uri="{FF2B5EF4-FFF2-40B4-BE49-F238E27FC236}">
+                <a16:creationId xmlns:a16="http://schemas.microsoft.com/office/drawing/2014/main" id="{854EE14C-E7CB-404A-94B3-F8FD750B4595}"/>
+              </a:ext>
+            </a:extLst>
+          </p:cNvPr>
+          <p:cNvPicPr>
+            <a:picLocks noChangeAspect="1"/>
+          </p:cNvPicPr>
+          <p:nvPr/>
+        </p:nvPicPr>
+        <p:blipFill>
+          <a:blip r:embed="rId3"/>
+          <a:stretch>
+            <a:fillRect/>
+          </a:stretch>
+        </p:blipFill>
+        <p:spPr>
+          <a:xfrm>
+            <a:off x="1962806" y="1325950"/>
+            <a:ext cx="8266387" cy="1191332"/>
+          </a:xfrm>
+          <a:prstGeom prst="rect">
+            <a:avLst/>
+          </a:prstGeom>
+        </p:spPr>
+      </p:pic>
+      <p:pic>
+        <p:nvPicPr>
+          <p:cNvPr id="6" name="Picture 5">
+            <a:extLst>
+              <a:ext uri="{FF2B5EF4-FFF2-40B4-BE49-F238E27FC236}">
+                <a16:creationId xmlns:a16="http://schemas.microsoft.com/office/drawing/2014/main" id="{BD7B160C-8333-413D-8D9B-3B2DF00A7E7C}"/>
+              </a:ext>
+            </a:extLst>
+          </p:cNvPr>
+          <p:cNvPicPr>
+            <a:picLocks noChangeAspect="1"/>
+          </p:cNvPicPr>
+          <p:nvPr/>
+        </p:nvPicPr>
+        <p:blipFill>
+          <a:blip r:embed="rId4"/>
+          <a:stretch>
+            <a:fillRect/>
+          </a:stretch>
+        </p:blipFill>
+        <p:spPr>
+          <a:xfrm>
+            <a:off x="135466" y="2730905"/>
+            <a:ext cx="7247467" cy="4010789"/>
+          </a:xfrm>
+          <a:prstGeom prst="rect">
+            <a:avLst/>
+          </a:prstGeom>
+        </p:spPr>
+      </p:pic>
+      <p:pic>
+        <p:nvPicPr>
+          <p:cNvPr id="7" name="Picture 6">
+            <a:extLst>
+              <a:ext uri="{FF2B5EF4-FFF2-40B4-BE49-F238E27FC236}">
+                <a16:creationId xmlns:a16="http://schemas.microsoft.com/office/drawing/2014/main" id="{8AFEE576-B59D-4074-8DF3-6E783C8C2C8A}"/>
+              </a:ext>
+            </a:extLst>
+          </p:cNvPr>
+          <p:cNvPicPr>
+            <a:picLocks noChangeAspect="1"/>
+          </p:cNvPicPr>
+          <p:nvPr/>
+        </p:nvPicPr>
+        <p:blipFill>
+          <a:blip r:embed="rId5"/>
+          <a:stretch>
+            <a:fillRect/>
+          </a:stretch>
+        </p:blipFill>
+        <p:spPr>
+          <a:xfrm>
+            <a:off x="4558908" y="3153224"/>
+            <a:ext cx="7413066" cy="3143572"/>
+          </a:xfrm>
+          <a:prstGeom prst="rect">
+            <a:avLst/>
+          </a:prstGeom>
+        </p:spPr>
+      </p:pic>
+    </p:spTree>
+    <p:extLst>
+      <p:ext uri="{BB962C8B-B14F-4D97-AF65-F5344CB8AC3E}">
+        <p14:creationId xmlns:p14="http://schemas.microsoft.com/office/powerpoint/2010/main" val="3299051729"/>
+      </p:ext>
+    </p:extLst>
+  </p:cSld>
+  <p:clrMapOvr>
+    <a:masterClrMapping/>
+  </p:clrMapOvr>
+  <p:timing>
+    <p:tnLst>
+      <p:par>
+        <p:cTn id="1" dur="indefinite" restart="never" nodeType="tmRoot">
+          <p:childTnLst>
+            <p:seq concurrent="1" nextAc="seek">
+              <p:cTn id="2" dur="indefinite" nodeType="mainSeq">
+                <p:childTnLst>
+                  <p:par>
+                    <p:cTn id="3" fill="hold">
+                      <p:stCondLst>
+                        <p:cond delay="indefinite"/>
+                      </p:stCondLst>
+                      <p:childTnLst>
+                        <p:par>
+                          <p:cTn id="4" fill="hold">
+                            <p:stCondLst>
+                              <p:cond delay="0"/>
+                            </p:stCondLst>
+                            <p:childTnLst>
+                              <p:par>
+                                <p:cTn id="5" presetID="1" presetClass="entr" presetSubtype="0" fill="hold" nodeType="clickEffect">
+                                  <p:stCondLst>
+                                    <p:cond delay="0"/>
+                                  </p:stCondLst>
+                                  <p:childTnLst>
+                                    <p:set>
+                                      <p:cBhvr>
+                                        <p:cTn id="6" dur="1" fill="hold">
+                                          <p:stCondLst>
+                                            <p:cond delay="0"/>
+                                          </p:stCondLst>
+                                        </p:cTn>
+                                        <p:tgtEl>
+                                          <p:spTgt spid="7"/>
+                                        </p:tgtEl>
+                                        <p:attrNameLst>
+                                          <p:attrName>style.visibility</p:attrName>
+                                        </p:attrNameLst>
+                                      </p:cBhvr>
+                                      <p:to>
+                                        <p:strVal val="visible"/>
+                                      </p:to>
+                                    </p:set>
+                                  </p:childTnLst>
+                                </p:cTn>
+                              </p:par>
+                            </p:childTnLst>
+                          </p:cTn>
+                        </p:par>
+                      </p:childTnLst>
+                    </p:cTn>
+                  </p:par>
+                </p:childTnLst>
+              </p:cTn>
+              <p:prevCondLst>
+                <p:cond evt="onPrev" delay="0">
+                  <p:tgtEl>
+                    <p:sldTgt/>
+                  </p:tgtEl>
+                </p:cond>
+              </p:prevCondLst>
+              <p:nextCondLst>
+                <p:cond evt="onNext" delay="0">
+                  <p:tgtEl>
+                    <p:sldTgt/>
+                  </p:tgtEl>
+                </p:cond>
+              </p:nextCondLst>
+            </p:seq>
+          </p:childTnLst>
+        </p:cTn>
+      </p:par>
+    </p:tnLst>
+  </p:timing>
+</p:sld>
+</file>
+
+<file path=ppt/slides/slide2.xml><?xml version="1.0" encoding="utf-8"?>
+<p:sld xmlns:a="http://schemas.openxmlformats.org/drawingml/2006/main" xmlns:r="http://schemas.openxmlformats.org/officeDocument/2006/relationships" xmlns:p="http://schemas.openxmlformats.org/presentationml/2006/main">
+  <p:cSld>
+    <p:spTree>
+      <p:nvGrpSpPr>
+        <p:cNvPr id="1" name=""/>
+        <p:cNvGrpSpPr/>
+        <p:nvPr/>
+      </p:nvGrpSpPr>
+      <p:grpSpPr>
+        <a:xfrm>
+          <a:off x="0" y="0"/>
+          <a:ext cx="0" cy="0"/>
+          <a:chOff x="0" y="0"/>
+          <a:chExt cx="0" cy="0"/>
+        </a:xfrm>
+      </p:grpSpPr>
+      <p:sp>
+        <p:nvSpPr>
+          <p:cNvPr id="2" name="Title 1"/>
+          <p:cNvSpPr>
+            <a:spLocks noGrp="1"/>
+          </p:cNvSpPr>
+          <p:nvPr>
+            <p:ph type="title"/>
+          </p:nvPr>
+        </p:nvSpPr>
+        <p:spPr>
+          <a:xfrm>
+            <a:off x="685801" y="386592"/>
+            <a:ext cx="10131425" cy="1268545"/>
+          </a:xfrm>
+        </p:spPr>
+        <p:txBody>
+          <a:bodyPr/>
+          <a:lstStyle/>
+          <a:p>
+            <a:r>
+              <a:rPr lang="en-US" dirty="0">
+                <a:latin typeface="Segoe UI Light" panose="020B0502040204020203" pitchFamily="34" charset="0"/>
+                <a:cs typeface="Segoe UI Light" panose="020B0502040204020203" pitchFamily="34" charset="0"/>
+              </a:rPr>
+              <a:t>About us</a:t>
+            </a:r>
+          </a:p>
+        </p:txBody>
+      </p:sp>
+      <p:sp>
+        <p:nvSpPr>
+          <p:cNvPr id="3" name="Content Placeholder 2"/>
+          <p:cNvSpPr>
+            <a:spLocks noGrp="1"/>
+          </p:cNvSpPr>
+          <p:nvPr>
+            <p:ph idx="1"/>
+          </p:nvPr>
+        </p:nvSpPr>
+        <p:spPr>
+          <a:xfrm>
+            <a:off x="685801" y="1655137"/>
+            <a:ext cx="10131425" cy="4396640"/>
+          </a:xfrm>
+        </p:spPr>
+        <p:txBody>
+          <a:bodyPr>
+            <a:normAutofit fontScale="92500" lnSpcReduction="10000"/>
+          </a:bodyPr>
+          <a:lstStyle/>
+          <a:p>
+            <a:r>
+              <a:rPr lang="en-US" sz="2600" dirty="0">
+                <a:latin typeface="Segoe UI" panose="020B0502040204020203" pitchFamily="34" charset="0"/>
+                <a:cs typeface="Segoe UI" panose="020B0502040204020203" pitchFamily="34" charset="0"/>
+              </a:rPr>
+              <a:t>About Javier:</a:t>
+            </a:r>
+          </a:p>
+          <a:p>
+            <a:pPr lvl="1"/>
+            <a:r>
+              <a:rPr lang="en-US" sz="2200" dirty="0">
+                <a:latin typeface="Segoe UI" panose="020B0502040204020203" pitchFamily="34" charset="0"/>
+                <a:cs typeface="Segoe UI" panose="020B0502040204020203" pitchFamily="34" charset="0"/>
+              </a:rPr>
+              <a:t>Sr. Software Engineer</a:t>
+            </a:r>
+          </a:p>
+          <a:p>
+            <a:pPr lvl="1"/>
+            <a:r>
+              <a:rPr lang="en-US" sz="2200" dirty="0">
+                <a:latin typeface="Segoe UI" panose="020B0502040204020203" pitchFamily="34" charset="0"/>
+                <a:cs typeface="Segoe UI" panose="020B0502040204020203" pitchFamily="34" charset="0"/>
+              </a:rPr>
+              <a:t>7 Years professional software development</a:t>
+            </a:r>
+          </a:p>
+          <a:p>
+            <a:pPr lvl="1"/>
+            <a:r>
+              <a:rPr lang="en-US" sz="2200" dirty="0">
+                <a:latin typeface="Segoe UI" panose="020B0502040204020203" pitchFamily="34" charset="0"/>
+                <a:cs typeface="Segoe UI" panose="020B0502040204020203" pitchFamily="34" charset="0"/>
+              </a:rPr>
+              <a:t>4 Years of Enterprise Level Development</a:t>
+            </a:r>
+          </a:p>
+          <a:p>
+            <a:pPr lvl="1"/>
+            <a:r>
+              <a:rPr lang="en-US" sz="2200" dirty="0">
+                <a:latin typeface="Segoe UI" panose="020B0502040204020203" pitchFamily="34" charset="0"/>
+                <a:cs typeface="Segoe UI" panose="020B0502040204020203" pitchFamily="34" charset="0"/>
+              </a:rPr>
+              <a:t>3 Years of Micro Service Architecture with Service Fabric</a:t>
+            </a:r>
+          </a:p>
+          <a:p>
+            <a:r>
+              <a:rPr lang="en-US" sz="2600" dirty="0">
+                <a:latin typeface="Segoe UI" panose="020B0502040204020203" pitchFamily="34" charset="0"/>
+                <a:cs typeface="Segoe UI" panose="020B0502040204020203" pitchFamily="34" charset="0"/>
+              </a:rPr>
+              <a:t>About Will:</a:t>
+            </a:r>
+          </a:p>
+          <a:p>
+            <a:pPr lvl="1"/>
+            <a:r>
+              <a:rPr lang="en-US" sz="2200" dirty="0">
+                <a:latin typeface="Segoe UI" panose="020B0502040204020203" pitchFamily="34" charset="0"/>
+                <a:cs typeface="Segoe UI" panose="020B0502040204020203" pitchFamily="34" charset="0"/>
+              </a:rPr>
+              <a:t>Lead Software Engineer</a:t>
+            </a:r>
+          </a:p>
+          <a:p>
+            <a:pPr lvl="1"/>
+            <a:r>
+              <a:rPr lang="en-US" sz="2200" dirty="0">
+                <a:latin typeface="Segoe UI" panose="020B0502040204020203" pitchFamily="34" charset="0"/>
+                <a:cs typeface="Segoe UI" panose="020B0502040204020203" pitchFamily="34" charset="0"/>
+              </a:rPr>
+              <a:t>27 Years of professional software development</a:t>
+            </a:r>
+          </a:p>
+          <a:p>
+            <a:pPr lvl="1"/>
+            <a:r>
+              <a:rPr lang="en-US" sz="2200" dirty="0">
+                <a:latin typeface="Segoe UI" panose="020B0502040204020203" pitchFamily="34" charset="0"/>
+                <a:cs typeface="Segoe UI" panose="020B0502040204020203" pitchFamily="34" charset="0"/>
+              </a:rPr>
+              <a:t>5 Years of Micro Service Architecture </a:t>
+            </a:r>
+          </a:p>
+          <a:p>
+            <a:pPr lvl="1"/>
+            <a:r>
+              <a:rPr lang="en-US" sz="2200" dirty="0">
+                <a:latin typeface="Segoe UI" panose="020B0502040204020203" pitchFamily="34" charset="0"/>
+                <a:cs typeface="Segoe UI" panose="020B0502040204020203" pitchFamily="34" charset="0"/>
+              </a:rPr>
+              <a:t>More than 25 applications currently running in the world</a:t>
+            </a:r>
+          </a:p>
+          <a:p>
+            <a:pPr lvl="1"/>
+            <a:endParaRPr lang="en-US" dirty="0">
+              <a:latin typeface="Segoe UI" panose="020B0502040204020203" pitchFamily="34" charset="0"/>
+              <a:cs typeface="Segoe UI" panose="020B0502040204020203" pitchFamily="34" charset="0"/>
+            </a:endParaRPr>
+          </a:p>
+        </p:txBody>
+      </p:sp>
+      <p:pic>
+        <p:nvPicPr>
+          <p:cNvPr id="6" name="Picture 5"/>
+          <p:cNvPicPr>
+            <a:picLocks noChangeAspect="1"/>
+          </p:cNvPicPr>
+          <p:nvPr/>
+        </p:nvPicPr>
+        <p:blipFill>
+          <a:blip r:embed="rId2">
+            <a:extLst>
+              <a:ext uri="{28A0092B-C50C-407E-A947-70E740481C1C}">
+                <a14:useLocalDpi xmlns:a14="http://schemas.microsoft.com/office/drawing/2010/main" val="0"/>
+              </a:ext>
+            </a:extLst>
+          </a:blip>
+          <a:stretch>
+            <a:fillRect/>
+          </a:stretch>
+        </p:blipFill>
+        <p:spPr>
+          <a:xfrm>
+            <a:off x="9160244" y="1020864"/>
+            <a:ext cx="2223887" cy="1124522"/>
+          </a:xfrm>
+          <a:prstGeom prst="rect">
+            <a:avLst/>
+          </a:prstGeom>
+        </p:spPr>
+      </p:pic>
+    </p:spTree>
+    <p:extLst>
+      <p:ext uri="{BB962C8B-B14F-4D97-AF65-F5344CB8AC3E}">
+        <p14:creationId xmlns:p14="http://schemas.microsoft.com/office/powerpoint/2010/main" val="1012959071"/>
+      </p:ext>
+    </p:extLst>
+  </p:cSld>
+  <p:clrMapOvr>
+    <a:masterClrMapping/>
+  </p:clrMapOvr>
+</p:sld>
+</file>
+
+<file path=ppt/slides/slide20.xml><?xml version="1.0" encoding="utf-8"?>
+<p:sld xmlns:a="http://schemas.openxmlformats.org/drawingml/2006/main" xmlns:r="http://schemas.openxmlformats.org/officeDocument/2006/relationships" xmlns:p="http://schemas.openxmlformats.org/presentationml/2006/main">
+  <p:cSld>
+    <p:spTree>
+      <p:nvGrpSpPr>
+        <p:cNvPr id="1" name=""/>
+        <p:cNvGrpSpPr/>
+        <p:nvPr/>
+      </p:nvGrpSpPr>
+      <p:grpSpPr>
+        <a:xfrm>
+          <a:off x="0" y="0"/>
+          <a:ext cx="0" cy="0"/>
+          <a:chOff x="0" y="0"/>
+          <a:chExt cx="0" cy="0"/>
+        </a:xfrm>
+      </p:grpSpPr>
       <p:pic>
         <p:nvPicPr>
           <p:cNvPr id="4" name="Picture 3">
@@ -15732,225 +16308,7 @@
 </p:sld>
 </file>
 
-<file path=ppt/slides/slide2.xml><?xml version="1.0" encoding="utf-8"?>
-<p:sld xmlns:a="http://schemas.openxmlformats.org/drawingml/2006/main" xmlns:r="http://schemas.openxmlformats.org/officeDocument/2006/relationships" xmlns:p="http://schemas.openxmlformats.org/presentationml/2006/main">
-  <p:cSld>
-    <p:spTree>
-      <p:nvGrpSpPr>
-        <p:cNvPr id="1" name=""/>
-        <p:cNvGrpSpPr/>
-        <p:nvPr/>
-      </p:nvGrpSpPr>
-      <p:grpSpPr>
-        <a:xfrm>
-          <a:off x="0" y="0"/>
-          <a:ext cx="0" cy="0"/>
-          <a:chOff x="0" y="0"/>
-          <a:chExt cx="0" cy="0"/>
-        </a:xfrm>
-      </p:grpSpPr>
-      <p:sp>
-        <p:nvSpPr>
-          <p:cNvPr id="2" name="Title 1"/>
-          <p:cNvSpPr>
-            <a:spLocks noGrp="1"/>
-          </p:cNvSpPr>
-          <p:nvPr>
-            <p:ph type="title"/>
-          </p:nvPr>
-        </p:nvSpPr>
-        <p:spPr>
-          <a:xfrm>
-            <a:off x="685801" y="386592"/>
-            <a:ext cx="10131425" cy="1268545"/>
-          </a:xfrm>
-        </p:spPr>
-        <p:txBody>
-          <a:bodyPr/>
-          <a:lstStyle/>
-          <a:p>
-            <a:r>
-              <a:rPr lang="en-US" dirty="0">
-                <a:latin typeface="Segoe UI Light" panose="020B0502040204020203" pitchFamily="34" charset="0"/>
-                <a:cs typeface="Segoe UI Light" panose="020B0502040204020203" pitchFamily="34" charset="0"/>
-              </a:rPr>
-              <a:t>About us</a:t>
-            </a:r>
-          </a:p>
-        </p:txBody>
-      </p:sp>
-      <p:sp>
-        <p:nvSpPr>
-          <p:cNvPr id="3" name="Content Placeholder 2"/>
-          <p:cNvSpPr>
-            <a:spLocks noGrp="1"/>
-          </p:cNvSpPr>
-          <p:nvPr>
-            <p:ph idx="1"/>
-          </p:nvPr>
-        </p:nvSpPr>
-        <p:spPr>
-          <a:xfrm>
-            <a:off x="685801" y="1655137"/>
-            <a:ext cx="10131425" cy="4396640"/>
-          </a:xfrm>
-        </p:spPr>
-        <p:txBody>
-          <a:bodyPr>
-            <a:normAutofit fontScale="92500" lnSpcReduction="10000"/>
-          </a:bodyPr>
-          <a:lstStyle/>
-          <a:p>
-            <a:r>
-              <a:rPr lang="en-US" sz="2600" dirty="0">
-                <a:latin typeface="Segoe UI" panose="020B0502040204020203" pitchFamily="34" charset="0"/>
-                <a:cs typeface="Segoe UI" panose="020B0502040204020203" pitchFamily="34" charset="0"/>
-              </a:rPr>
-              <a:t>About Javier:</a:t>
-            </a:r>
-          </a:p>
-          <a:p>
-            <a:pPr lvl="1"/>
-            <a:r>
-              <a:rPr lang="en-US" sz="2200" dirty="0">
-                <a:latin typeface="Segoe UI" panose="020B0502040204020203" pitchFamily="34" charset="0"/>
-                <a:cs typeface="Segoe UI" panose="020B0502040204020203" pitchFamily="34" charset="0"/>
-              </a:rPr>
-              <a:t>Sr. Software Engineer</a:t>
-            </a:r>
-          </a:p>
-          <a:p>
-            <a:pPr lvl="1"/>
-            <a:r>
-              <a:rPr lang="en-US" sz="2200" dirty="0">
-                <a:latin typeface="Segoe UI" panose="020B0502040204020203" pitchFamily="34" charset="0"/>
-                <a:cs typeface="Segoe UI" panose="020B0502040204020203" pitchFamily="34" charset="0"/>
-              </a:rPr>
-              <a:t>7 Years professional software development</a:t>
-            </a:r>
-          </a:p>
-          <a:p>
-            <a:pPr lvl="1"/>
-            <a:r>
-              <a:rPr lang="en-US" sz="2200" dirty="0">
-                <a:latin typeface="Segoe UI" panose="020B0502040204020203" pitchFamily="34" charset="0"/>
-                <a:cs typeface="Segoe UI" panose="020B0502040204020203" pitchFamily="34" charset="0"/>
-              </a:rPr>
-              <a:t>4 Years of Enterprise Level Development</a:t>
-            </a:r>
-          </a:p>
-          <a:p>
-            <a:pPr lvl="1"/>
-            <a:r>
-              <a:rPr lang="en-US" sz="2200" dirty="0">
-                <a:latin typeface="Segoe UI" panose="020B0502040204020203" pitchFamily="34" charset="0"/>
-                <a:cs typeface="Segoe UI" panose="020B0502040204020203" pitchFamily="34" charset="0"/>
-              </a:rPr>
-              <a:t>3 Years of Micro Service Architecture with Service Fabric</a:t>
-            </a:r>
-          </a:p>
-          <a:p>
-            <a:r>
-              <a:rPr lang="en-US" sz="2600" dirty="0">
-                <a:latin typeface="Segoe UI" panose="020B0502040204020203" pitchFamily="34" charset="0"/>
-                <a:cs typeface="Segoe UI" panose="020B0502040204020203" pitchFamily="34" charset="0"/>
-              </a:rPr>
-              <a:t>About Will:</a:t>
-            </a:r>
-          </a:p>
-          <a:p>
-            <a:pPr lvl="1"/>
-            <a:r>
-              <a:rPr lang="en-US" sz="2200" dirty="0">
-                <a:latin typeface="Segoe UI" panose="020B0502040204020203" pitchFamily="34" charset="0"/>
-                <a:cs typeface="Segoe UI" panose="020B0502040204020203" pitchFamily="34" charset="0"/>
-              </a:rPr>
-              <a:t>Lead Software Engineer</a:t>
-            </a:r>
-          </a:p>
-          <a:p>
-            <a:pPr lvl="1"/>
-            <a:r>
-              <a:rPr lang="en-US" sz="2200" dirty="0">
-                <a:latin typeface="Segoe UI" panose="020B0502040204020203" pitchFamily="34" charset="0"/>
-                <a:cs typeface="Segoe UI" panose="020B0502040204020203" pitchFamily="34" charset="0"/>
-              </a:rPr>
-              <a:t>27 Years of professional software development</a:t>
-            </a:r>
-          </a:p>
-          <a:p>
-            <a:pPr lvl="1"/>
-            <a:r>
-              <a:rPr lang="en-US" sz="2200" dirty="0">
-                <a:latin typeface="Segoe UI" panose="020B0502040204020203" pitchFamily="34" charset="0"/>
-                <a:cs typeface="Segoe UI" panose="020B0502040204020203" pitchFamily="34" charset="0"/>
-              </a:rPr>
-              <a:t>5 Years of Micro Service Architecture </a:t>
-            </a:r>
-          </a:p>
-          <a:p>
-            <a:pPr lvl="1"/>
-            <a:r>
-              <a:rPr lang="en-US" sz="2200" dirty="0">
-                <a:latin typeface="Segoe UI" panose="020B0502040204020203" pitchFamily="34" charset="0"/>
-                <a:cs typeface="Segoe UI" panose="020B0502040204020203" pitchFamily="34" charset="0"/>
-              </a:rPr>
-              <a:t>More than 25 applications currently running in the world</a:t>
-            </a:r>
-          </a:p>
-          <a:p>
-            <a:pPr lvl="1"/>
-            <a:endParaRPr lang="en-US" dirty="0">
-              <a:latin typeface="Segoe UI" panose="020B0502040204020203" pitchFamily="34" charset="0"/>
-              <a:cs typeface="Segoe UI" panose="020B0502040204020203" pitchFamily="34" charset="0"/>
-            </a:endParaRPr>
-          </a:p>
-        </p:txBody>
-      </p:sp>
-      <p:pic>
-        <p:nvPicPr>
-          <p:cNvPr id="6" name="Picture 5"/>
-          <p:cNvPicPr>
-            <a:picLocks noChangeAspect="1"/>
-          </p:cNvPicPr>
-          <p:nvPr/>
-        </p:nvPicPr>
-        <p:blipFill>
-          <a:blip r:embed="rId2">
-            <a:extLst>
-              <a:ext uri="{28A0092B-C50C-407E-A947-70E740481C1C}">
-                <a14:useLocalDpi xmlns:a14="http://schemas.microsoft.com/office/drawing/2010/main" val="0"/>
-              </a:ext>
-            </a:extLst>
-          </a:blip>
-          <a:stretch>
-            <a:fillRect/>
-          </a:stretch>
-        </p:blipFill>
-        <p:spPr>
-          <a:xfrm>
-            <a:off x="9160244" y="1020864"/>
-            <a:ext cx="2223887" cy="1124522"/>
-          </a:xfrm>
-          <a:prstGeom prst="rect">
-            <a:avLst/>
-          </a:prstGeom>
-        </p:spPr>
-      </p:pic>
-    </p:spTree>
-    <p:extLst>
-      <p:ext uri="{BB962C8B-B14F-4D97-AF65-F5344CB8AC3E}">
-        <p14:creationId xmlns:p14="http://schemas.microsoft.com/office/powerpoint/2010/main" val="1012959071"/>
-      </p:ext>
-    </p:extLst>
-  </p:cSld>
-  <p:clrMapOvr>
-    <a:masterClrMapping/>
-  </p:clrMapOvr>
-</p:sld>
-</file>
-
-<file path=ppt/slides/slide20.xml><?xml version="1.0" encoding="utf-8"?>
+<file path=ppt/slides/slide21.xml><?xml version="1.0" encoding="utf-8"?>
 <p:sld xmlns:a="http://schemas.openxmlformats.org/drawingml/2006/main" xmlns:r="http://schemas.openxmlformats.org/officeDocument/2006/relationships" xmlns:p="http://schemas.openxmlformats.org/presentationml/2006/main">
   <p:cSld>
     <p:spTree>
@@ -16095,7 +16453,7 @@
 </p:sld>
 </file>
 
-<file path=ppt/slides/slide21.xml><?xml version="1.0" encoding="utf-8"?>
+<file path=ppt/slides/slide22.xml><?xml version="1.0" encoding="utf-8"?>
 <p:sld xmlns:a="http://schemas.openxmlformats.org/drawingml/2006/main" xmlns:r="http://schemas.openxmlformats.org/officeDocument/2006/relationships" xmlns:p="http://schemas.openxmlformats.org/presentationml/2006/main">
   <p:cSld>
     <p:spTree>
@@ -16309,7 +16667,7 @@
 </p:sld>
 </file>
 
-<file path=ppt/slides/slide22.xml><?xml version="1.0" encoding="utf-8"?>
+<file path=ppt/slides/slide23.xml><?xml version="1.0" encoding="utf-8"?>
 <p:sld xmlns:a="http://schemas.openxmlformats.org/drawingml/2006/main" xmlns:r="http://schemas.openxmlformats.org/officeDocument/2006/relationships" xmlns:p="http://schemas.openxmlformats.org/presentationml/2006/main">
   <p:cSld>
     <p:spTree>
@@ -33237,7 +33595,7 @@
     <mc:Choice Requires="p14">
       <p:transition p14:dur="10"/>
     </mc:Choice>
-    <mc:Fallback xmlns:a14="http://schemas.microsoft.com/office/drawing/2010/main" xmlns:asvg="http://schemas.microsoft.com/office/drawing/2016/SVG/main" xmlns:a16="http://schemas.microsoft.com/office/drawing/2014/main" xmlns="">
+    <mc:Fallback xmlns="" xmlns:a16="http://schemas.microsoft.com/office/drawing/2014/main" xmlns:asvg="http://schemas.microsoft.com/office/drawing/2016/SVG/main" xmlns:a14="http://schemas.microsoft.com/office/drawing/2010/main">
       <p:transition/>
     </mc:Fallback>
   </mc:AlternateContent>

</xml_diff>